<commit_message>
generated some figures, tested weights and Ea, not much else
</commit_message>
<xml_diff>
--- a/Presentation/Updates_COPd_plots_summary.pptx
+++ b/Presentation/Updates_COPd_plots_summary.pptx
@@ -5,23 +5,24 @@
     <p:sldMasterId id="2147483648" r:id="rId1"/>
   </p:sldMasterIdLst>
   <p:notesMasterIdLst>
-    <p:notesMasterId r:id="rId16"/>
+    <p:notesMasterId r:id="rId17"/>
   </p:notesMasterIdLst>
   <p:sldIdLst>
     <p:sldId id="259" r:id="rId2"/>
     <p:sldId id="257" r:id="rId3"/>
     <p:sldId id="274" r:id="rId4"/>
     <p:sldId id="258" r:id="rId5"/>
-    <p:sldId id="268" r:id="rId6"/>
-    <p:sldId id="273" r:id="rId7"/>
-    <p:sldId id="276" r:id="rId8"/>
-    <p:sldId id="275" r:id="rId9"/>
-    <p:sldId id="271" r:id="rId10"/>
-    <p:sldId id="272" r:id="rId11"/>
-    <p:sldId id="269" r:id="rId12"/>
-    <p:sldId id="277" r:id="rId13"/>
-    <p:sldId id="278" r:id="rId14"/>
-    <p:sldId id="279" r:id="rId15"/>
+    <p:sldId id="280" r:id="rId6"/>
+    <p:sldId id="268" r:id="rId7"/>
+    <p:sldId id="281" r:id="rId8"/>
+    <p:sldId id="273" r:id="rId9"/>
+    <p:sldId id="275" r:id="rId10"/>
+    <p:sldId id="271" r:id="rId11"/>
+    <p:sldId id="272" r:id="rId12"/>
+    <p:sldId id="269" r:id="rId13"/>
+    <p:sldId id="282" r:id="rId14"/>
+    <p:sldId id="277" r:id="rId15"/>
+    <p:sldId id="279" r:id="rId16"/>
   </p:sldIdLst>
   <p:sldSz cx="12192000" cy="6858000"/>
   <p:notesSz cx="6858000" cy="9144000"/>
@@ -128,6 +129,839 @@
 </p:presentation>
 </file>
 
+<file path=ppt/ink/ink1.xml><?xml version="1.0" encoding="utf-8"?>
+<inkml:ink xmlns:inkml="http://www.w3.org/2003/InkML">
+  <inkml:definitions>
+    <inkml:context xml:id="ctx0">
+      <inkml:inkSource xml:id="inkSrc0">
+        <inkml:traceFormat>
+          <inkml:channel name="X" type="integer" min="-2.14748E9" max="2.14748E9" units="cm"/>
+          <inkml:channel name="Y" type="integer" min="-2.14748E9" max="2.14748E9" units="cm"/>
+          <inkml:channel name="F" type="integer" max="32767" units="dev"/>
+        </inkml:traceFormat>
+        <inkml:channelProperties>
+          <inkml:channelProperty channel="X" name="resolution" value="1000" units="1/cm"/>
+          <inkml:channelProperty channel="Y" name="resolution" value="1000" units="1/cm"/>
+          <inkml:channelProperty channel="F" name="resolution" value="0" units="1/dev"/>
+        </inkml:channelProperties>
+      </inkml:inkSource>
+      <inkml:timestamp xml:id="ts0" timeString="2023-05-24T13:48:08.924"/>
+    </inkml:context>
+    <inkml:brush xml:id="br0">
+      <inkml:brushProperty name="width" value="0.05" units="cm"/>
+      <inkml:brushProperty name="height" value="0.05" units="cm"/>
+      <inkml:brushProperty name="color" value="#AB008B"/>
+    </inkml:brush>
+  </inkml:definitions>
+  <inkml:trace contextRef="#ctx0" brushRef="#br0">1 3517 24575,'0'-17'0,"0"-6"0,1-13 0,2-11 0,4-9 0,3-5 0,10-15 0,-7 28 0,10-20 0,-8 21 0,3-10 0,1 2 0,-2 10 0,1 3 0,-1 4 0,0 3 0,6-5 0,-9 19 0,12-13 0,-6 14 0,13-8 0,10-5 0,3 1 0,4 1 0,-7 4 0,-9 7 0,-1 5 0,-2 5 0,10 0 0,8-1 0,-2 0 0,-10 2 0,-13 3 0,-8 3 0,1 0 0,8-2 0,9-3 0,7-2 0,2-1 0,-4 2 0,-5 1 0,-3 1 0,1 1 0,6-1 0,7-1 0,0-1 0,-5 2 0,-8 2 0,-9 2 0,-5 0 0,-2 0 0,5 0 0,13 0 0,24-2 0,23 0 0,-32 2 0,2 0 0,4 0 0,1 0 0,-3-1 0,-1 1 0,38-3 0,-18 0 0,-10 1 0,-1-1 0,17-2 0,22-2 0,-41 2 0,2-1 0,7-4 0,0-2 0,0-3 0,-2-3 0,-4-1 0,-3-1 0,-7 2 0,-3-1 0,34-19 0,-16-1 0,-13-4 0,-8-8 0,-9-5 0,-9-4 0,-5-1 0,-8 0 0,-6 3 0,-4 3 0,-2-5 0,-3-6 0,2-6 0,0-3 0,1 7 0,2 10 0,2 10 0,1 9 0,2 3 0,5-5 0,7-10 0,10-10 0,9-7 0,9-2 0,12 3 0,6 3 0,4 6 0,-6 11 0,-7 12 0,-5 10 0,2 5 0,11-3 0,19-5 0,-29 13 0,4 0 0,14-2 0,5 1 0,10-1 0,3 1 0,5 1 0,0 1 0,-2 2 0,-1 3 0,-7 3 0,-3 2 0,-10 2 0,-2 1 0,-10 1 0,-3 1 0,39-4 0,-19-2 0,-5-1 0,5 2 0,17 2 0,-39 4 0,3 0 0,6 1 0,0 0 0,0-1 0,-1 2 0,0-1 0,2 0 0,3 2 0,3 1 0,5 1 0,1 1 0,6 2 0,-1 2 0,-5 2 0,-3 0 0,-14-1 0,-7 0 0,21 6 0,-37-4 0,-21-4 0,-9 0 0,-3 6 0,-4 11 0,-1 16 0,-1 22 0,0 17 0,0 10 0,-3 4 0,-9 0 0,1-44 0,-4 1 0,-4 2 0,-3 1 0,-4 5 0,-2 1 0,-1 1 0,-1 0 0,-1-2 0,-1-2 0,2-5 0,-1-3 0,-25 30 0,2-20 0,-1-11 0,-10-4 0,-9 1 0,-9 3 0,-2 0 0,4-6 0,2-10 0,-11-7 0,40-15 0,-2-1 0,-6-2 0,-1-1 0,-5 1 0,-1-2 0,-1-1 0,-2-1 0,-2 0 0,-1 1 0,-1-1 0,0 1 0,0 0 0,1 0 0,5 0 0,4 1 0,9-1 0,3 0 0,-29 4 0,16-2 0,-4-1 0,-18 1 0,33-2 0,-1-1 0,-3 0 0,-1 0 0,-1 1 0,0-2 0,1 1 0,1-2 0,-43 2 0,15 1 0,18 1 0,17 3 0,3 9 0,-7 15 0,-6 15 0,-8 23 0,31-26 0,0 4 0,0 9 0,1 4 0,-2 6 0,2 3 0,-1 3 0,1 1 0,0 3 0,1 2 0,1 0 0,1 1 0,1 0 0,3 0 0,2-2 0,2 0 0,3-6 0,0-2 0,1-5 0,0-3 0,1-5 0,-2-2 0,2-7 0,-1-3 0,-21 40 0,1-11 0,-6-2 0,-6 3 0,-8 4 0,24-34 0,-1 1 0,-1 0 0,0-1 0,0-1 0,1-2 0,-32 30 0,9-21 0,3-15 0,-3-14 0,-36-1 0,33-8 0,-2-1 0,-5 1 0,14-4 0,-1 0 0,-13 1 0,-3-1 0,-2-1 0,2-2 0,8-3 0,3-3 0,3 0 0,2-2 0,2-1 0,1-1 0,-1-3 0,-1-2 0,0-1 0,0-2 0,1-1 0,2 0 0,-42-14 0,24-5 0,12-8 0,-1-9 0,-1-3 0,6 8 0,9 10 0,9 7 0,-2-2 0,-8-4 0,-6-1 0,-1 1 0,5 2 0,8-1 0,-1-12 0,-4-17 0,-10-20 0,22 34 0,0-1 0,0 2 0,1 2 0,-21-26 0,20 28 0,18 23 0,9 13 0,4 0 0,0 4 0,1-2 0</inkml:trace>
+</inkml:ink>
+</file>
+
+<file path=ppt/ink/ink10.xml><?xml version="1.0" encoding="utf-8"?>
+<inkml:ink xmlns:inkml="http://www.w3.org/2003/InkML">
+  <inkml:definitions>
+    <inkml:context xml:id="ctx0">
+      <inkml:inkSource xml:id="inkSrc0">
+        <inkml:traceFormat>
+          <inkml:channel name="X" type="integer" min="-2.14748E9" max="2.14748E9" units="cm"/>
+          <inkml:channel name="Y" type="integer" min="-2.14748E9" max="2.14748E9" units="cm"/>
+          <inkml:channel name="F" type="integer" max="32767" units="dev"/>
+        </inkml:traceFormat>
+        <inkml:channelProperties>
+          <inkml:channelProperty channel="X" name="resolution" value="1000" units="1/cm"/>
+          <inkml:channelProperty channel="Y" name="resolution" value="1000" units="1/cm"/>
+          <inkml:channelProperty channel="F" name="resolution" value="0" units="1/dev"/>
+        </inkml:channelProperties>
+      </inkml:inkSource>
+      <inkml:timestamp xml:id="ts0" timeString="2023-05-24T13:48:33.597"/>
+    </inkml:context>
+    <inkml:brush xml:id="br0">
+      <inkml:brushProperty name="width" value="0.05" units="cm"/>
+      <inkml:brushProperty name="height" value="0.05" units="cm"/>
+      <inkml:brushProperty name="color" value="#008C3A"/>
+    </inkml:brush>
+  </inkml:definitions>
+  <inkml:trace contextRef="#ctx0" brushRef="#br0">19 0 24575,'-3'17'0,"1"8"0,1 12 0,0 15 0,1 8 0,-1 1 0,-1-6 0,0-10 0,-1-12 0,1-13 0,1-11 0,1-5 0</inkml:trace>
+</inkml:ink>
+</file>
+
+<file path=ppt/ink/ink11.xml><?xml version="1.0" encoding="utf-8"?>
+<inkml:ink xmlns:inkml="http://www.w3.org/2003/InkML">
+  <inkml:definitions>
+    <inkml:context xml:id="ctx0">
+      <inkml:inkSource xml:id="inkSrc0">
+        <inkml:traceFormat>
+          <inkml:channel name="X" type="integer" min="-2.14748E9" max="2.14748E9" units="cm"/>
+          <inkml:channel name="Y" type="integer" min="-2.14748E9" max="2.14748E9" units="cm"/>
+          <inkml:channel name="F" type="integer" max="32767" units="dev"/>
+        </inkml:traceFormat>
+        <inkml:channelProperties>
+          <inkml:channelProperty channel="X" name="resolution" value="1000" units="1/cm"/>
+          <inkml:channelProperty channel="Y" name="resolution" value="1000" units="1/cm"/>
+          <inkml:channelProperty channel="F" name="resolution" value="0" units="1/dev"/>
+        </inkml:channelProperties>
+      </inkml:inkSource>
+      <inkml:timestamp xml:id="ts0" timeString="2023-05-24T13:48:34.298"/>
+    </inkml:context>
+    <inkml:brush xml:id="br0">
+      <inkml:brushProperty name="width" value="0.05" units="cm"/>
+      <inkml:brushProperty name="height" value="0.05" units="cm"/>
+      <inkml:brushProperty name="color" value="#008C3A"/>
+    </inkml:brush>
+  </inkml:definitions>
+  <inkml:trace contextRef="#ctx0" brushRef="#br0">1 11 24575,'10'0'0,"2"0"0,6 0 0,11-1 0,10 0 0,4-1 0,-6 1 0,-11-1 0,-13 0 0,-6 1 0,1 1 0,1 0 0,1 0 0,-3 0 0,-3 0 0,-4 0 0</inkml:trace>
+</inkml:ink>
+</file>
+
+<file path=ppt/ink/ink12.xml><?xml version="1.0" encoding="utf-8"?>
+<inkml:ink xmlns:inkml="http://www.w3.org/2003/InkML">
+  <inkml:definitions>
+    <inkml:context xml:id="ctx0">
+      <inkml:inkSource xml:id="inkSrc0">
+        <inkml:traceFormat>
+          <inkml:channel name="X" type="integer" min="-2.14748E9" max="2.14748E9" units="cm"/>
+          <inkml:channel name="Y" type="integer" min="-2.14748E9" max="2.14748E9" units="cm"/>
+          <inkml:channel name="F" type="integer" max="32767" units="dev"/>
+        </inkml:traceFormat>
+        <inkml:channelProperties>
+          <inkml:channelProperty channel="X" name="resolution" value="1000" units="1/cm"/>
+          <inkml:channelProperty channel="Y" name="resolution" value="1000" units="1/cm"/>
+          <inkml:channelProperty channel="F" name="resolution" value="0" units="1/dev"/>
+        </inkml:channelProperties>
+      </inkml:inkSource>
+      <inkml:timestamp xml:id="ts0" timeString="2023-05-24T13:48:38.782"/>
+    </inkml:context>
+    <inkml:brush xml:id="br0">
+      <inkml:brushProperty name="width" value="0.05" units="cm"/>
+      <inkml:brushProperty name="height" value="0.05" units="cm"/>
+    </inkml:brush>
+  </inkml:definitions>
+  <inkml:trace contextRef="#ctx0" brushRef="#br0">1 19 24575,'32'1'0,"13"-3"0,17-2 0,-1-1 0,-16 1 0,-16 1 0,-12 2 0,-3 0 0,3 1 0,3 0 0,0 0 0,-4 0 0,-8 0 0,-3 0 0</inkml:trace>
+</inkml:ink>
+</file>
+
+<file path=ppt/ink/ink13.xml><?xml version="1.0" encoding="utf-8"?>
+<inkml:ink xmlns:inkml="http://www.w3.org/2003/InkML">
+  <inkml:definitions>
+    <inkml:context xml:id="ctx0">
+      <inkml:inkSource xml:id="inkSrc0">
+        <inkml:traceFormat>
+          <inkml:channel name="X" type="integer" min="-2.14748E9" max="2.14748E9" units="cm"/>
+          <inkml:channel name="Y" type="integer" min="-2.14748E9" max="2.14748E9" units="cm"/>
+          <inkml:channel name="F" type="integer" max="32767" units="dev"/>
+        </inkml:traceFormat>
+        <inkml:channelProperties>
+          <inkml:channelProperty channel="X" name="resolution" value="1000" units="1/cm"/>
+          <inkml:channelProperty channel="Y" name="resolution" value="1000" units="1/cm"/>
+          <inkml:channelProperty channel="F" name="resolution" value="0" units="1/dev"/>
+        </inkml:channelProperties>
+      </inkml:inkSource>
+      <inkml:timestamp xml:id="ts0" timeString="2023-05-24T13:48:37.981"/>
+    </inkml:context>
+    <inkml:brush xml:id="br0">
+      <inkml:brushProperty name="width" value="0.05" units="cm"/>
+      <inkml:brushProperty name="height" value="0.05" units="cm"/>
+    </inkml:brush>
+  </inkml:definitions>
+  <inkml:trace contextRef="#ctx0" brushRef="#br0">1 5 24575,'18'0'0,"1"1"0,-7 0 0,1 0 0,-2-1 0,4-1 0,10 0 0,10-1 0,7 0 0,2 1 0,-6 0 0,-6 1 0,-9 0 0,-7 0 0,-9 0 0,-4 0 0</inkml:trace>
+</inkml:ink>
+</file>
+
+<file path=ppt/ink/ink14.xml><?xml version="1.0" encoding="utf-8"?>
+<inkml:ink xmlns:inkml="http://www.w3.org/2003/InkML">
+  <inkml:definitions>
+    <inkml:context xml:id="ctx0">
+      <inkml:inkSource xml:id="inkSrc0">
+        <inkml:traceFormat>
+          <inkml:channel name="X" type="integer" min="-2.14748E9" max="2.14748E9" units="cm"/>
+          <inkml:channel name="Y" type="integer" min="-2.14748E9" max="2.14748E9" units="cm"/>
+          <inkml:channel name="F" type="integer" max="32767" units="dev"/>
+        </inkml:traceFormat>
+        <inkml:channelProperties>
+          <inkml:channelProperty channel="X" name="resolution" value="1000" units="1/cm"/>
+          <inkml:channelProperty channel="Y" name="resolution" value="1000" units="1/cm"/>
+          <inkml:channelProperty channel="F" name="resolution" value="0" units="1/dev"/>
+        </inkml:channelProperties>
+      </inkml:inkSource>
+      <inkml:timestamp xml:id="ts0" timeString="2023-05-24T13:48:40.366"/>
+    </inkml:context>
+    <inkml:brush xml:id="br0">
+      <inkml:brushProperty name="width" value="0.05" units="cm"/>
+      <inkml:brushProperty name="height" value="0.05" units="cm"/>
+    </inkml:brush>
+  </inkml:definitions>
+  <inkml:trace contextRef="#ctx0" brushRef="#br0">1 39 24575,'21'2'0,"16"0"0,20 0 0,31 0 0,-33-2 0,5 1 0,16-1 0,4 0 0,9 0 0,2 0 0,-1 0 0,-1 0 0,-9 0 0,-4 0 0,-16 0 0,-5-1 0,30 0 0,-16-1 0,1 0 0,14-2 0,-33 3 0,3 0 0,4 0 0,2 0 0,5-1 0,0 1 0,3 0 0,0 0 0,-1 1 0,-1-1 0,1 0 0,-1 1 0,-3 0 0,-2 0 0,-3-1 0,-1 0 0,-2 0 0,0 0 0,-2-1 0,-1 1 0,1-1 0,0 1 0,2 0 0,0 0 0,0 0 0,0 0 0,-3 0 0,-2 1 0,39-2 0,-16 2 0,-19 0 0,-15 0 0,-5-1 0,2 0 0,19 0 0,26-2 0,8 2 0,-2-1 0,-19 2 0,-24 0 0,-9 0 0,0 0 0,7 1 0,11 0 0,2 0 0,-11 0 0,-14-1 0,-17 0 0,-8 0 0,0 0 0,2 0 0,3-1 0,-1 0 0,-4 0 0,-2 1 0,-3 0 0</inkml:trace>
+</inkml:ink>
+</file>
+
+<file path=ppt/ink/ink15.xml><?xml version="1.0" encoding="utf-8"?>
+<inkml:ink xmlns:inkml="http://www.w3.org/2003/InkML">
+  <inkml:definitions>
+    <inkml:context xml:id="ctx0">
+      <inkml:inkSource xml:id="inkSrc0">
+        <inkml:traceFormat>
+          <inkml:channel name="X" type="integer" min="-2.14748E9" max="2.14748E9" units="cm"/>
+          <inkml:channel name="Y" type="integer" min="-2.14748E9" max="2.14748E9" units="cm"/>
+          <inkml:channel name="F" type="integer" max="32767" units="dev"/>
+        </inkml:traceFormat>
+        <inkml:channelProperties>
+          <inkml:channelProperty channel="X" name="resolution" value="1000" units="1/cm"/>
+          <inkml:channelProperty channel="Y" name="resolution" value="1000" units="1/cm"/>
+          <inkml:channelProperty channel="F" name="resolution" value="0" units="1/dev"/>
+        </inkml:channelProperties>
+      </inkml:inkSource>
+      <inkml:timestamp xml:id="ts0" timeString="2023-05-24T13:48:42.416"/>
+    </inkml:context>
+    <inkml:brush xml:id="br0">
+      <inkml:brushProperty name="width" value="0.05" units="cm"/>
+      <inkml:brushProperty name="height" value="0.05" units="cm"/>
+    </inkml:brush>
+  </inkml:definitions>
+  <inkml:trace contextRef="#ctx0" brushRef="#br0">0 1267 24575,'11'-9'0,"1"-10"0,4-25 0,7-41 0,-8 22 0,0-5 0,0-2 0,0-2 0,-1-5 0,-1-1 0,-2 7 0,-2 1 0,-3 8 0,-1 1 0,-1-1 0,-2 3 0,1-40 0,1 20 0,2 21 0,0 22 0,-1 19 0,-3 10 0,1 6 0,4 6 0,6 4 0,4 2 0,-1-2 0,-1 0 0,3 3 0,6 9 0,12 11 0,9 10 0,0 3 0,-6 1 0,-3-2 0,-3 1 0,-1 1 0,-2 0 0,-8 0 0,-4 0 0,-2 5 0,1 5 0,1-1 0,-1-3 0,0-6 0,2-4 0,-2-5 0,-3-5 0,-4-1 0,1 3 0,0 7 0,3 4 0,4 3 0,2-3 0,-1-6 0,-4-9 0,-5-10 0,-2-7 0,-5-5 0,0-3 0,-2-1 0,0 0 0,1-2 0,-1-1 0,0-2 0</inkml:trace>
+</inkml:ink>
+</file>
+
+<file path=ppt/ink/ink16.xml><?xml version="1.0" encoding="utf-8"?>
+<inkml:ink xmlns:inkml="http://www.w3.org/2003/InkML">
+  <inkml:definitions>
+    <inkml:context xml:id="ctx0">
+      <inkml:inkSource xml:id="inkSrc0">
+        <inkml:traceFormat>
+          <inkml:channel name="X" type="integer" min="-2.14748E9" max="2.14748E9" units="cm"/>
+          <inkml:channel name="Y" type="integer" min="-2.14748E9" max="2.14748E9" units="cm"/>
+          <inkml:channel name="F" type="integer" max="32767" units="dev"/>
+        </inkml:traceFormat>
+        <inkml:channelProperties>
+          <inkml:channelProperty channel="X" name="resolution" value="1000" units="1/cm"/>
+          <inkml:channelProperty channel="Y" name="resolution" value="1000" units="1/cm"/>
+          <inkml:channelProperty channel="F" name="resolution" value="0" units="1/dev"/>
+        </inkml:channelProperties>
+      </inkml:inkSource>
+      <inkml:timestamp xml:id="ts0" timeString="2023-05-24T13:48:43.351"/>
+    </inkml:context>
+    <inkml:brush xml:id="br0">
+      <inkml:brushProperty name="width" value="0.05" units="cm"/>
+      <inkml:brushProperty name="height" value="0.05" units="cm"/>
+    </inkml:brush>
+  </inkml:definitions>
+  <inkml:trace contextRef="#ctx0" brushRef="#br0">0 1 24575,'14'0'0,"13"0"0,26 0 0,24 0 0,13 0 0,-3 0 0,-19 0 0,-24 1 0,-18 0 0,-7 0 0,1-1 0,-5 0 0,1 0 0,-11 1 0,3 1 0,-3-1 0,0 0 0</inkml:trace>
+</inkml:ink>
+</file>
+
+<file path=ppt/ink/ink17.xml><?xml version="1.0" encoding="utf-8"?>
+<inkml:ink xmlns:inkml="http://www.w3.org/2003/InkML">
+  <inkml:definitions>
+    <inkml:context xml:id="ctx0">
+      <inkml:inkSource xml:id="inkSrc0">
+        <inkml:traceFormat>
+          <inkml:channel name="X" type="integer" min="-2.14748E9" max="2.14748E9" units="cm"/>
+          <inkml:channel name="Y" type="integer" min="-2.14748E9" max="2.14748E9" units="cm"/>
+          <inkml:channel name="F" type="integer" max="32767" units="dev"/>
+        </inkml:traceFormat>
+        <inkml:channelProperties>
+          <inkml:channelProperty channel="X" name="resolution" value="1000" units="1/cm"/>
+          <inkml:channelProperty channel="Y" name="resolution" value="1000" units="1/cm"/>
+          <inkml:channelProperty channel="F" name="resolution" value="0" units="1/dev"/>
+        </inkml:channelProperties>
+      </inkml:inkSource>
+      <inkml:timestamp xml:id="ts0" timeString="2023-05-24T13:48:44.050"/>
+    </inkml:context>
+    <inkml:brush xml:id="br0">
+      <inkml:brushProperty name="width" value="0.05" units="cm"/>
+      <inkml:brushProperty name="height" value="0.05" units="cm"/>
+    </inkml:brush>
+  </inkml:definitions>
+  <inkml:trace contextRef="#ctx0" brushRef="#br0">4 1 24575,'0'8'0,"0"9"0,0 11 0,0 17 0,0 10 0,-1-2 0,0-8 0,0-13 0,1-9 0,1-6 0,2-6 0,0-4 0,1-4 0,-2-4 0,-2-10 0,0 6 0,0-4 0</inkml:trace>
+</inkml:ink>
+</file>
+
+<file path=ppt/ink/ink18.xml><?xml version="1.0" encoding="utf-8"?>
+<inkml:ink xmlns:inkml="http://www.w3.org/2003/InkML">
+  <inkml:definitions>
+    <inkml:context xml:id="ctx0">
+      <inkml:inkSource xml:id="inkSrc0">
+        <inkml:traceFormat>
+          <inkml:channel name="X" type="integer" min="-2.14748E9" max="2.14748E9" units="cm"/>
+          <inkml:channel name="Y" type="integer" min="-2.14748E9" max="2.14748E9" units="cm"/>
+          <inkml:channel name="F" type="integer" max="32767" units="dev"/>
+        </inkml:traceFormat>
+        <inkml:channelProperties>
+          <inkml:channelProperty channel="X" name="resolution" value="1000" units="1/cm"/>
+          <inkml:channelProperty channel="Y" name="resolution" value="1000" units="1/cm"/>
+          <inkml:channelProperty channel="F" name="resolution" value="0" units="1/dev"/>
+        </inkml:channelProperties>
+      </inkml:inkSource>
+      <inkml:timestamp xml:id="ts0" timeString="2023-05-24T13:48:44.385"/>
+    </inkml:context>
+    <inkml:brush xml:id="br0">
+      <inkml:brushProperty name="width" value="0.05" units="cm"/>
+      <inkml:brushProperty name="height" value="0.05" units="cm"/>
+    </inkml:brush>
+  </inkml:definitions>
+  <inkml:trace contextRef="#ctx0" brushRef="#br0">0 1 24575,'4'0'0,"-1"0"0</inkml:trace>
+</inkml:ink>
+</file>
+
+<file path=ppt/ink/ink19.xml><?xml version="1.0" encoding="utf-8"?>
+<inkml:ink xmlns:inkml="http://www.w3.org/2003/InkML">
+  <inkml:definitions>
+    <inkml:context xml:id="ctx0">
+      <inkml:inkSource xml:id="inkSrc0">
+        <inkml:traceFormat>
+          <inkml:channel name="X" type="integer" min="-2.14748E9" max="2.14748E9" units="cm"/>
+          <inkml:channel name="Y" type="integer" min="-2.14748E9" max="2.14748E9" units="cm"/>
+          <inkml:channel name="F" type="integer" max="32767" units="dev"/>
+        </inkml:traceFormat>
+        <inkml:channelProperties>
+          <inkml:channelProperty channel="X" name="resolution" value="1000" units="1/cm"/>
+          <inkml:channelProperty channel="Y" name="resolution" value="1000" units="1/cm"/>
+          <inkml:channelProperty channel="F" name="resolution" value="0" units="1/dev"/>
+        </inkml:channelProperties>
+      </inkml:inkSource>
+      <inkml:timestamp xml:id="ts0" timeString="2023-05-24T13:48:50.653"/>
+    </inkml:context>
+    <inkml:brush xml:id="br0">
+      <inkml:brushProperty name="width" value="0.05" units="cm"/>
+      <inkml:brushProperty name="height" value="0.05" units="cm"/>
+      <inkml:brushProperty name="color" value="#AB008B"/>
+    </inkml:brush>
+  </inkml:definitions>
+  <inkml:trace contextRef="#ctx0" brushRef="#br0">706 4 24575,'-19'-1'0,"-1"0"0,-8 0 0,-8 1 0,-7 0 0,-6 2 0,-3 3 0,3 2 0,4 3 0,8 1 0,3 5 0,2 2 0,1 5 0,-1 2 0,4 2 0,3-1 0,5-2 0,4-2 0,2 0 0,1 1 0,1 4 0,-1 4 0,0 3 0,1 1 0,1-3 0,4-3 0,2-3 0,1 0 0,1 2 0,1 0 0,1 2 0,1-1 0,2 1 0,3 0 0,5 2 0,7 3 0,7 0 0,5 1 0,2-6 0,-1-7 0,-1-5 0,-4-6 0,-1-1 0,1-3 0,4 0 0,2-4 0,4-2 0,7-1 0,2-1 0,-1-1 0,-7 0 0,-11-1 0,-5 0 0,1-1 0,1-1 0,-1 1-6784,-5 0 6784,-6 2 0,-6 0 0,-2 1 0,-1 0 0,-1 0 0</inkml:trace>
+</inkml:ink>
+</file>
+
+<file path=ppt/ink/ink2.xml><?xml version="1.0" encoding="utf-8"?>
+<inkml:ink xmlns:inkml="http://www.w3.org/2003/InkML">
+  <inkml:definitions>
+    <inkml:context xml:id="ctx0">
+      <inkml:inkSource xml:id="inkSrc0">
+        <inkml:traceFormat>
+          <inkml:channel name="X" type="integer" min="-2.14748E9" max="2.14748E9" units="cm"/>
+          <inkml:channel name="Y" type="integer" min="-2.14748E9" max="2.14748E9" units="cm"/>
+          <inkml:channel name="F" type="integer" max="32767" units="dev"/>
+        </inkml:traceFormat>
+        <inkml:channelProperties>
+          <inkml:channelProperty channel="X" name="resolution" value="1000" units="1/cm"/>
+          <inkml:channelProperty channel="Y" name="resolution" value="1000" units="1/cm"/>
+          <inkml:channelProperty channel="F" name="resolution" value="0" units="1/dev"/>
+        </inkml:channelProperties>
+      </inkml:inkSource>
+      <inkml:timestamp xml:id="ts0" timeString="2023-05-24T13:48:16.059"/>
+    </inkml:context>
+    <inkml:brush xml:id="br0">
+      <inkml:brushProperty name="width" value="0.05" units="cm"/>
+      <inkml:brushProperty name="height" value="0.05" units="cm"/>
+      <inkml:brushProperty name="color" value="#008C3A"/>
+    </inkml:brush>
+  </inkml:definitions>
+  <inkml:trace contextRef="#ctx0" brushRef="#br0">2668 118 24575,'-15'0'0,"-3"1"0,-10 0 0,-7-1 0,-12-2 0,-32-2 0,15 2 0,-9 0 0,6 0 0,-5 1 0,-2-1-366,-14 1 0,-2-1 0,-2 1 366,-3 1 0,-1-1 0,1 1 0,5 1 0,0 0 0,3 0 0,9 2 0,2 0 0,1 1 0,-24 3 0,3 3 0,11 1 0,5 3 0,9 0 0,4 2 0,9 1 0,3 2 0,5 0 0,3 3 0,-36 24 1098,13 6-1098,14 8 0,13 6 0,12-1 0,9 4 0,7 3 0,6 3 0,5 6 0,2 2 0,2 1 0,0 2 0,1-5 0,0-6 0,1-3 0,0-2 0,0 1 0,2 1 0,4-3 0,3-3 0,9-1 0,10-2 0,12 2 0,13 4 0,9 3 0,4 0 0,-1-5 0,-6-12 0,-3-14 0,8-13 0,22-9 0,-31-12 0,5-1 0,16-1 0,6-1 0,-19-1 0,3 0 0,1 0-147,5-1 0,2 0 0,-2 0 147,0 0 0,-2 0 0,-1-1 0,22 2 0,-6-1 0,-17-1 0,-5 0 0,32 0 0,-17 0 0,1-2 0,4-1 0,4-1 441,-4-1-441,-8 0 0,5 1 0,9 1 0,-41 2 0,2 0 0,2 0 0,1 0 0,-1-1 0,-1 0 0,39-2 0,-20-1 0,-23 0 0,-14 4 0,0 3 0,11 3 0,19 8 0,15 8 0,-33-5 0,2 2 0,7 5 0,1 3 0,3 4 0,1 3 0,-1 1 0,-1 1 0,-9-1 0,-4 0 0,18 28 0,-28-9 0,-14 3 0,-2 6 0,-1 8 0,0 0 0,-7-7 0,-5-7 0,-3-5 0,3 2 0,5 1 0,1-7 0,-2-8 0,-4-10 0,-5-7 0,-1-1 0,-1 2 0,0-2 0,0-3 0,0-8 0,0-1 0,4 9 0,12 16 0,16 14 0,20 7 0,19 1 0,-29-29 0,3-2 0,3-2 0,3-2 0,3-1 0,3-5 0,1-3 0,2-3 0,7-3 0,3-3 0,12-2 0,5 0 0,-17-2 0,2 1 0,3 0-255,7-1 0,1 1 0,1 0 255,-1-1 0,0 1 0,-2-2 0,-6-1 0,-1-1 0,-4-2 0,11-3 0,-4-4 0,-3-7 0,0-4 0,0-2 0,0-3 0,0 2 0,-2-2 0,2 1 0,-3-2 0,-13 2 0,-5-4 0,-2-13 0,-5-7 382,-5-9 1,-5-5-383,-5-1 0,-7-1 0,-9 4 0,-7 1 0,-15-34 0,-12 16 0,-8-1 0,-5 0 0,12 35 0,-2 0 0,-3-6 0,-3 0 0,-6-3 0,-2 0 0,-3 1 0,-2 3 0,-1 5 0,-1 3 0,2 5 0,-1 4 0,-31-21 0,13 14 0,9 10 0,3 5 0,-6-3 0,-27-7 0,21 13 0,-7 0 0,-25-4 0,-9 1-394,22 9 1,-4 1 0,-2 2 393,-8 0 0,-2 2 0,-1 2 0,-1 1 0,0 2 0,0 1 0,3 1 0,1 2 0,1 0 0,5 0 0,1 1 0,2-1-7,9 2 0,3-1 1,2 1 6,-16 0 0,6 0 0,21 1 0,5 1 0,-24 0 0,15 0 0,0 0 1178,-4-1-1178,1-2 22,9-1-22,14-1 0,10-1 0,6-2 0,-1-4 0,-3-4 0,-4-10 0,-8-11 0,-5-8 0,0-7 0,8 0 0,12-2 0,7-12 0,2-16 0,1 0 0,0-6 0,7 24 0,2-15 0,5 9 0,1-17 0,2 7 0,2 2 0,0 0 0,-3-2 0,-5-4 0,-7 0 0,-7 7 0,-4 8 0,-4 11 0,-1 12 0,-1 12 0,-4 6 0,-12 3 0,-11-2 0,-10 2 0,-6 2 0,6 7 0,6 4 0,15 6 0,16 2 0,4 6 0,-3 6 0,12-4 0,-3 3 0</inkml:trace>
+</inkml:ink>
+</file>
+
+<file path=ppt/ink/ink20.xml><?xml version="1.0" encoding="utf-8"?>
+<inkml:ink xmlns:inkml="http://www.w3.org/2003/InkML">
+  <inkml:definitions>
+    <inkml:context xml:id="ctx0">
+      <inkml:inkSource xml:id="inkSrc0">
+        <inkml:traceFormat>
+          <inkml:channel name="X" type="integer" min="-2.14748E9" max="2.14748E9" units="cm"/>
+          <inkml:channel name="Y" type="integer" min="-2.14748E9" max="2.14748E9" units="cm"/>
+          <inkml:channel name="F" type="integer" max="32767" units="dev"/>
+        </inkml:traceFormat>
+        <inkml:channelProperties>
+          <inkml:channelProperty channel="X" name="resolution" value="1000" units="1/cm"/>
+          <inkml:channelProperty channel="Y" name="resolution" value="1000" units="1/cm"/>
+          <inkml:channelProperty channel="F" name="resolution" value="0" units="1/dev"/>
+        </inkml:channelProperties>
+      </inkml:inkSource>
+      <inkml:timestamp xml:id="ts0" timeString="2023-05-24T13:48:51.869"/>
+    </inkml:context>
+    <inkml:brush xml:id="br0">
+      <inkml:brushProperty name="width" value="0.05" units="cm"/>
+      <inkml:brushProperty name="height" value="0.05" units="cm"/>
+      <inkml:brushProperty name="color" value="#AB008B"/>
+    </inkml:brush>
+  </inkml:definitions>
+  <inkml:trace contextRef="#ctx0" brushRef="#br0">0 0 24575,'27'0'0,"14"2"0,22 0 0,18 2 0,3-1 0,-12 0 0,-25-2 0,-25 0 0,-16-1 0,-7 0 0</inkml:trace>
+</inkml:ink>
+</file>
+
+<file path=ppt/ink/ink21.xml><?xml version="1.0" encoding="utf-8"?>
+<inkml:ink xmlns:inkml="http://www.w3.org/2003/InkML">
+  <inkml:definitions>
+    <inkml:context xml:id="ctx0">
+      <inkml:inkSource xml:id="inkSrc0">
+        <inkml:traceFormat>
+          <inkml:channel name="X" type="integer" min="-2.14748E9" max="2.14748E9" units="cm"/>
+          <inkml:channel name="Y" type="integer" min="-2.14748E9" max="2.14748E9" units="cm"/>
+          <inkml:channel name="F" type="integer" max="32767" units="dev"/>
+        </inkml:traceFormat>
+        <inkml:channelProperties>
+          <inkml:channelProperty channel="X" name="resolution" value="1000" units="1/cm"/>
+          <inkml:channelProperty channel="Y" name="resolution" value="1000" units="1/cm"/>
+          <inkml:channelProperty channel="F" name="resolution" value="0" units="1/dev"/>
+        </inkml:channelProperties>
+      </inkml:inkSource>
+      <inkml:timestamp xml:id="ts0" timeString="2023-05-24T13:48:52.970"/>
+    </inkml:context>
+    <inkml:brush xml:id="br0">
+      <inkml:brushProperty name="width" value="0.05" units="cm"/>
+      <inkml:brushProperty name="height" value="0.05" units="cm"/>
+      <inkml:brushProperty name="color" value="#AB008B"/>
+    </inkml:brush>
+  </inkml:definitions>
+  <inkml:trace contextRef="#ctx0" brushRef="#br0">5 0 24575,'9'0'0,"2"0"0,9 0 0,9 0 0,3 0 0,-3 0 0,-10 0 0,-12 0 0,-8 1 0,-10 3 0,-7 4 0,-6 4 0,-3 7 0,1 6 0,4 2 0,6 1 0,6-4 0,6-4 0,3-1 0,2-2 0,2 0 0,1-1 0,1-1 0,-1-3 0,1-3 0,0-2 0,3-2 0,3-2 0,3 0 0,2-1 0,3-1 0,-1 0 0,-1-2 0,-2-1 0,-2 0 0,0 1 0,2-1 0,-6 1 0,-2 0 0</inkml:trace>
+</inkml:ink>
+</file>
+
+<file path=ppt/ink/ink22.xml><?xml version="1.0" encoding="utf-8"?>
+<inkml:ink xmlns:inkml="http://www.w3.org/2003/InkML">
+  <inkml:definitions>
+    <inkml:context xml:id="ctx0">
+      <inkml:inkSource xml:id="inkSrc0">
+        <inkml:traceFormat>
+          <inkml:channel name="X" type="integer" min="-2.14748E9" max="2.14748E9" units="cm"/>
+          <inkml:channel name="Y" type="integer" min="-2.14748E9" max="2.14748E9" units="cm"/>
+          <inkml:channel name="F" type="integer" max="32767" units="dev"/>
+        </inkml:traceFormat>
+        <inkml:channelProperties>
+          <inkml:channelProperty channel="X" name="resolution" value="1000" units="1/cm"/>
+          <inkml:channelProperty channel="Y" name="resolution" value="1000" units="1/cm"/>
+          <inkml:channelProperty channel="F" name="resolution" value="0" units="1/dev"/>
+        </inkml:channelProperties>
+      </inkml:inkSource>
+      <inkml:timestamp xml:id="ts0" timeString="2023-05-24T13:48:54.204"/>
+    </inkml:context>
+    <inkml:brush xml:id="br0">
+      <inkml:brushProperty name="width" value="0.05" units="cm"/>
+      <inkml:brushProperty name="height" value="0.05" units="cm"/>
+      <inkml:brushProperty name="color" value="#AB008B"/>
+    </inkml:brush>
+  </inkml:definitions>
+  <inkml:trace contextRef="#ctx0" brushRef="#br0">42 49 24575,'1'8'0,"1"0"0,3-2 0,4-1 0,6-4 0,4-3 0,2-2 0,-2-1 0,-3-1 0,-6-1 0,-4-1 0,-3-3 0,-1 0 0,-1 2 0,-3 4 0,0 2 0,-1 0 0,-2 2 0,-3 0 0,-4 1 0,-3 0 0,-3 3 0,-1 5 0,0 5 0,3 6 0,2 5 0,3 1 0,1 1 0,3 1 0,2-2 0,2-5 0,2-3 0,0-3 0,3-3 0,0-1 0,2-2 0,-1-3 0,2-2 0,0-1 0,1 2 0,2 2 0,-1 0 0,-2-1 0,-2-3 0</inkml:trace>
+</inkml:ink>
+</file>
+
+<file path=ppt/ink/ink23.xml><?xml version="1.0" encoding="utf-8"?>
+<inkml:ink xmlns:inkml="http://www.w3.org/2003/InkML">
+  <inkml:definitions>
+    <inkml:context xml:id="ctx0">
+      <inkml:inkSource xml:id="inkSrc0">
+        <inkml:traceFormat>
+          <inkml:channel name="X" type="integer" min="-2.14748E9" max="2.14748E9" units="cm"/>
+          <inkml:channel name="Y" type="integer" min="-2.14748E9" max="2.14748E9" units="cm"/>
+          <inkml:channel name="F" type="integer" max="32767" units="dev"/>
+        </inkml:traceFormat>
+        <inkml:channelProperties>
+          <inkml:channelProperty channel="X" name="resolution" value="1000" units="1/cm"/>
+          <inkml:channelProperty channel="Y" name="resolution" value="1000" units="1/cm"/>
+          <inkml:channelProperty channel="F" name="resolution" value="0" units="1/dev"/>
+        </inkml:channelProperties>
+      </inkml:inkSource>
+      <inkml:timestamp xml:id="ts0" timeString="2023-05-24T13:48:55.220"/>
+    </inkml:context>
+    <inkml:brush xml:id="br0">
+      <inkml:brushProperty name="width" value="0.05" units="cm"/>
+      <inkml:brushProperty name="height" value="0.05" units="cm"/>
+      <inkml:brushProperty name="color" value="#AB008B"/>
+    </inkml:brush>
+  </inkml:definitions>
+  <inkml:trace contextRef="#ctx0" brushRef="#br0">137 21 24575,'-2'-4'0,"-1"0"0,-3 0 0,-2 0 0,-2 2 0,1 0 0,1 1 0,1 3 0,1 4 0,1 9 0,1 14 0,1 14 0,2 8 0,-1 2 0,-2-1 0,-1-5 0,1-5 0,1-5 0,2-6 0,1-1 0,0-1 0,0 0 0,0 0 0,0-3 0,0-3 0,0-6 0,0-6 0,-1-4 0,-4-4 0,-5-2 0,-1-1 0,3 0 0,1-3 0,6 2 0,-1-2 0</inkml:trace>
+</inkml:ink>
+</file>
+
+<file path=ppt/ink/ink24.xml><?xml version="1.0" encoding="utf-8"?>
+<inkml:ink xmlns:inkml="http://www.w3.org/2003/InkML">
+  <inkml:definitions>
+    <inkml:context xml:id="ctx0">
+      <inkml:inkSource xml:id="inkSrc0">
+        <inkml:traceFormat>
+          <inkml:channel name="X" type="integer" min="-2.14748E9" max="2.14748E9" units="cm"/>
+          <inkml:channel name="Y" type="integer" min="-2.14748E9" max="2.14748E9" units="cm"/>
+          <inkml:channel name="F" type="integer" max="32767" units="dev"/>
+        </inkml:traceFormat>
+        <inkml:channelProperties>
+          <inkml:channelProperty channel="X" name="resolution" value="1000" units="1/cm"/>
+          <inkml:channelProperty channel="Y" name="resolution" value="1000" units="1/cm"/>
+          <inkml:channelProperty channel="F" name="resolution" value="0" units="1/dev"/>
+        </inkml:channelProperties>
+      </inkml:inkSource>
+      <inkml:timestamp xml:id="ts0" timeString="2023-05-24T13:48:55.804"/>
+    </inkml:context>
+    <inkml:brush xml:id="br0">
+      <inkml:brushProperty name="width" value="0.05" units="cm"/>
+      <inkml:brushProperty name="height" value="0.05" units="cm"/>
+      <inkml:brushProperty name="color" value="#AB008B"/>
+    </inkml:brush>
+  </inkml:definitions>
+  <inkml:trace contextRef="#ctx0" brushRef="#br0">0 13 24575,'25'0'0,"13"0"0,13-2 0,3 0 0,-10-1 0,-16 0 0,-17 1 0,-7 1 0</inkml:trace>
+</inkml:ink>
+</file>
+
+<file path=ppt/ink/ink25.xml><?xml version="1.0" encoding="utf-8"?>
+<inkml:ink xmlns:inkml="http://www.w3.org/2003/InkML">
+  <inkml:definitions>
+    <inkml:context xml:id="ctx0">
+      <inkml:inkSource xml:id="inkSrc0">
+        <inkml:traceFormat>
+          <inkml:channel name="X" type="integer" min="-2.14748E9" max="2.14748E9" units="cm"/>
+          <inkml:channel name="Y" type="integer" min="-2.14748E9" max="2.14748E9" units="cm"/>
+          <inkml:channel name="F" type="integer" max="32767" units="dev"/>
+        </inkml:traceFormat>
+        <inkml:channelProperties>
+          <inkml:channelProperty channel="X" name="resolution" value="1000" units="1/cm"/>
+          <inkml:channelProperty channel="Y" name="resolution" value="1000" units="1/cm"/>
+          <inkml:channelProperty channel="F" name="resolution" value="0" units="1/dev"/>
+        </inkml:channelProperties>
+      </inkml:inkSource>
+      <inkml:timestamp xml:id="ts0" timeString="2023-05-24T13:48:57.104"/>
+    </inkml:context>
+    <inkml:brush xml:id="br0">
+      <inkml:brushProperty name="width" value="0.05" units="cm"/>
+      <inkml:brushProperty name="height" value="0.05" units="cm"/>
+      <inkml:brushProperty name="color" value="#AB008B"/>
+    </inkml:brush>
+  </inkml:definitions>
+  <inkml:trace contextRef="#ctx0" brushRef="#br0">80 1 24575,'-9'2'0,"-3"1"0,-4 4 0,-1 8 0,4 9 0,4 5 0,5 0 0,5-6 0,2-9 0,4-4 0,5-2 0,7 0 0,9 1 0,4-3 0,-1-1 0,-4-2 0,-6 1 0,-5 4 0,-6 8 0,-5 10 0,-7 10 0,-7 4 0,-8-5 0,-9-9 0,-3-11 0,2-8 0,6-4 0,7-2 0,5-1 0,2 0 0,2 0 0,5-1 0,2 0 0</inkml:trace>
+</inkml:ink>
+</file>
+
+<file path=ppt/ink/ink26.xml><?xml version="1.0" encoding="utf-8"?>
+<inkml:ink xmlns:inkml="http://www.w3.org/2003/InkML">
+  <inkml:definitions>
+    <inkml:context xml:id="ctx0">
+      <inkml:inkSource xml:id="inkSrc0">
+        <inkml:traceFormat>
+          <inkml:channel name="X" type="integer" min="-2.14748E9" max="2.14748E9" units="cm"/>
+          <inkml:channel name="Y" type="integer" min="-2.14748E9" max="2.14748E9" units="cm"/>
+          <inkml:channel name="F" type="integer" max="32767" units="dev"/>
+        </inkml:traceFormat>
+        <inkml:channelProperties>
+          <inkml:channelProperty channel="X" name="resolution" value="1000" units="1/cm"/>
+          <inkml:channelProperty channel="Y" name="resolution" value="1000" units="1/cm"/>
+          <inkml:channelProperty channel="F" name="resolution" value="0" units="1/dev"/>
+        </inkml:channelProperties>
+      </inkml:inkSource>
+      <inkml:timestamp xml:id="ts0" timeString="2023-05-24T13:48:57.922"/>
+    </inkml:context>
+    <inkml:brush xml:id="br0">
+      <inkml:brushProperty name="width" value="0.05" units="cm"/>
+      <inkml:brushProperty name="height" value="0.05" units="cm"/>
+      <inkml:brushProperty name="color" value="#AB008B"/>
+    </inkml:brush>
+  </inkml:definitions>
+  <inkml:trace contextRef="#ctx0" brushRef="#br0">1 507 24575,'5'-21'0,"1"-11"0,5-21 0,2-9 0,1-5 0,6 0 0,3 4 0,2 4 0,-1 14 0,-9 17 0,-7 19 0,-3 17 0,2 22 0,5 25 0,3 20 0,-1 6 0,-5-7 0,-5-14 0,-2-16 0,0-10 0,-1-9 0,0-5 0,-1-3 0,0-2 0,0-4 0,-1-4 0,-1-8 0,-5-4 0,4 2 0,-2-3 0</inkml:trace>
+</inkml:ink>
+</file>
+
+<file path=ppt/ink/ink27.xml><?xml version="1.0" encoding="utf-8"?>
+<inkml:ink xmlns:inkml="http://www.w3.org/2003/InkML">
+  <inkml:definitions>
+    <inkml:context xml:id="ctx0">
+      <inkml:inkSource xml:id="inkSrc0">
+        <inkml:traceFormat>
+          <inkml:channel name="X" type="integer" min="-2.14748E9" max="2.14748E9" units="cm"/>
+          <inkml:channel name="Y" type="integer" min="-2.14748E9" max="2.14748E9" units="cm"/>
+          <inkml:channel name="F" type="integer" max="32767" units="dev"/>
+        </inkml:traceFormat>
+        <inkml:channelProperties>
+          <inkml:channelProperty channel="X" name="resolution" value="1000" units="1/cm"/>
+          <inkml:channelProperty channel="Y" name="resolution" value="1000" units="1/cm"/>
+          <inkml:channelProperty channel="F" name="resolution" value="0" units="1/dev"/>
+        </inkml:channelProperties>
+      </inkml:inkSource>
+      <inkml:timestamp xml:id="ts0" timeString="2023-05-24T13:48:58.338"/>
+    </inkml:context>
+    <inkml:brush xml:id="br0">
+      <inkml:brushProperty name="width" value="0.05" units="cm"/>
+      <inkml:brushProperty name="height" value="0.05" units="cm"/>
+      <inkml:brushProperty name="color" value="#AB008B"/>
+    </inkml:brush>
+  </inkml:definitions>
+  <inkml:trace contextRef="#ctx0" brushRef="#br0">1 11 24575,'10'-2'0,"1"0"0,2 0 0,-2 1 0,1 0 0,1 0 0,7 0 0,4 1 0,-9 0 0,-2 0 0</inkml:trace>
+</inkml:ink>
+</file>
+
+<file path=ppt/ink/ink28.xml><?xml version="1.0" encoding="utf-8"?>
+<inkml:ink xmlns:inkml="http://www.w3.org/2003/InkML">
+  <inkml:definitions>
+    <inkml:context xml:id="ctx0">
+      <inkml:inkSource xml:id="inkSrc0">
+        <inkml:traceFormat>
+          <inkml:channel name="X" type="integer" min="-2.14748E9" max="2.14748E9" units="cm"/>
+          <inkml:channel name="Y" type="integer" min="-2.14748E9" max="2.14748E9" units="cm"/>
+          <inkml:channel name="F" type="integer" max="32767" units="dev"/>
+        </inkml:traceFormat>
+        <inkml:channelProperties>
+          <inkml:channelProperty channel="X" name="resolution" value="1000" units="1/cm"/>
+          <inkml:channelProperty channel="Y" name="resolution" value="1000" units="1/cm"/>
+          <inkml:channelProperty channel="F" name="resolution" value="0" units="1/dev"/>
+        </inkml:channelProperties>
+      </inkml:inkSource>
+      <inkml:timestamp xml:id="ts0" timeString="2023-05-24T13:48:59.004"/>
+    </inkml:context>
+    <inkml:brush xml:id="br0">
+      <inkml:brushProperty name="width" value="0.05" units="cm"/>
+      <inkml:brushProperty name="height" value="0.05" units="cm"/>
+      <inkml:brushProperty name="color" value="#AB008B"/>
+    </inkml:brush>
+  </inkml:definitions>
+  <inkml:trace contextRef="#ctx0" brushRef="#br0">48 0 24575,'-6'35'0,"1"-3"0,0 4 0,1-7 0,0-1 0,0 2 0,0 5 0,-1-1 0,1-5 0,1-8 0,2-12 0,0-4 0,0-5 0,0 0 0</inkml:trace>
+</inkml:ink>
+</file>
+
+<file path=ppt/ink/ink29.xml><?xml version="1.0" encoding="utf-8"?>
+<inkml:ink xmlns:inkml="http://www.w3.org/2003/InkML">
+  <inkml:definitions>
+    <inkml:context xml:id="ctx0">
+      <inkml:inkSource xml:id="inkSrc0">
+        <inkml:traceFormat>
+          <inkml:channel name="X" type="integer" min="-2.14748E9" max="2.14748E9" units="cm"/>
+          <inkml:channel name="Y" type="integer" min="-2.14748E9" max="2.14748E9" units="cm"/>
+          <inkml:channel name="F" type="integer" max="32767" units="dev"/>
+        </inkml:traceFormat>
+        <inkml:channelProperties>
+          <inkml:channelProperty channel="X" name="resolution" value="1000" units="1/cm"/>
+          <inkml:channelProperty channel="Y" name="resolution" value="1000" units="1/cm"/>
+          <inkml:channelProperty channel="F" name="resolution" value="0" units="1/dev"/>
+        </inkml:channelProperties>
+      </inkml:inkSource>
+      <inkml:timestamp xml:id="ts0" timeString="2023-05-24T13:48:59.539"/>
+    </inkml:context>
+    <inkml:brush xml:id="br0">
+      <inkml:brushProperty name="width" value="0.05" units="cm"/>
+      <inkml:brushProperty name="height" value="0.05" units="cm"/>
+      <inkml:brushProperty name="color" value="#AB008B"/>
+    </inkml:brush>
+  </inkml:definitions>
+  <inkml:trace contextRef="#ctx0" brushRef="#br0">0 180 24575,'4'-10'0,"0"-1"0,0-3 0,1-3 0,1-4 0,1-2 0,0-1 0,-2 3 0,-2 2 0,0 7 0,-3 6 0,-1 4 0,0 3 0,1 0 0</inkml:trace>
+</inkml:ink>
+</file>
+
+<file path=ppt/ink/ink3.xml><?xml version="1.0" encoding="utf-8"?>
+<inkml:ink xmlns:inkml="http://www.w3.org/2003/InkML">
+  <inkml:definitions>
+    <inkml:context xml:id="ctx0">
+      <inkml:inkSource xml:id="inkSrc0">
+        <inkml:traceFormat>
+          <inkml:channel name="X" type="integer" min="-2.14748E9" max="2.14748E9" units="cm"/>
+          <inkml:channel name="Y" type="integer" min="-2.14748E9" max="2.14748E9" units="cm"/>
+          <inkml:channel name="F" type="integer" max="32767" units="dev"/>
+        </inkml:traceFormat>
+        <inkml:channelProperties>
+          <inkml:channelProperty channel="X" name="resolution" value="1000" units="1/cm"/>
+          <inkml:channelProperty channel="Y" name="resolution" value="1000" units="1/cm"/>
+          <inkml:channelProperty channel="F" name="resolution" value="0" units="1/dev"/>
+        </inkml:channelProperties>
+      </inkml:inkSource>
+      <inkml:timestamp xml:id="ts0" timeString="2023-05-24T13:48:26.262"/>
+    </inkml:context>
+    <inkml:brush xml:id="br0">
+      <inkml:brushProperty name="width" value="0.05" units="cm"/>
+      <inkml:brushProperty name="height" value="0.05" units="cm"/>
+      <inkml:brushProperty name="color" value="#008C3A"/>
+    </inkml:brush>
+  </inkml:definitions>
+  <inkml:trace contextRef="#ctx0" brushRef="#br0">1130 16 24575,'-9'0'0,"-3"-1"0,-1 0 0,-5-1 0,-11-2 0,-19 1 0,-17 0 0,-10 1 0,0 2 0,8 1 0,4 0 0,3 2 0,6 1 0,-7 3 0,-2 7 0,0 4 0,-3 10 0,7 5 0,3 5 0,3 4 0,11-1 0,11-2 0,10-2 0,8-5 0,6-1 0,3 0 0,3-2 0,0 0 0,1 0 0,2 0 0,1 1 0,3 1 0,1 2 0,6 1 0,10 2 0,10 1 0,10 2 0,5-2 0,3-1 0,0-4 0,-4-4 0,-5-6 0,-8-5 0,-2-4 0,1-2 0,2-3 0,-1-1 0,1-2 0,5-1 0,7 0 0,5-1 0,1 0 0,-11-2 0,-11 0 0,-10 0 0,-7 0 0,1 0 0,1-1 0,2 0 0,-1 0 0,2 0 0,0 0 0,-4 0 0,-4 0 0,-2 0 0,2 0 0,3-1 0,-1 0 0,-4 0 0,-3 1 0,6 0 0,8-1 0,4 0 0,-1 0 0,-11 1 0,-5-1 0</inkml:trace>
+</inkml:ink>
+</file>
+
+<file path=ppt/ink/ink30.xml><?xml version="1.0" encoding="utf-8"?>
+<inkml:ink xmlns:inkml="http://www.w3.org/2003/InkML">
+  <inkml:definitions>
+    <inkml:context xml:id="ctx0">
+      <inkml:inkSource xml:id="inkSrc0">
+        <inkml:traceFormat>
+          <inkml:channel name="X" type="integer" min="-2.14748E9" max="2.14748E9" units="cm"/>
+          <inkml:channel name="Y" type="integer" min="-2.14748E9" max="2.14748E9" units="cm"/>
+          <inkml:channel name="F" type="integer" max="32767" units="dev"/>
+        </inkml:traceFormat>
+        <inkml:channelProperties>
+          <inkml:channelProperty channel="X" name="resolution" value="1000" units="1/cm"/>
+          <inkml:channelProperty channel="Y" name="resolution" value="1000" units="1/cm"/>
+          <inkml:channelProperty channel="F" name="resolution" value="0" units="1/dev"/>
+        </inkml:channelProperties>
+      </inkml:inkSource>
+      <inkml:timestamp xml:id="ts0" timeString="2023-05-24T13:49:00.188"/>
+    </inkml:context>
+    <inkml:brush xml:id="br0">
+      <inkml:brushProperty name="width" value="0.05" units="cm"/>
+      <inkml:brushProperty name="height" value="0.05" units="cm"/>
+      <inkml:brushProperty name="color" value="#AB008B"/>
+    </inkml:brush>
+  </inkml:definitions>
+  <inkml:trace contextRef="#ctx0" brushRef="#br0">11 3 24575,'-9'0'0,"7"0"0,17 0 0,19 0 0,16 0 0,4 0 0,-14-1 0,-15 0 0,-16 0 0,-11 1 0,-4 1 0</inkml:trace>
+</inkml:ink>
+</file>
+
+<file path=ppt/ink/ink4.xml><?xml version="1.0" encoding="utf-8"?>
+<inkml:ink xmlns:inkml="http://www.w3.org/2003/InkML">
+  <inkml:definitions>
+    <inkml:context xml:id="ctx0">
+      <inkml:inkSource xml:id="inkSrc0">
+        <inkml:traceFormat>
+          <inkml:channel name="X" type="integer" min="-2.14748E9" max="2.14748E9" units="cm"/>
+          <inkml:channel name="Y" type="integer" min="-2.14748E9" max="2.14748E9" units="cm"/>
+          <inkml:channel name="F" type="integer" max="32767" units="dev"/>
+        </inkml:traceFormat>
+        <inkml:channelProperties>
+          <inkml:channelProperty channel="X" name="resolution" value="1000" units="1/cm"/>
+          <inkml:channelProperty channel="Y" name="resolution" value="1000" units="1/cm"/>
+          <inkml:channelProperty channel="F" name="resolution" value="0" units="1/dev"/>
+        </inkml:channelProperties>
+      </inkml:inkSource>
+      <inkml:timestamp xml:id="ts0" timeString="2023-05-24T13:48:27.362"/>
+    </inkml:context>
+    <inkml:brush xml:id="br0">
+      <inkml:brushProperty name="width" value="0.05" units="cm"/>
+      <inkml:brushProperty name="height" value="0.05" units="cm"/>
+      <inkml:brushProperty name="color" value="#008C3A"/>
+    </inkml:brush>
+  </inkml:definitions>
+  <inkml:trace contextRef="#ctx0" brushRef="#br0">1 26 24575,'27'-3'0,"11"-2"0,15-1 0,8 0 0,0 2 0,-8 3 0,-13 0 0,-6 1 0,-1 0 0,3 0 0,5 0 0,-1 0 0,-3 0 0,-5 0 0,-6 0 0,-12 0 0,-5 0 0</inkml:trace>
+</inkml:ink>
+</file>
+
+<file path=ppt/ink/ink5.xml><?xml version="1.0" encoding="utf-8"?>
+<inkml:ink xmlns:inkml="http://www.w3.org/2003/InkML">
+  <inkml:definitions>
+    <inkml:context xml:id="ctx0">
+      <inkml:inkSource xml:id="inkSrc0">
+        <inkml:traceFormat>
+          <inkml:channel name="X" type="integer" min="-2.14748E9" max="2.14748E9" units="cm"/>
+          <inkml:channel name="Y" type="integer" min="-2.14748E9" max="2.14748E9" units="cm"/>
+          <inkml:channel name="F" type="integer" max="32767" units="dev"/>
+        </inkml:traceFormat>
+        <inkml:channelProperties>
+          <inkml:channelProperty channel="X" name="resolution" value="1000" units="1/cm"/>
+          <inkml:channelProperty channel="Y" name="resolution" value="1000" units="1/cm"/>
+          <inkml:channelProperty channel="F" name="resolution" value="0" units="1/dev"/>
+        </inkml:channelProperties>
+      </inkml:inkSource>
+      <inkml:timestamp xml:id="ts0" timeString="2023-05-24T13:48:28.879"/>
+    </inkml:context>
+    <inkml:brush xml:id="br0">
+      <inkml:brushProperty name="width" value="0.05" units="cm"/>
+      <inkml:brushProperty name="height" value="0.05" units="cm"/>
+      <inkml:brushProperty name="color" value="#008C3A"/>
+    </inkml:brush>
+  </inkml:definitions>
+  <inkml:trace contextRef="#ctx0" brushRef="#br0">38 1 24575,'-1'12'0,"0"-3"0,0-1 0,1-3 0,0 7 0,-1 10 0,-1 11 0,-1 7 0,-2 1 0,0-2 0,0-5 0,1-3 0,1-6 0,0-4 0,2-1 0,0-3-6784,0-2 6784,1-5 0,0-5 0,2-3 0,-1-2 0,0-1 0</inkml:trace>
+</inkml:ink>
+</file>
+
+<file path=ppt/ink/ink6.xml><?xml version="1.0" encoding="utf-8"?>
+<inkml:ink xmlns:inkml="http://www.w3.org/2003/InkML">
+  <inkml:definitions>
+    <inkml:context xml:id="ctx0">
+      <inkml:inkSource xml:id="inkSrc0">
+        <inkml:traceFormat>
+          <inkml:channel name="X" type="integer" min="-2.14748E9" max="2.14748E9" units="cm"/>
+          <inkml:channel name="Y" type="integer" min="-2.14748E9" max="2.14748E9" units="cm"/>
+          <inkml:channel name="F" type="integer" max="32767" units="dev"/>
+        </inkml:traceFormat>
+        <inkml:channelProperties>
+          <inkml:channelProperty channel="X" name="resolution" value="1000" units="1/cm"/>
+          <inkml:channelProperty channel="Y" name="resolution" value="1000" units="1/cm"/>
+          <inkml:channelProperty channel="F" name="resolution" value="0" units="1/dev"/>
+        </inkml:channelProperties>
+      </inkml:inkSource>
+      <inkml:timestamp xml:id="ts0" timeString="2023-05-24T13:48:29.546"/>
+    </inkml:context>
+    <inkml:brush xml:id="br0">
+      <inkml:brushProperty name="width" value="0.05" units="cm"/>
+      <inkml:brushProperty name="height" value="0.05" units="cm"/>
+      <inkml:brushProperty name="color" value="#008C3A"/>
+    </inkml:brush>
+  </inkml:definitions>
+  <inkml:trace contextRef="#ctx0" brushRef="#br0">48 1 24575,'-9'1'0,"0"2"0,-4 0 0,4-1 0,2 0 0,6-1 0,2 0 0,0 0 0</inkml:trace>
+</inkml:ink>
+</file>
+
+<file path=ppt/ink/ink7.xml><?xml version="1.0" encoding="utf-8"?>
+<inkml:ink xmlns:inkml="http://www.w3.org/2003/InkML">
+  <inkml:definitions>
+    <inkml:context xml:id="ctx0">
+      <inkml:inkSource xml:id="inkSrc0">
+        <inkml:traceFormat>
+          <inkml:channel name="X" type="integer" min="-2.14748E9" max="2.14748E9" units="cm"/>
+          <inkml:channel name="Y" type="integer" min="-2.14748E9" max="2.14748E9" units="cm"/>
+          <inkml:channel name="F" type="integer" max="32767" units="dev"/>
+        </inkml:traceFormat>
+        <inkml:channelProperties>
+          <inkml:channelProperty channel="X" name="resolution" value="1000" units="1/cm"/>
+          <inkml:channelProperty channel="Y" name="resolution" value="1000" units="1/cm"/>
+          <inkml:channelProperty channel="F" name="resolution" value="0" units="1/dev"/>
+        </inkml:channelProperties>
+      </inkml:inkSource>
+      <inkml:timestamp xml:id="ts0" timeString="2023-05-24T13:48:30.863"/>
+    </inkml:context>
+    <inkml:brush xml:id="br0">
+      <inkml:brushProperty name="width" value="0.05" units="cm"/>
+      <inkml:brushProperty name="height" value="0.05" units="cm"/>
+      <inkml:brushProperty name="color" value="#008C3A"/>
+    </inkml:brush>
+  </inkml:definitions>
+  <inkml:trace contextRef="#ctx0" brushRef="#br0">99 1 24575,'-11'0'0,"-2"0"0,-3 0 0,4 0 0,4 1 0,1 2 0,0 7 0,-2 5 0,0 5 0,4 0 0,4-3 0,7-5 0,6-3 0,6-1 0,7 0 0,8 4 0,6 2 0,0 1 0,-6 1 0,-12-2 0,-11 3 0,-11 1 0,-6 5 0,-8 3 0,-10 2 0,-6-4 0,-3-7 0,7-8 0,10-5 0,6-3 0,5-2 0,-1-2 0,-2-1 0,2-1 0,2 2 0,3 2 0</inkml:trace>
+</inkml:ink>
+</file>
+
+<file path=ppt/ink/ink8.xml><?xml version="1.0" encoding="utf-8"?>
+<inkml:ink xmlns:inkml="http://www.w3.org/2003/InkML">
+  <inkml:definitions>
+    <inkml:context xml:id="ctx0">
+      <inkml:inkSource xml:id="inkSrc0">
+        <inkml:traceFormat>
+          <inkml:channel name="X" type="integer" min="-2.14748E9" max="2.14748E9" units="cm"/>
+          <inkml:channel name="Y" type="integer" min="-2.14748E9" max="2.14748E9" units="cm"/>
+          <inkml:channel name="F" type="integer" max="32767" units="dev"/>
+        </inkml:traceFormat>
+        <inkml:channelProperties>
+          <inkml:channelProperty channel="X" name="resolution" value="1000" units="1/cm"/>
+          <inkml:channelProperty channel="Y" name="resolution" value="1000" units="1/cm"/>
+          <inkml:channelProperty channel="F" name="resolution" value="0" units="1/dev"/>
+        </inkml:channelProperties>
+      </inkml:inkSource>
+      <inkml:timestamp xml:id="ts0" timeString="2023-05-24T13:48:32.163"/>
+    </inkml:context>
+    <inkml:brush xml:id="br0">
+      <inkml:brushProperty name="width" value="0.05" units="cm"/>
+      <inkml:brushProperty name="height" value="0.05" units="cm"/>
+      <inkml:brushProperty name="color" value="#008C3A"/>
+    </inkml:brush>
+  </inkml:definitions>
+  <inkml:trace contextRef="#ctx0" brushRef="#br0">1 358 24575,'2'-9'0,"0"-1"0,-1-5 0,0 1 0,0-1 0,0-3 0,1 0 0,2-1 0,0 0 0,2 1 0,1 0 0,2-3 0,1-2 0,1-1 0,2 2 0,-1 3 0,0 2 0,-1 3 0,-3 2 0,-2 7 0,0 1 0,0 0 0,0-1 0,1-1 0,-3 1 0,0 3 0,2 1 0,3 0 0,-3 1 0,3 2 0,-1 4 0,7 8 0,6 11 0,1 4 0,-2 4 0,-3 2 0,-7-3 0,-2 2 0,-5-4 0,0-2 0,-1-6 0,-1-4 0,1-3 0,-1 0 0,0 0 0,-1-2 0,0-4 0,0-4 0,0-2 0,0-1 0,0-1 0,0 0 0</inkml:trace>
+</inkml:ink>
+</file>
+
+<file path=ppt/ink/ink9.xml><?xml version="1.0" encoding="utf-8"?>
+<inkml:ink xmlns:inkml="http://www.w3.org/2003/InkML">
+  <inkml:definitions>
+    <inkml:context xml:id="ctx0">
+      <inkml:inkSource xml:id="inkSrc0">
+        <inkml:traceFormat>
+          <inkml:channel name="X" type="integer" min="-2.14748E9" max="2.14748E9" units="cm"/>
+          <inkml:channel name="Y" type="integer" min="-2.14748E9" max="2.14748E9" units="cm"/>
+          <inkml:channel name="F" type="integer" max="32767" units="dev"/>
+        </inkml:traceFormat>
+        <inkml:channelProperties>
+          <inkml:channelProperty channel="X" name="resolution" value="1000" units="1/cm"/>
+          <inkml:channelProperty channel="Y" name="resolution" value="1000" units="1/cm"/>
+          <inkml:channelProperty channel="F" name="resolution" value="0" units="1/dev"/>
+        </inkml:channelProperties>
+      </inkml:inkSource>
+      <inkml:timestamp xml:id="ts0" timeString="2023-05-24T13:48:32.763"/>
+    </inkml:context>
+    <inkml:brush xml:id="br0">
+      <inkml:brushProperty name="width" value="0.05" units="cm"/>
+      <inkml:brushProperty name="height" value="0.05" units="cm"/>
+      <inkml:brushProperty name="color" value="#008C3A"/>
+    </inkml:brush>
+  </inkml:definitions>
+  <inkml:trace contextRef="#ctx0" brushRef="#br0">1 14 24575,'12'0'0,"4"-1"0,8 0 0,8-1 0,0 1 0,-2-1 0,-5 0 0,-4 0 0,4 1 0,-9 0 0,8 0 0,-8 1 0,-3 0 0,-4 0 0</inkml:trace>
+</inkml:ink>
+</file>
+
 <file path=ppt/notesMasters/notesMaster1.xml><?xml version="1.0" encoding="utf-8"?>
 <p:notesMaster xmlns:a="http://schemas.openxmlformats.org/drawingml/2006/main" xmlns:r="http://schemas.openxmlformats.org/officeDocument/2006/relationships" xmlns:p="http://schemas.openxmlformats.org/presentationml/2006/main">
   <p:cSld>
@@ -210,7 +1044,7 @@
           <a:p>
             <a:fld id="{8FF49BDC-B5AD-3F4D-AAB5-A50E982BE5CA}" type="datetimeFigureOut">
               <a:rPr lang="en-US" smtClean="0"/>
-              <a:t>5/16/23</a:t>
+              <a:t>5/24/23</a:t>
             </a:fld>
             <a:endParaRPr lang="en-US"/>
           </a:p>
@@ -624,7 +1458,7 @@
           <a:p>
             <a:fld id="{F2F331F2-6115-6342-930B-F105F89E6611}" type="datetimeFigureOut">
               <a:rPr lang="en-US" smtClean="0"/>
-              <a:t>5/16/23</a:t>
+              <a:t>5/24/23</a:t>
             </a:fld>
             <a:endParaRPr lang="en-US"/>
           </a:p>
@@ -822,7 +1656,7 @@
           <a:p>
             <a:fld id="{F2F331F2-6115-6342-930B-F105F89E6611}" type="datetimeFigureOut">
               <a:rPr lang="en-US" smtClean="0"/>
-              <a:t>5/16/23</a:t>
+              <a:t>5/24/23</a:t>
             </a:fld>
             <a:endParaRPr lang="en-US"/>
           </a:p>
@@ -1030,7 +1864,7 @@
           <a:p>
             <a:fld id="{F2F331F2-6115-6342-930B-F105F89E6611}" type="datetimeFigureOut">
               <a:rPr lang="en-US" smtClean="0"/>
-              <a:t>5/16/23</a:t>
+              <a:t>5/24/23</a:t>
             </a:fld>
             <a:endParaRPr lang="en-US"/>
           </a:p>
@@ -1228,7 +2062,7 @@
           <a:p>
             <a:fld id="{F2F331F2-6115-6342-930B-F105F89E6611}" type="datetimeFigureOut">
               <a:rPr lang="en-US" smtClean="0"/>
-              <a:t>5/16/23</a:t>
+              <a:t>5/24/23</a:t>
             </a:fld>
             <a:endParaRPr lang="en-US"/>
           </a:p>
@@ -1503,7 +2337,7 @@
           <a:p>
             <a:fld id="{F2F331F2-6115-6342-930B-F105F89E6611}" type="datetimeFigureOut">
               <a:rPr lang="en-US" smtClean="0"/>
-              <a:t>5/16/23</a:t>
+              <a:t>5/24/23</a:t>
             </a:fld>
             <a:endParaRPr lang="en-US"/>
           </a:p>
@@ -1768,7 +2602,7 @@
           <a:p>
             <a:fld id="{F2F331F2-6115-6342-930B-F105F89E6611}" type="datetimeFigureOut">
               <a:rPr lang="en-US" smtClean="0"/>
-              <a:t>5/16/23</a:t>
+              <a:t>5/24/23</a:t>
             </a:fld>
             <a:endParaRPr lang="en-US"/>
           </a:p>
@@ -2180,7 +3014,7 @@
           <a:p>
             <a:fld id="{F2F331F2-6115-6342-930B-F105F89E6611}" type="datetimeFigureOut">
               <a:rPr lang="en-US" smtClean="0"/>
-              <a:t>5/16/23</a:t>
+              <a:t>5/24/23</a:t>
             </a:fld>
             <a:endParaRPr lang="en-US"/>
           </a:p>
@@ -2321,7 +3155,7 @@
           <a:p>
             <a:fld id="{F2F331F2-6115-6342-930B-F105F89E6611}" type="datetimeFigureOut">
               <a:rPr lang="en-US" smtClean="0"/>
-              <a:t>5/16/23</a:t>
+              <a:t>5/24/23</a:t>
             </a:fld>
             <a:endParaRPr lang="en-US"/>
           </a:p>
@@ -2434,7 +3268,7 @@
           <a:p>
             <a:fld id="{F2F331F2-6115-6342-930B-F105F89E6611}" type="datetimeFigureOut">
               <a:rPr lang="en-US" smtClean="0"/>
-              <a:t>5/16/23</a:t>
+              <a:t>5/24/23</a:t>
             </a:fld>
             <a:endParaRPr lang="en-US"/>
           </a:p>
@@ -2745,7 +3579,7 @@
           <a:p>
             <a:fld id="{F2F331F2-6115-6342-930B-F105F89E6611}" type="datetimeFigureOut">
               <a:rPr lang="en-US" smtClean="0"/>
-              <a:t>5/16/23</a:t>
+              <a:t>5/24/23</a:t>
             </a:fld>
             <a:endParaRPr lang="en-US"/>
           </a:p>
@@ -3033,7 +3867,7 @@
           <a:p>
             <a:fld id="{F2F331F2-6115-6342-930B-F105F89E6611}" type="datetimeFigureOut">
               <a:rPr lang="en-US" smtClean="0"/>
-              <a:t>5/16/23</a:t>
+              <a:t>5/24/23</a:t>
             </a:fld>
             <a:endParaRPr lang="en-US"/>
           </a:p>
@@ -3274,7 +4108,7 @@
           <a:p>
             <a:fld id="{F2F331F2-6115-6342-930B-F105F89E6611}" type="datetimeFigureOut">
               <a:rPr lang="en-US" smtClean="0"/>
-              <a:t>5/16/23</a:t>
+              <a:t>5/24/23</a:t>
             </a:fld>
             <a:endParaRPr lang="en-US"/>
           </a:p>
@@ -3776,6 +4610,131 @@
             </p:nvSpPr>
             <p:spPr>
               <a:xfrm>
+                <a:off x="3118435" y="2249364"/>
+                <a:ext cx="5955129" cy="752782"/>
+              </a:xfrm>
+            </p:spPr>
+            <p:txBody>
+              <a:bodyPr>
+                <a:normAutofit fontScale="90000"/>
+              </a:bodyPr>
+              <a:lstStyle/>
+              <a:p>
+                <a14:m>
+                  <m:oMath xmlns:m="http://schemas.openxmlformats.org/officeDocument/2006/math">
+                    <m:r>
+                      <m:rPr>
+                        <m:sty m:val="p"/>
+                      </m:rPr>
+                      <a:rPr lang="en-US" sz="4000" b="0" i="1" smtClean="0">
+                        <a:latin typeface="Cambria Math" panose="02040503050406030204" pitchFamily="18" charset="0"/>
+                      </a:rPr>
+                      <m:t>ϵ</m:t>
+                    </m:r>
+                  </m:oMath>
+                </a14:m>
+                <a:r>
+                  <a:rPr lang="en-US" sz="4000" dirty="0"/>
+                  <a:t> - EXTINCTION  COEFFICIENT</a:t>
+                </a:r>
+              </a:p>
+            </p:txBody>
+          </p:sp>
+        </mc:Choice>
+        <mc:Fallback xmlns="">
+          <p:sp>
+            <p:nvSpPr>
+              <p:cNvPr id="2" name="Title 1">
+                <a:extLst>
+                  <a:ext uri="{FF2B5EF4-FFF2-40B4-BE49-F238E27FC236}">
+                    <a16:creationId xmlns:a16="http://schemas.microsoft.com/office/drawing/2014/main" id="{553BC310-260C-4BBC-FFDE-C32713BA6ECC}"/>
+                  </a:ext>
+                </a:extLst>
+              </p:cNvPr>
+              <p:cNvSpPr>
+                <a:spLocks noGrp="1" noRot="1" noChangeAspect="1" noMove="1" noResize="1" noEditPoints="1" noAdjustHandles="1" noChangeArrowheads="1" noChangeShapeType="1" noTextEdit="1"/>
+              </p:cNvSpPr>
+              <p:nvPr>
+                <p:ph type="ctrTitle"/>
+              </p:nvPr>
+            </p:nvSpPr>
+            <p:spPr>
+              <a:xfrm>
+                <a:off x="3118435" y="2249364"/>
+                <a:ext cx="5955129" cy="752782"/>
+              </a:xfrm>
+              <a:blipFill>
+                <a:blip r:embed="rId2"/>
+                <a:stretch>
+                  <a:fillRect b="-30000"/>
+                </a:stretch>
+              </a:blipFill>
+            </p:spPr>
+            <p:txBody>
+              <a:bodyPr/>
+              <a:lstStyle/>
+              <a:p>
+                <a:r>
+                  <a:rPr lang="en-US">
+                    <a:noFill/>
+                  </a:rPr>
+                  <a:t> </a:t>
+                </a:r>
+              </a:p>
+            </p:txBody>
+          </p:sp>
+        </mc:Fallback>
+      </mc:AlternateContent>
+    </p:spTree>
+    <p:extLst>
+      <p:ext uri="{BB962C8B-B14F-4D97-AF65-F5344CB8AC3E}">
+        <p14:creationId xmlns:p14="http://schemas.microsoft.com/office/powerpoint/2010/main" val="1465684167"/>
+      </p:ext>
+    </p:extLst>
+  </p:cSld>
+  <p:clrMapOvr>
+    <a:masterClrMapping/>
+  </p:clrMapOvr>
+</p:sld>
+</file>
+
+<file path=ppt/slides/slide11.xml><?xml version="1.0" encoding="utf-8"?>
+<p:sld xmlns:a="http://schemas.openxmlformats.org/drawingml/2006/main" xmlns:r="http://schemas.openxmlformats.org/officeDocument/2006/relationships" xmlns:p="http://schemas.openxmlformats.org/presentationml/2006/main">
+  <p:cSld>
+    <p:spTree>
+      <p:nvGrpSpPr>
+        <p:cNvPr id="1" name=""/>
+        <p:cNvGrpSpPr/>
+        <p:nvPr/>
+      </p:nvGrpSpPr>
+      <p:grpSpPr>
+        <a:xfrm>
+          <a:off x="0" y="0"/>
+          <a:ext cx="0" cy="0"/>
+          <a:chOff x="0" y="0"/>
+          <a:chExt cx="0" cy="0"/>
+        </a:xfrm>
+      </p:grpSpPr>
+      <mc:AlternateContent xmlns:mc="http://schemas.openxmlformats.org/markup-compatibility/2006" xmlns:a14="http://schemas.microsoft.com/office/drawing/2010/main">
+        <mc:Choice Requires="a14">
+          <p:sp>
+            <p:nvSpPr>
+              <p:cNvPr id="2" name="Title 1">
+                <a:extLst>
+                  <a:ext uri="{FF2B5EF4-FFF2-40B4-BE49-F238E27FC236}">
+                    <a16:creationId xmlns:a16="http://schemas.microsoft.com/office/drawing/2014/main" id="{553BC310-260C-4BBC-FFDE-C32713BA6ECC}"/>
+                  </a:ext>
+                </a:extLst>
+              </p:cNvPr>
+              <p:cNvSpPr>
+                <a:spLocks noGrp="1"/>
+              </p:cNvSpPr>
+              <p:nvPr>
+                <p:ph type="ctrTitle"/>
+              </p:nvPr>
+            </p:nvSpPr>
+            <p:spPr>
+              <a:xfrm>
                 <a:off x="312893" y="816863"/>
                 <a:ext cx="2424609" cy="752782"/>
               </a:xfrm>
@@ -4192,7 +5151,7 @@
             <p:spPr>
               <a:xfrm>
                 <a:off x="6292677" y="3189099"/>
-                <a:ext cx="5510676" cy="1569660"/>
+                <a:ext cx="5510676" cy="1200329"/>
               </a:xfrm>
               <a:prstGeom prst="rect">
                 <a:avLst/>
@@ -4296,7 +5255,7 @@
                 </a:r>
                 <a:r>
                   <a:rPr lang="en-US" sz="2400" dirty="0"/>
-                  <a:t>) conversion (using plot in slide 8)</a:t>
+                  <a:t>) conversion</a:t>
                 </a:r>
               </a:p>
             </p:txBody>
@@ -4320,7 +5279,7 @@
             <p:spPr>
               <a:xfrm>
                 <a:off x="6292677" y="3189099"/>
-                <a:ext cx="5510676" cy="1569660"/>
+                <a:ext cx="5510676" cy="1200329"/>
               </a:xfrm>
               <a:prstGeom prst="rect">
                 <a:avLst/>
@@ -4328,7 +5287,7 @@
               <a:blipFill>
                 <a:blip r:embed="rId6"/>
                 <a:stretch>
-                  <a:fillRect l="-1609" t="-2419" r="-1609" b="-8065"/>
+                  <a:fillRect l="-1609" t="-3158" r="-460" b="-10526"/>
                 </a:stretch>
               </a:blipFill>
             </p:spPr>
@@ -4490,71 +5449,6 @@
 </p:sld>
 </file>
 
-<file path=ppt/slides/slide11.xml><?xml version="1.0" encoding="utf-8"?>
-<p:sld xmlns:a="http://schemas.openxmlformats.org/drawingml/2006/main" xmlns:r="http://schemas.openxmlformats.org/officeDocument/2006/relationships" xmlns:p="http://schemas.openxmlformats.org/presentationml/2006/main">
-  <p:cSld>
-    <p:spTree>
-      <p:nvGrpSpPr>
-        <p:cNvPr id="1" name=""/>
-        <p:cNvGrpSpPr/>
-        <p:nvPr/>
-      </p:nvGrpSpPr>
-      <p:grpSpPr>
-        <a:xfrm>
-          <a:off x="0" y="0"/>
-          <a:ext cx="0" cy="0"/>
-          <a:chOff x="0" y="0"/>
-          <a:chExt cx="0" cy="0"/>
-        </a:xfrm>
-      </p:grpSpPr>
-      <p:sp>
-        <p:nvSpPr>
-          <p:cNvPr id="2" name="Title 1">
-            <a:extLst>
-              <a:ext uri="{FF2B5EF4-FFF2-40B4-BE49-F238E27FC236}">
-                <a16:creationId xmlns:a16="http://schemas.microsoft.com/office/drawing/2014/main" id="{553BC310-260C-4BBC-FFDE-C32713BA6ECC}"/>
-              </a:ext>
-            </a:extLst>
-          </p:cNvPr>
-          <p:cNvSpPr>
-            <a:spLocks noGrp="1"/>
-          </p:cNvSpPr>
-          <p:nvPr>
-            <p:ph type="ctrTitle"/>
-          </p:nvPr>
-        </p:nvSpPr>
-        <p:spPr>
-          <a:xfrm>
-            <a:off x="3364223" y="2241271"/>
-            <a:ext cx="5955129" cy="752782"/>
-          </a:xfrm>
-        </p:spPr>
-        <p:txBody>
-          <a:bodyPr>
-            <a:normAutofit/>
-          </a:bodyPr>
-          <a:lstStyle/>
-          <a:p>
-            <a:r>
-              <a:rPr lang="en-US" sz="4000" dirty="0"/>
-              <a:t>COVERAGE Conversion</a:t>
-            </a:r>
-          </a:p>
-        </p:txBody>
-      </p:sp>
-    </p:spTree>
-    <p:extLst>
-      <p:ext uri="{BB962C8B-B14F-4D97-AF65-F5344CB8AC3E}">
-        <p14:creationId xmlns:p14="http://schemas.microsoft.com/office/powerpoint/2010/main" val="3998980831"/>
-      </p:ext>
-    </p:extLst>
-  </p:cSld>
-  <p:clrMapOvr>
-    <a:masterClrMapping/>
-  </p:clrMapOvr>
-</p:sld>
-</file>
-
 <file path=ppt/slides/slide12.xml><?xml version="1.0" encoding="utf-8"?>
 <p:sld xmlns:a="http://schemas.openxmlformats.org/drawingml/2006/main" xmlns:r="http://schemas.openxmlformats.org/officeDocument/2006/relationships" xmlns:p="http://schemas.openxmlformats.org/presentationml/2006/main">
   <p:cSld>
@@ -4590,8 +5484,8 @@
         </p:nvSpPr>
         <p:spPr>
           <a:xfrm>
-            <a:off x="437720" y="261256"/>
-            <a:ext cx="8438148" cy="698011"/>
+            <a:off x="3364223" y="2241271"/>
+            <a:ext cx="5955129" cy="752782"/>
           </a:xfrm>
         </p:spPr>
         <p:txBody>
@@ -4600,78 +5494,17 @@
           </a:bodyPr>
           <a:lstStyle/>
           <a:p>
-            <a:pPr algn="l"/>
             <a:r>
               <a:rPr lang="en-US" sz="4000" dirty="0"/>
-              <a:t>Coverage vs Time</a:t>
+              <a:t>COVERAGE Conversion</a:t>
             </a:r>
           </a:p>
         </p:txBody>
       </p:sp>
-      <p:pic>
-        <p:nvPicPr>
-          <p:cNvPr id="4" name="Picture 3">
-            <a:extLst>
-              <a:ext uri="{FF2B5EF4-FFF2-40B4-BE49-F238E27FC236}">
-                <a16:creationId xmlns:a16="http://schemas.microsoft.com/office/drawing/2014/main" id="{BDE94126-7E85-2378-66B5-29F5F33B7D51}"/>
-              </a:ext>
-            </a:extLst>
-          </p:cNvPr>
-          <p:cNvPicPr>
-            <a:picLocks noChangeAspect="1"/>
-          </p:cNvPicPr>
-          <p:nvPr/>
-        </p:nvPicPr>
-        <p:blipFill>
-          <a:blip r:embed="rId2"/>
-          <a:stretch>
-            <a:fillRect/>
-          </a:stretch>
-        </p:blipFill>
-        <p:spPr>
-          <a:xfrm>
-            <a:off x="135467" y="1151467"/>
-            <a:ext cx="6073421" cy="4555066"/>
-          </a:xfrm>
-          <a:prstGeom prst="rect">
-            <a:avLst/>
-          </a:prstGeom>
-        </p:spPr>
-      </p:pic>
-      <p:pic>
-        <p:nvPicPr>
-          <p:cNvPr id="6" name="Picture 5">
-            <a:extLst>
-              <a:ext uri="{FF2B5EF4-FFF2-40B4-BE49-F238E27FC236}">
-                <a16:creationId xmlns:a16="http://schemas.microsoft.com/office/drawing/2014/main" id="{0A77D65D-2A04-5729-04A6-1337576A224C}"/>
-              </a:ext>
-            </a:extLst>
-          </p:cNvPr>
-          <p:cNvPicPr>
-            <a:picLocks noChangeAspect="1"/>
-          </p:cNvPicPr>
-          <p:nvPr/>
-        </p:nvPicPr>
-        <p:blipFill>
-          <a:blip r:embed="rId3"/>
-          <a:stretch>
-            <a:fillRect/>
-          </a:stretch>
-        </p:blipFill>
-        <p:spPr>
-          <a:xfrm>
-            <a:off x="5839156" y="1151466"/>
-            <a:ext cx="6073423" cy="4555067"/>
-          </a:xfrm>
-          <a:prstGeom prst="rect">
-            <a:avLst/>
-          </a:prstGeom>
-        </p:spPr>
-      </p:pic>
     </p:spTree>
     <p:extLst>
       <p:ext uri="{BB962C8B-B14F-4D97-AF65-F5344CB8AC3E}">
-        <p14:creationId xmlns:p14="http://schemas.microsoft.com/office/powerpoint/2010/main" val="860610451"/>
+        <p14:creationId xmlns:p14="http://schemas.microsoft.com/office/powerpoint/2010/main" val="3998980831"/>
       </p:ext>
     </p:extLst>
   </p:cSld>
@@ -4716,8 +5549,8 @@
         </p:nvSpPr>
         <p:spPr>
           <a:xfrm>
-            <a:off x="437720" y="261256"/>
-            <a:ext cx="8438148" cy="698011"/>
+            <a:off x="3312707" y="154893"/>
+            <a:ext cx="5955129" cy="752782"/>
           </a:xfrm>
         </p:spPr>
         <p:txBody>
@@ -4726,20 +5559,19 @@
           </a:bodyPr>
           <a:lstStyle/>
           <a:p>
-            <a:pPr algn="l"/>
             <a:r>
               <a:rPr lang="en-US" sz="4000" dirty="0"/>
-              <a:t>Coverage vs Time</a:t>
+              <a:t>COVERAGE vs WV fitting</a:t>
             </a:r>
           </a:p>
         </p:txBody>
       </p:sp>
       <p:pic>
         <p:nvPicPr>
-          <p:cNvPr id="5" name="Picture 4">
-            <a:extLst>
-              <a:ext uri="{FF2B5EF4-FFF2-40B4-BE49-F238E27FC236}">
-                <a16:creationId xmlns:a16="http://schemas.microsoft.com/office/drawing/2014/main" id="{C91BFF6B-47AA-6D67-1636-5AF7533CAECD}"/>
+          <p:cNvPr id="4" name="Picture 3">
+            <a:extLst>
+              <a:ext uri="{FF2B5EF4-FFF2-40B4-BE49-F238E27FC236}">
+                <a16:creationId xmlns:a16="http://schemas.microsoft.com/office/drawing/2014/main" id="{BB643199-51AE-DBB4-8ECB-637BE094E213}"/>
               </a:ext>
             </a:extLst>
           </p:cNvPr>
@@ -4756,38 +5588,8 @@
         </p:blipFill>
         <p:spPr>
           <a:xfrm>
-            <a:off x="-7110" y="959267"/>
-            <a:ext cx="6457629" cy="4843222"/>
-          </a:xfrm>
-          <a:prstGeom prst="rect">
-            <a:avLst/>
-          </a:prstGeom>
-        </p:spPr>
-      </p:pic>
-      <p:pic>
-        <p:nvPicPr>
-          <p:cNvPr id="8" name="Picture 7">
-            <a:extLst>
-              <a:ext uri="{FF2B5EF4-FFF2-40B4-BE49-F238E27FC236}">
-                <a16:creationId xmlns:a16="http://schemas.microsoft.com/office/drawing/2014/main" id="{4740566A-14B3-350F-88F0-BD1B0FB74A11}"/>
-              </a:ext>
-            </a:extLst>
-          </p:cNvPr>
-          <p:cNvPicPr>
-            <a:picLocks noChangeAspect="1"/>
-          </p:cNvPicPr>
-          <p:nvPr/>
-        </p:nvPicPr>
-        <p:blipFill>
-          <a:blip r:embed="rId3"/>
-          <a:stretch>
-            <a:fillRect/>
-          </a:stretch>
-        </p:blipFill>
-        <p:spPr>
-          <a:xfrm>
-            <a:off x="5926667" y="1055511"/>
-            <a:ext cx="6186311" cy="4639733"/>
+            <a:off x="2187317" y="997053"/>
+            <a:ext cx="7080519" cy="5310390"/>
           </a:xfrm>
           <a:prstGeom prst="rect">
             <a:avLst/>
@@ -4797,7 +5599,7 @@
     </p:spTree>
     <p:extLst>
       <p:ext uri="{BB962C8B-B14F-4D97-AF65-F5344CB8AC3E}">
-        <p14:creationId xmlns:p14="http://schemas.microsoft.com/office/powerpoint/2010/main" val="3580357840"/>
+        <p14:creationId xmlns:p14="http://schemas.microsoft.com/office/powerpoint/2010/main" val="2055205965"/>
       </p:ext>
     </p:extLst>
   </p:cSld>
@@ -4855,17 +5657,17 @@
             <a:pPr algn="l"/>
             <a:r>
               <a:rPr lang="en-US" sz="4000" dirty="0"/>
-              <a:t>Coverage vs Time – All together</a:t>
+              <a:t>Coverage vs Time</a:t>
             </a:r>
           </a:p>
         </p:txBody>
       </p:sp>
       <p:pic>
         <p:nvPicPr>
-          <p:cNvPr id="4" name="Picture 3">
-            <a:extLst>
-              <a:ext uri="{FF2B5EF4-FFF2-40B4-BE49-F238E27FC236}">
-                <a16:creationId xmlns:a16="http://schemas.microsoft.com/office/drawing/2014/main" id="{8A0CD496-5A65-663E-CE3E-D26816499F7D}"/>
+          <p:cNvPr id="8" name="Picture 7">
+            <a:extLst>
+              <a:ext uri="{FF2B5EF4-FFF2-40B4-BE49-F238E27FC236}">
+                <a16:creationId xmlns:a16="http://schemas.microsoft.com/office/drawing/2014/main" id="{600FF404-3B94-B4CF-51EA-BF9A0AB2DAA0}"/>
               </a:ext>
             </a:extLst>
           </p:cNvPr>
@@ -4882,8 +5684,134 @@
         </p:blipFill>
         <p:spPr>
           <a:xfrm>
-            <a:off x="2283306" y="934559"/>
-            <a:ext cx="7402562" cy="5662185"/>
+            <a:off x="252393" y="1320085"/>
+            <a:ext cx="6104864" cy="4578648"/>
+          </a:xfrm>
+          <a:prstGeom prst="rect">
+            <a:avLst/>
+          </a:prstGeom>
+        </p:spPr>
+      </p:pic>
+      <p:pic>
+        <p:nvPicPr>
+          <p:cNvPr id="10" name="Picture 9">
+            <a:extLst>
+              <a:ext uri="{FF2B5EF4-FFF2-40B4-BE49-F238E27FC236}">
+                <a16:creationId xmlns:a16="http://schemas.microsoft.com/office/drawing/2014/main" id="{2599A05A-1ED9-8B5F-BD02-5484FF5C2EB1}"/>
+              </a:ext>
+            </a:extLst>
+          </p:cNvPr>
+          <p:cNvPicPr>
+            <a:picLocks noChangeAspect="1"/>
+          </p:cNvPicPr>
+          <p:nvPr/>
+        </p:nvPicPr>
+        <p:blipFill>
+          <a:blip r:embed="rId3"/>
+          <a:stretch>
+            <a:fillRect/>
+          </a:stretch>
+        </p:blipFill>
+        <p:spPr>
+          <a:xfrm>
+            <a:off x="5995316" y="1320085"/>
+            <a:ext cx="6104864" cy="4578648"/>
+          </a:xfrm>
+          <a:prstGeom prst="rect">
+            <a:avLst/>
+          </a:prstGeom>
+        </p:spPr>
+      </p:pic>
+    </p:spTree>
+    <p:extLst>
+      <p:ext uri="{BB962C8B-B14F-4D97-AF65-F5344CB8AC3E}">
+        <p14:creationId xmlns:p14="http://schemas.microsoft.com/office/powerpoint/2010/main" val="860610451"/>
+      </p:ext>
+    </p:extLst>
+  </p:cSld>
+  <p:clrMapOvr>
+    <a:masterClrMapping/>
+  </p:clrMapOvr>
+</p:sld>
+</file>
+
+<file path=ppt/slides/slide15.xml><?xml version="1.0" encoding="utf-8"?>
+<p:sld xmlns:a="http://schemas.openxmlformats.org/drawingml/2006/main" xmlns:r="http://schemas.openxmlformats.org/officeDocument/2006/relationships" xmlns:p="http://schemas.openxmlformats.org/presentationml/2006/main">
+  <p:cSld>
+    <p:spTree>
+      <p:nvGrpSpPr>
+        <p:cNvPr id="1" name=""/>
+        <p:cNvGrpSpPr/>
+        <p:nvPr/>
+      </p:nvGrpSpPr>
+      <p:grpSpPr>
+        <a:xfrm>
+          <a:off x="0" y="0"/>
+          <a:ext cx="0" cy="0"/>
+          <a:chOff x="0" y="0"/>
+          <a:chExt cx="0" cy="0"/>
+        </a:xfrm>
+      </p:grpSpPr>
+      <p:sp>
+        <p:nvSpPr>
+          <p:cNvPr id="2" name="Title 1">
+            <a:extLst>
+              <a:ext uri="{FF2B5EF4-FFF2-40B4-BE49-F238E27FC236}">
+                <a16:creationId xmlns:a16="http://schemas.microsoft.com/office/drawing/2014/main" id="{553BC310-260C-4BBC-FFDE-C32713BA6ECC}"/>
+              </a:ext>
+            </a:extLst>
+          </p:cNvPr>
+          <p:cNvSpPr>
+            <a:spLocks noGrp="1"/>
+          </p:cNvSpPr>
+          <p:nvPr>
+            <p:ph type="ctrTitle"/>
+          </p:nvPr>
+        </p:nvSpPr>
+        <p:spPr>
+          <a:xfrm>
+            <a:off x="437720" y="261256"/>
+            <a:ext cx="8438148" cy="698011"/>
+          </a:xfrm>
+        </p:spPr>
+        <p:txBody>
+          <a:bodyPr>
+            <a:normAutofit/>
+          </a:bodyPr>
+          <a:lstStyle/>
+          <a:p>
+            <a:pPr algn="l"/>
+            <a:r>
+              <a:rPr lang="en-US" sz="4000" dirty="0"/>
+              <a:t>Coverage vs Time – All together</a:t>
+            </a:r>
+          </a:p>
+        </p:txBody>
+      </p:sp>
+      <p:pic>
+        <p:nvPicPr>
+          <p:cNvPr id="7" name="Picture 6">
+            <a:extLst>
+              <a:ext uri="{FF2B5EF4-FFF2-40B4-BE49-F238E27FC236}">
+                <a16:creationId xmlns:a16="http://schemas.microsoft.com/office/drawing/2014/main" id="{F68FFABF-4634-D181-318D-A035DD30FB1B}"/>
+              </a:ext>
+            </a:extLst>
+          </p:cNvPr>
+          <p:cNvPicPr>
+            <a:picLocks noChangeAspect="1"/>
+          </p:cNvPicPr>
+          <p:nvPr/>
+        </p:nvPicPr>
+        <p:blipFill>
+          <a:blip r:embed="rId2"/>
+          <a:stretch>
+            <a:fillRect/>
+          </a:stretch>
+        </p:blipFill>
+        <p:spPr>
+          <a:xfrm>
+            <a:off x="296052" y="959267"/>
+            <a:ext cx="7112000" cy="5334000"/>
           </a:xfrm>
           <a:prstGeom prst="rect">
             <a:avLst/>
@@ -4958,10 +5886,10 @@
       </p:sp>
       <p:pic>
         <p:nvPicPr>
-          <p:cNvPr id="4" name="Picture 3">
-            <a:extLst>
-              <a:ext uri="{FF2B5EF4-FFF2-40B4-BE49-F238E27FC236}">
-                <a16:creationId xmlns:a16="http://schemas.microsoft.com/office/drawing/2014/main" id="{E9592C58-6EE9-685A-DBC4-BEA412B1AD41}"/>
+          <p:cNvPr id="6" name="Picture 5">
+            <a:extLst>
+              <a:ext uri="{FF2B5EF4-FFF2-40B4-BE49-F238E27FC236}">
+                <a16:creationId xmlns:a16="http://schemas.microsoft.com/office/drawing/2014/main" id="{B268713B-8897-19E3-0095-F5C366699D39}"/>
               </a:ext>
             </a:extLst>
           </p:cNvPr>
@@ -4978,8 +5906,8 @@
         </p:blipFill>
         <p:spPr>
           <a:xfrm>
-            <a:off x="73738" y="1066800"/>
-            <a:ext cx="6022262" cy="4112764"/>
+            <a:off x="249850" y="1152451"/>
+            <a:ext cx="5846150" cy="4308192"/>
           </a:xfrm>
           <a:prstGeom prst="rect">
             <a:avLst/>
@@ -4988,10 +5916,10 @@
       </p:pic>
       <p:pic>
         <p:nvPicPr>
-          <p:cNvPr id="5" name="Picture 4">
-            <a:extLst>
-              <a:ext uri="{FF2B5EF4-FFF2-40B4-BE49-F238E27FC236}">
-                <a16:creationId xmlns:a16="http://schemas.microsoft.com/office/drawing/2014/main" id="{9ABFA99C-B4F5-D734-C110-56C56ADD61C0}"/>
+          <p:cNvPr id="8" name="Picture 7">
+            <a:extLst>
+              <a:ext uri="{FF2B5EF4-FFF2-40B4-BE49-F238E27FC236}">
+                <a16:creationId xmlns:a16="http://schemas.microsoft.com/office/drawing/2014/main" id="{C84D88D1-35BA-4ACE-1B71-ABF1123BC31F}"/>
               </a:ext>
             </a:extLst>
           </p:cNvPr>
@@ -5008,8 +5936,8 @@
         </p:blipFill>
         <p:spPr>
           <a:xfrm>
-            <a:off x="6096000" y="1066800"/>
-            <a:ext cx="5689600" cy="4267201"/>
+            <a:off x="6096000" y="1193650"/>
+            <a:ext cx="6015865" cy="4511899"/>
           </a:xfrm>
           <a:prstGeom prst="rect">
             <a:avLst/>
@@ -5084,10 +6012,10 @@
       </p:sp>
       <p:pic>
         <p:nvPicPr>
-          <p:cNvPr id="6" name="Picture 5">
-            <a:extLst>
-              <a:ext uri="{FF2B5EF4-FFF2-40B4-BE49-F238E27FC236}">
-                <a16:creationId xmlns:a16="http://schemas.microsoft.com/office/drawing/2014/main" id="{1E5E4584-72C7-E430-21BB-8AB3DA4ECE05}"/>
+          <p:cNvPr id="4" name="Picture 3">
+            <a:extLst>
+              <a:ext uri="{FF2B5EF4-FFF2-40B4-BE49-F238E27FC236}">
+                <a16:creationId xmlns:a16="http://schemas.microsoft.com/office/drawing/2014/main" id="{203F1D4C-E463-BE5C-0F4F-025D8CF78437}"/>
               </a:ext>
             </a:extLst>
           </p:cNvPr>
@@ -5104,8 +6032,8 @@
         </p:blipFill>
         <p:spPr>
           <a:xfrm>
-            <a:off x="255881" y="1300121"/>
-            <a:ext cx="5840119" cy="4380089"/>
+            <a:off x="0" y="1139676"/>
+            <a:ext cx="6104864" cy="4578648"/>
           </a:xfrm>
           <a:prstGeom prst="rect">
             <a:avLst/>
@@ -5114,10 +6042,10 @@
       </p:pic>
       <p:pic>
         <p:nvPicPr>
-          <p:cNvPr id="10" name="Picture 9">
-            <a:extLst>
-              <a:ext uri="{FF2B5EF4-FFF2-40B4-BE49-F238E27FC236}">
-                <a16:creationId xmlns:a16="http://schemas.microsoft.com/office/drawing/2014/main" id="{9A22100F-9582-D7EC-FD26-B64BD64FB416}"/>
+          <p:cNvPr id="7" name="Picture 6">
+            <a:extLst>
+              <a:ext uri="{FF2B5EF4-FFF2-40B4-BE49-F238E27FC236}">
+                <a16:creationId xmlns:a16="http://schemas.microsoft.com/office/drawing/2014/main" id="{44340ED1-C636-B6D6-76EB-A3E089B8BAEC}"/>
               </a:ext>
             </a:extLst>
           </p:cNvPr>
@@ -5134,8 +6062,8 @@
         </p:blipFill>
         <p:spPr>
           <a:xfrm>
-            <a:off x="6096000" y="1300120"/>
-            <a:ext cx="5840120" cy="4380090"/>
+            <a:off x="5981243" y="1139676"/>
+            <a:ext cx="6104864" cy="4578648"/>
           </a:xfrm>
           <a:prstGeom prst="rect">
             <a:avLst/>
@@ -5224,8 +6152,8 @@
         </p:nvSpPr>
         <p:spPr>
           <a:xfrm>
-            <a:off x="1065126" y="5228852"/>
-            <a:ext cx="4779870" cy="331823"/>
+            <a:off x="833307" y="5328071"/>
+            <a:ext cx="4459910" cy="570662"/>
           </a:xfrm>
           <a:prstGeom prst="rect">
             <a:avLst/>
@@ -5233,7 +6161,7 @@
         </p:spPr>
         <p:txBody>
           <a:bodyPr vert="horz" lIns="91440" tIns="45720" rIns="91440" bIns="45720" rtlCol="0" anchor="b">
-            <a:normAutofit lnSpcReduction="10000"/>
+            <a:normAutofit/>
           </a:bodyPr>
           <a:lstStyle>
             <a:lvl1pPr algn="ctr" defTabSz="914400" rtl="0" eaLnBrk="1" latinLnBrk="0" hangingPunct="1">
@@ -5257,18 +6185,18 @@
           <a:p>
             <a:pPr algn="l"/>
             <a:r>
-              <a:rPr lang="en-US" sz="1800" dirty="0"/>
-              <a:t>As is - No smoothing. </a:t>
+              <a:rPr lang="en-US" sz="3200" dirty="0"/>
+              <a:t>NOT SMOOTHED</a:t>
             </a:r>
           </a:p>
         </p:txBody>
       </p:sp>
       <p:pic>
         <p:nvPicPr>
-          <p:cNvPr id="5" name="Picture 4">
-            <a:extLst>
-              <a:ext uri="{FF2B5EF4-FFF2-40B4-BE49-F238E27FC236}">
-                <a16:creationId xmlns:a16="http://schemas.microsoft.com/office/drawing/2014/main" id="{C0D670F5-7BAA-4FC5-E2EC-27F4369AEA31}"/>
+          <p:cNvPr id="4" name="Picture 3">
+            <a:extLst>
+              <a:ext uri="{FF2B5EF4-FFF2-40B4-BE49-F238E27FC236}">
+                <a16:creationId xmlns:a16="http://schemas.microsoft.com/office/drawing/2014/main" id="{62780ECD-E8AA-CF72-CD39-74AA4E4987D1}"/>
               </a:ext>
             </a:extLst>
           </p:cNvPr>
@@ -5285,8 +6213,8 @@
         </p:blipFill>
         <p:spPr>
           <a:xfrm>
-            <a:off x="437720" y="1092832"/>
-            <a:ext cx="5708371" cy="3962644"/>
+            <a:off x="257325" y="959267"/>
+            <a:ext cx="5937322" cy="4195590"/>
           </a:xfrm>
           <a:prstGeom prst="rect">
             <a:avLst/>
@@ -5295,10 +6223,10 @@
       </p:pic>
       <p:pic>
         <p:nvPicPr>
-          <p:cNvPr id="11" name="Picture 10">
-            <a:extLst>
-              <a:ext uri="{FF2B5EF4-FFF2-40B4-BE49-F238E27FC236}">
-                <a16:creationId xmlns:a16="http://schemas.microsoft.com/office/drawing/2014/main" id="{E30B7DDD-8517-607D-ED92-13B27C3204BA}"/>
+          <p:cNvPr id="7" name="Picture 6">
+            <a:extLst>
+              <a:ext uri="{FF2B5EF4-FFF2-40B4-BE49-F238E27FC236}">
+                <a16:creationId xmlns:a16="http://schemas.microsoft.com/office/drawing/2014/main" id="{5B0C2CC9-1C2D-64ED-DC2D-056B249B2F5B}"/>
               </a:ext>
             </a:extLst>
           </p:cNvPr>
@@ -5315,8 +6243,8 @@
         </p:blipFill>
         <p:spPr>
           <a:xfrm>
-            <a:off x="6044427" y="1127299"/>
-            <a:ext cx="5590825" cy="3909774"/>
+            <a:off x="6078807" y="890939"/>
+            <a:ext cx="5594121" cy="4195591"/>
           </a:xfrm>
           <a:prstGeom prst="rect">
             <a:avLst/>
@@ -5325,10 +6253,10 @@
       </p:pic>
       <p:sp>
         <p:nvSpPr>
-          <p:cNvPr id="13" name="Title 1">
-            <a:extLst>
-              <a:ext uri="{FF2B5EF4-FFF2-40B4-BE49-F238E27FC236}">
-                <a16:creationId xmlns:a16="http://schemas.microsoft.com/office/drawing/2014/main" id="{18C944A8-BB7E-0A93-65A7-53D2A482AC4C}"/>
+          <p:cNvPr id="8" name="Title 1">
+            <a:extLst>
+              <a:ext uri="{FF2B5EF4-FFF2-40B4-BE49-F238E27FC236}">
+                <a16:creationId xmlns:a16="http://schemas.microsoft.com/office/drawing/2014/main" id="{BDF3C2B7-40BD-5BCD-D7DA-4355127891EC}"/>
               </a:ext>
             </a:extLst>
           </p:cNvPr>
@@ -5339,8 +6267,8 @@
         </p:nvSpPr>
         <p:spPr>
           <a:xfrm>
-            <a:off x="6855382" y="5247396"/>
-            <a:ext cx="4779870" cy="331823"/>
+            <a:off x="6898785" y="5328071"/>
+            <a:ext cx="4779870" cy="570662"/>
           </a:xfrm>
           <a:prstGeom prst="rect">
             <a:avLst/>
@@ -5348,7 +6276,7 @@
         </p:spPr>
         <p:txBody>
           <a:bodyPr vert="horz" lIns="91440" tIns="45720" rIns="91440" bIns="45720" rtlCol="0" anchor="b">
-            <a:normAutofit lnSpcReduction="10000"/>
+            <a:normAutofit/>
           </a:bodyPr>
           <a:lstStyle>
             <a:lvl1pPr algn="ctr" defTabSz="914400" rtl="0" eaLnBrk="1" latinLnBrk="0" hangingPunct="1">
@@ -5372,8 +6300,8 @@
           <a:p>
             <a:pPr algn="l"/>
             <a:r>
-              <a:rPr lang="en-US" sz="1800" dirty="0"/>
-              <a:t>Just normalized to 490</a:t>
+              <a:rPr lang="en-US" sz="3200" dirty="0"/>
+              <a:t>SMOOTHED</a:t>
             </a:r>
           </a:p>
         </p:txBody>
@@ -5426,6 +6354,242 @@
         </p:nvSpPr>
         <p:spPr>
           <a:xfrm>
+            <a:off x="437720" y="261256"/>
+            <a:ext cx="8438148" cy="698011"/>
+          </a:xfrm>
+        </p:spPr>
+        <p:txBody>
+          <a:bodyPr>
+            <a:normAutofit/>
+          </a:bodyPr>
+          <a:lstStyle/>
+          <a:p>
+            <a:pPr algn="l"/>
+            <a:r>
+              <a:rPr lang="en-US" sz="4000" dirty="0"/>
+              <a:t>Mathematical Area (time) – our data</a:t>
+            </a:r>
+          </a:p>
+        </p:txBody>
+      </p:sp>
+      <p:sp>
+        <p:nvSpPr>
+          <p:cNvPr id="9" name="Title 1">
+            <a:extLst>
+              <a:ext uri="{FF2B5EF4-FFF2-40B4-BE49-F238E27FC236}">
+                <a16:creationId xmlns:a16="http://schemas.microsoft.com/office/drawing/2014/main" id="{8EC4B083-340D-949D-673B-6862F5DFFC36}"/>
+              </a:ext>
+            </a:extLst>
+          </p:cNvPr>
+          <p:cNvSpPr txBox="1">
+            <a:spLocks/>
+          </p:cNvSpPr>
+          <p:nvPr/>
+        </p:nvSpPr>
+        <p:spPr>
+          <a:xfrm>
+            <a:off x="1057519" y="5588273"/>
+            <a:ext cx="4459910" cy="570662"/>
+          </a:xfrm>
+          <a:prstGeom prst="rect">
+            <a:avLst/>
+          </a:prstGeom>
+        </p:spPr>
+        <p:txBody>
+          <a:bodyPr vert="horz" lIns="91440" tIns="45720" rIns="91440" bIns="45720" rtlCol="0" anchor="b">
+            <a:normAutofit/>
+          </a:bodyPr>
+          <a:lstStyle>
+            <a:lvl1pPr algn="ctr" defTabSz="914400" rtl="0" eaLnBrk="1" latinLnBrk="0" hangingPunct="1">
+              <a:lnSpc>
+                <a:spcPct val="90000"/>
+              </a:lnSpc>
+              <a:spcBef>
+                <a:spcPct val="0"/>
+              </a:spcBef>
+              <a:buNone/>
+              <a:defRPr sz="6000" kern="1200">
+                <a:solidFill>
+                  <a:schemeClr val="tx1"/>
+                </a:solidFill>
+                <a:latin typeface="+mj-lt"/>
+                <a:ea typeface="+mj-ea"/>
+                <a:cs typeface="+mj-cs"/>
+              </a:defRPr>
+            </a:lvl1pPr>
+          </a:lstStyle>
+          <a:p>
+            <a:pPr algn="l"/>
+            <a:r>
+              <a:rPr lang="en-US" sz="3200" dirty="0"/>
+              <a:t>UNNORMALIZED</a:t>
+            </a:r>
+          </a:p>
+        </p:txBody>
+      </p:sp>
+      <p:pic>
+        <p:nvPicPr>
+          <p:cNvPr id="7" name="Picture 6">
+            <a:extLst>
+              <a:ext uri="{FF2B5EF4-FFF2-40B4-BE49-F238E27FC236}">
+                <a16:creationId xmlns:a16="http://schemas.microsoft.com/office/drawing/2014/main" id="{5B0C2CC9-1C2D-64ED-DC2D-056B249B2F5B}"/>
+              </a:ext>
+            </a:extLst>
+          </p:cNvPr>
+          <p:cNvPicPr>
+            <a:picLocks noChangeAspect="1"/>
+          </p:cNvPicPr>
+          <p:nvPr/>
+        </p:nvPicPr>
+        <p:blipFill>
+          <a:blip r:embed="rId2"/>
+          <a:stretch>
+            <a:fillRect/>
+          </a:stretch>
+        </p:blipFill>
+        <p:spPr>
+          <a:xfrm>
+            <a:off x="266201" y="959267"/>
+            <a:ext cx="5594121" cy="4195591"/>
+          </a:xfrm>
+          <a:prstGeom prst="rect">
+            <a:avLst/>
+          </a:prstGeom>
+        </p:spPr>
+      </p:pic>
+      <p:sp>
+        <p:nvSpPr>
+          <p:cNvPr id="8" name="Title 1">
+            <a:extLst>
+              <a:ext uri="{FF2B5EF4-FFF2-40B4-BE49-F238E27FC236}">
+                <a16:creationId xmlns:a16="http://schemas.microsoft.com/office/drawing/2014/main" id="{BDF3C2B7-40BD-5BCD-D7DA-4355127891EC}"/>
+              </a:ext>
+            </a:extLst>
+          </p:cNvPr>
+          <p:cNvSpPr txBox="1">
+            <a:spLocks/>
+          </p:cNvSpPr>
+          <p:nvPr/>
+        </p:nvSpPr>
+        <p:spPr>
+          <a:xfrm>
+            <a:off x="6674572" y="5567538"/>
+            <a:ext cx="4779870" cy="570662"/>
+          </a:xfrm>
+          <a:prstGeom prst="rect">
+            <a:avLst/>
+          </a:prstGeom>
+        </p:spPr>
+        <p:txBody>
+          <a:bodyPr vert="horz" lIns="91440" tIns="45720" rIns="91440" bIns="45720" rtlCol="0" anchor="b">
+            <a:normAutofit/>
+          </a:bodyPr>
+          <a:lstStyle>
+            <a:lvl1pPr algn="ctr" defTabSz="914400" rtl="0" eaLnBrk="1" latinLnBrk="0" hangingPunct="1">
+              <a:lnSpc>
+                <a:spcPct val="90000"/>
+              </a:lnSpc>
+              <a:spcBef>
+                <a:spcPct val="0"/>
+              </a:spcBef>
+              <a:buNone/>
+              <a:defRPr sz="6000" kern="1200">
+                <a:solidFill>
+                  <a:schemeClr val="tx1"/>
+                </a:solidFill>
+                <a:latin typeface="+mj-lt"/>
+                <a:ea typeface="+mj-ea"/>
+                <a:cs typeface="+mj-cs"/>
+              </a:defRPr>
+            </a:lvl1pPr>
+          </a:lstStyle>
+          <a:p>
+            <a:pPr algn="l"/>
+            <a:r>
+              <a:rPr lang="en-US" sz="3200" dirty="0"/>
+              <a:t>NORMALIZED (ref490)</a:t>
+            </a:r>
+          </a:p>
+        </p:txBody>
+      </p:sp>
+      <p:pic>
+        <p:nvPicPr>
+          <p:cNvPr id="5" name="Picture 4">
+            <a:extLst>
+              <a:ext uri="{FF2B5EF4-FFF2-40B4-BE49-F238E27FC236}">
+                <a16:creationId xmlns:a16="http://schemas.microsoft.com/office/drawing/2014/main" id="{B22AADF8-D8E3-8768-1FDE-BA0614B317EA}"/>
+              </a:ext>
+            </a:extLst>
+          </p:cNvPr>
+          <p:cNvPicPr>
+            <a:picLocks noChangeAspect="1"/>
+          </p:cNvPicPr>
+          <p:nvPr/>
+        </p:nvPicPr>
+        <p:blipFill>
+          <a:blip r:embed="rId3"/>
+          <a:stretch>
+            <a:fillRect/>
+          </a:stretch>
+        </p:blipFill>
+        <p:spPr>
+          <a:xfrm>
+            <a:off x="5860321" y="959266"/>
+            <a:ext cx="5594121" cy="4195591"/>
+          </a:xfrm>
+          <a:prstGeom prst="rect">
+            <a:avLst/>
+          </a:prstGeom>
+        </p:spPr>
+      </p:pic>
+    </p:spTree>
+    <p:extLst>
+      <p:ext uri="{BB962C8B-B14F-4D97-AF65-F5344CB8AC3E}">
+        <p14:creationId xmlns:p14="http://schemas.microsoft.com/office/powerpoint/2010/main" val="2220290437"/>
+      </p:ext>
+    </p:extLst>
+  </p:cSld>
+  <p:clrMapOvr>
+    <a:masterClrMapping/>
+  </p:clrMapOvr>
+</p:sld>
+</file>
+
+<file path=ppt/slides/slide6.xml><?xml version="1.0" encoding="utf-8"?>
+<p:sld xmlns:a="http://schemas.openxmlformats.org/drawingml/2006/main" xmlns:r="http://schemas.openxmlformats.org/officeDocument/2006/relationships" xmlns:p="http://schemas.openxmlformats.org/presentationml/2006/main">
+  <p:cSld>
+    <p:spTree>
+      <p:nvGrpSpPr>
+        <p:cNvPr id="1" name=""/>
+        <p:cNvGrpSpPr/>
+        <p:nvPr/>
+      </p:nvGrpSpPr>
+      <p:grpSpPr>
+        <a:xfrm>
+          <a:off x="0" y="0"/>
+          <a:ext cx="0" cy="0"/>
+          <a:chOff x="0" y="0"/>
+          <a:chExt cx="0" cy="0"/>
+        </a:xfrm>
+      </p:grpSpPr>
+      <p:sp>
+        <p:nvSpPr>
+          <p:cNvPr id="2" name="Title 1">
+            <a:extLst>
+              <a:ext uri="{FF2B5EF4-FFF2-40B4-BE49-F238E27FC236}">
+                <a16:creationId xmlns:a16="http://schemas.microsoft.com/office/drawing/2014/main" id="{553BC310-260C-4BBC-FFDE-C32713BA6ECC}"/>
+              </a:ext>
+            </a:extLst>
+          </p:cNvPr>
+          <p:cNvSpPr>
+            <a:spLocks noGrp="1"/>
+          </p:cNvSpPr>
+          <p:nvPr>
+            <p:ph type="ctrTitle"/>
+          </p:nvPr>
+        </p:nvSpPr>
+        <p:spPr>
+          <a:xfrm>
             <a:off x="542166" y="294064"/>
             <a:ext cx="10851420" cy="1559206"/>
           </a:xfrm>
@@ -5494,8 +6658,8 @@
         </p:nvSpPr>
         <p:spPr>
           <a:xfrm>
-            <a:off x="7307108" y="4408403"/>
-            <a:ext cx="4337723" cy="1938992"/>
+            <a:off x="6348839" y="5004731"/>
+            <a:ext cx="5119535" cy="1569660"/>
           </a:xfrm>
           <a:prstGeom prst="rect">
             <a:avLst/>
@@ -5663,136 +6827,110 @@
           </a:p>
         </p:txBody>
       </p:sp>
-    </p:spTree>
-    <p:extLst>
-      <p:ext uri="{BB962C8B-B14F-4D97-AF65-F5344CB8AC3E}">
-        <p14:creationId xmlns:p14="http://schemas.microsoft.com/office/powerpoint/2010/main" val="4078976226"/>
-      </p:ext>
-    </p:extLst>
-  </p:cSld>
-  <p:clrMapOvr>
-    <a:masterClrMapping/>
-  </p:clrMapOvr>
-</p:sld>
-</file>
-
-<file path=ppt/slides/slide6.xml><?xml version="1.0" encoding="utf-8"?>
-<p:sld xmlns:a="http://schemas.openxmlformats.org/drawingml/2006/main" xmlns:r="http://schemas.openxmlformats.org/officeDocument/2006/relationships" xmlns:p="http://schemas.openxmlformats.org/presentationml/2006/main">
-  <p:cSld>
-    <p:spTree>
-      <p:nvGrpSpPr>
-        <p:cNvPr id="1" name=""/>
-        <p:cNvGrpSpPr/>
-        <p:nvPr/>
-      </p:nvGrpSpPr>
-      <p:grpSpPr>
-        <a:xfrm>
-          <a:off x="0" y="0"/>
-          <a:ext cx="0" cy="0"/>
-          <a:chOff x="0" y="0"/>
-          <a:chExt cx="0" cy="0"/>
-        </a:xfrm>
-      </p:grpSpPr>
       <p:sp>
         <p:nvSpPr>
-          <p:cNvPr id="2" name="Title 1">
-            <a:extLst>
-              <a:ext uri="{FF2B5EF4-FFF2-40B4-BE49-F238E27FC236}">
-                <a16:creationId xmlns:a16="http://schemas.microsoft.com/office/drawing/2014/main" id="{553BC310-260C-4BBC-FFDE-C32713BA6ECC}"/>
-              </a:ext>
-            </a:extLst>
-          </p:cNvPr>
-          <p:cNvSpPr>
-            <a:spLocks noGrp="1"/>
+          <p:cNvPr id="7" name="Right Arrow 6">
+            <a:extLst>
+              <a:ext uri="{FF2B5EF4-FFF2-40B4-BE49-F238E27FC236}">
+                <a16:creationId xmlns:a16="http://schemas.microsoft.com/office/drawing/2014/main" id="{72DDD856-B9B0-F03A-0141-95D139A602A8}"/>
+              </a:ext>
+            </a:extLst>
+          </p:cNvPr>
+          <p:cNvSpPr/>
+          <p:nvPr/>
+        </p:nvSpPr>
+        <p:spPr>
+          <a:xfrm rot="14467865">
+            <a:off x="8124304" y="3692389"/>
+            <a:ext cx="502693" cy="222079"/>
+          </a:xfrm>
+          <a:prstGeom prst="rightArrow">
+            <a:avLst/>
+          </a:prstGeom>
+        </p:spPr>
+        <p:style>
+          <a:lnRef idx="2">
+            <a:schemeClr val="accent1">
+              <a:shade val="50000"/>
+            </a:schemeClr>
+          </a:lnRef>
+          <a:fillRef idx="1">
+            <a:schemeClr val="accent1"/>
+          </a:fillRef>
+          <a:effectRef idx="0">
+            <a:schemeClr val="accent1"/>
+          </a:effectRef>
+          <a:fontRef idx="minor">
+            <a:schemeClr val="lt1"/>
+          </a:fontRef>
+        </p:style>
+        <p:txBody>
+          <a:bodyPr rtlCol="0" anchor="ctr"/>
+          <a:lstStyle/>
+          <a:p>
+            <a:pPr algn="ctr"/>
+            <a:endParaRPr lang="en-US"/>
+          </a:p>
+        </p:txBody>
+      </p:sp>
+      <p:sp>
+        <p:nvSpPr>
+          <p:cNvPr id="8" name="Title 1">
+            <a:extLst>
+              <a:ext uri="{FF2B5EF4-FFF2-40B4-BE49-F238E27FC236}">
+                <a16:creationId xmlns:a16="http://schemas.microsoft.com/office/drawing/2014/main" id="{21DBB767-C1D0-3FE1-20B7-F7B71FC16971}"/>
+              </a:ext>
+            </a:extLst>
+          </p:cNvPr>
+          <p:cNvSpPr txBox="1">
+            <a:spLocks/>
           </p:cNvSpPr>
-          <p:nvPr>
-            <p:ph type="ctrTitle"/>
-          </p:nvPr>
+          <p:nvPr/>
         </p:nvSpPr>
         <p:spPr>
           <a:xfrm>
-            <a:off x="437720" y="261256"/>
-            <a:ext cx="10941480" cy="698011"/>
-          </a:xfrm>
-        </p:spPr>
-        <p:txBody>
-          <a:bodyPr>
-            <a:normAutofit/>
-          </a:bodyPr>
-          <a:lstStyle/>
-          <a:p>
-            <a:pPr algn="l"/>
-            <a:r>
-              <a:rPr lang="en-US" sz="4000" dirty="0"/>
-              <a:t>Area (time) – Normalized examples</a:t>
-            </a:r>
-          </a:p>
-        </p:txBody>
-      </p:sp>
-      <p:pic>
-        <p:nvPicPr>
-          <p:cNvPr id="12" name="Picture 11">
-            <a:extLst>
-              <a:ext uri="{FF2B5EF4-FFF2-40B4-BE49-F238E27FC236}">
-                <a16:creationId xmlns:a16="http://schemas.microsoft.com/office/drawing/2014/main" id="{DF46937E-8F41-F617-B1DE-F23DC4147622}"/>
-              </a:ext>
-            </a:extLst>
-          </p:cNvPr>
-          <p:cNvPicPr>
-            <a:picLocks noChangeAspect="1"/>
-          </p:cNvPicPr>
-          <p:nvPr/>
-        </p:nvPicPr>
-        <p:blipFill>
-          <a:blip r:embed="rId2"/>
-          <a:stretch>
-            <a:fillRect/>
-          </a:stretch>
-        </p:blipFill>
-        <p:spPr>
-          <a:xfrm>
-            <a:off x="0" y="959267"/>
-            <a:ext cx="5885659" cy="4414244"/>
+            <a:off x="8212731" y="3889764"/>
+            <a:ext cx="2476164" cy="698011"/>
           </a:xfrm>
           <a:prstGeom prst="rect">
             <a:avLst/>
           </a:prstGeom>
         </p:spPr>
-      </p:pic>
-      <p:pic>
-        <p:nvPicPr>
-          <p:cNvPr id="14" name="Picture 13">
-            <a:extLst>
-              <a:ext uri="{FF2B5EF4-FFF2-40B4-BE49-F238E27FC236}">
-                <a16:creationId xmlns:a16="http://schemas.microsoft.com/office/drawing/2014/main" id="{E4380789-A149-AA5F-B185-4F6D201FA27E}"/>
-              </a:ext>
-            </a:extLst>
-          </p:cNvPr>
-          <p:cNvPicPr>
-            <a:picLocks noChangeAspect="1"/>
-          </p:cNvPicPr>
-          <p:nvPr/>
-        </p:nvPicPr>
-        <p:blipFill>
-          <a:blip r:embed="rId3"/>
-          <a:stretch>
-            <a:fillRect/>
-          </a:stretch>
-        </p:blipFill>
-        <p:spPr>
-          <a:xfrm>
-            <a:off x="6005689" y="948267"/>
-            <a:ext cx="6096000" cy="4572000"/>
-          </a:xfrm>
-          <a:prstGeom prst="rect">
-            <a:avLst/>
-          </a:prstGeom>
-        </p:spPr>
-      </p:pic>
+        <p:txBody>
+          <a:bodyPr vert="horz" lIns="91440" tIns="45720" rIns="91440" bIns="45720" rtlCol="0" anchor="b">
+            <a:normAutofit fontScale="97500"/>
+          </a:bodyPr>
+          <a:lstStyle>
+            <a:lvl1pPr algn="ctr" defTabSz="914400" rtl="0" eaLnBrk="1" latinLnBrk="0" hangingPunct="1">
+              <a:lnSpc>
+                <a:spcPct val="90000"/>
+              </a:lnSpc>
+              <a:spcBef>
+                <a:spcPct val="0"/>
+              </a:spcBef>
+              <a:buNone/>
+              <a:defRPr sz="6000" kern="1200">
+                <a:solidFill>
+                  <a:schemeClr val="tx1"/>
+                </a:solidFill>
+                <a:latin typeface="+mj-lt"/>
+                <a:ea typeface="+mj-ea"/>
+                <a:cs typeface="+mj-cs"/>
+              </a:defRPr>
+            </a:lvl1pPr>
+          </a:lstStyle>
+          <a:p>
+            <a:r>
+              <a:rPr lang="en-US" sz="2800" dirty="0"/>
+              <a:t>Measured area</a:t>
+            </a:r>
+          </a:p>
+        </p:txBody>
+      </p:sp>
     </p:spTree>
     <p:extLst>
       <p:ext uri="{BB962C8B-B14F-4D97-AF65-F5344CB8AC3E}">
-        <p14:creationId xmlns:p14="http://schemas.microsoft.com/office/powerpoint/2010/main" val="351021535"/>
+        <p14:creationId xmlns:p14="http://schemas.microsoft.com/office/powerpoint/2010/main" val="4078976226"/>
       </p:ext>
     </p:extLst>
   </p:cSld>
@@ -5837,8 +6975,8 @@
         </p:nvSpPr>
         <p:spPr>
           <a:xfrm>
-            <a:off x="437720" y="261256"/>
-            <a:ext cx="11043080" cy="698011"/>
+            <a:off x="542166" y="294064"/>
+            <a:ext cx="10851420" cy="1559206"/>
           </a:xfrm>
         </p:spPr>
         <p:txBody>
@@ -5847,20 +6985,185 @@
           </a:bodyPr>
           <a:lstStyle/>
           <a:p>
-            <a:pPr algn="l"/>
-            <a:r>
-              <a:rPr lang="en-US" sz="4000" dirty="0"/>
-              <a:t>Area (time) – Normalized &amp; Smoothed</a:t>
-            </a:r>
+            <a:r>
+              <a:rPr lang="en-US" sz="4400" dirty="0"/>
+              <a:t>Area normalized </a:t>
+            </a:r>
+            <a:br>
+              <a:rPr lang="en-US" sz="4400" dirty="0"/>
+            </a:br>
+            <a:r>
+              <a:rPr lang="en-US" sz="4400" dirty="0"/>
+              <a:t>(testing)</a:t>
+            </a:r>
+          </a:p>
+        </p:txBody>
+      </p:sp>
+      <p:pic>
+        <p:nvPicPr>
+          <p:cNvPr id="3" name="Picture 2" descr="A picture containing font, text, white, line&#10;&#10;Description automatically generated">
+            <a:extLst>
+              <a:ext uri="{FF2B5EF4-FFF2-40B4-BE49-F238E27FC236}">
+                <a16:creationId xmlns:a16="http://schemas.microsoft.com/office/drawing/2014/main" id="{4D568181-CB4C-BE27-3C0D-F2F76C5B501F}"/>
+              </a:ext>
+            </a:extLst>
+          </p:cNvPr>
+          <p:cNvPicPr>
+            <a:picLocks noChangeAspect="1"/>
+          </p:cNvPicPr>
+          <p:nvPr/>
+        </p:nvPicPr>
+        <p:blipFill>
+          <a:blip r:embed="rId2"/>
+          <a:stretch>
+            <a:fillRect/>
+          </a:stretch>
+        </p:blipFill>
+        <p:spPr>
+          <a:xfrm>
+            <a:off x="3816350" y="2171986"/>
+            <a:ext cx="4559300" cy="1917700"/>
+          </a:xfrm>
+          <a:prstGeom prst="rect">
+            <a:avLst/>
+          </a:prstGeom>
+        </p:spPr>
+      </p:pic>
+      <p:sp>
+        <p:nvSpPr>
+          <p:cNvPr id="4" name="TextBox 3">
+            <a:extLst>
+              <a:ext uri="{FF2B5EF4-FFF2-40B4-BE49-F238E27FC236}">
+                <a16:creationId xmlns:a16="http://schemas.microsoft.com/office/drawing/2014/main" id="{1DCDEE8C-94A2-BD68-C9A0-880ECC7E3132}"/>
+              </a:ext>
+            </a:extLst>
+          </p:cNvPr>
+          <p:cNvSpPr txBox="1"/>
+          <p:nvPr/>
+        </p:nvSpPr>
+        <p:spPr>
+          <a:xfrm>
+            <a:off x="6348839" y="5004731"/>
+            <a:ext cx="5119535" cy="1569660"/>
+          </a:xfrm>
+          <a:prstGeom prst="rect">
+            <a:avLst/>
+          </a:prstGeom>
+          <a:noFill/>
+        </p:spPr>
+        <p:txBody>
+          <a:bodyPr wrap="square" rtlCol="0">
+            <a:spAutoFit/>
+          </a:bodyPr>
+          <a:lstStyle/>
+          <a:p>
+            <a:r>
+              <a:rPr lang="en-US" sz="2400" dirty="0" err="1"/>
+              <a:t>i</a:t>
+            </a:r>
+            <a:r>
+              <a:rPr lang="en-US" sz="2400" dirty="0"/>
+              <a:t> – refers to temperature </a:t>
+            </a:r>
+            <a:r>
+              <a:rPr lang="en-US" sz="2400" dirty="0" err="1"/>
+              <a:t>T</a:t>
+            </a:r>
+            <a:r>
+              <a:rPr lang="en-US" sz="2400" baseline="-25000" dirty="0" err="1"/>
+              <a:t>i</a:t>
+            </a:r>
+            <a:endParaRPr lang="en-US" sz="2400" baseline="-25000" dirty="0"/>
+          </a:p>
+          <a:p>
+            <a:r>
+              <a:rPr lang="en-US" sz="2400" dirty="0"/>
+              <a:t>ref – temperature chosen as reference</a:t>
+            </a:r>
+          </a:p>
+          <a:p>
+            <a:r>
+              <a:rPr lang="en-US" sz="2400" dirty="0"/>
+              <a:t>SAT – at saturation</a:t>
+            </a:r>
+          </a:p>
+          <a:p>
+            <a:r>
+              <a:rPr lang="en-US" sz="2400" dirty="0"/>
+              <a:t>A</a:t>
+            </a:r>
+            <a:r>
+              <a:rPr lang="en-US" sz="2400" baseline="-25000" dirty="0"/>
+              <a:t>i</a:t>
+            </a:r>
+            <a:r>
+              <a:rPr lang="en-US" sz="2400" dirty="0"/>
+              <a:t> - area for temperature </a:t>
+            </a:r>
+            <a:r>
+              <a:rPr lang="en-US" sz="2400" dirty="0" err="1"/>
+              <a:t>T</a:t>
+            </a:r>
+            <a:r>
+              <a:rPr lang="en-US" sz="2400" baseline="-25000" dirty="0" err="1"/>
+              <a:t>i</a:t>
+            </a:r>
+            <a:endParaRPr lang="en-US" sz="2400" baseline="-25000" dirty="0"/>
           </a:p>
         </p:txBody>
       </p:sp>
       <p:sp>
         <p:nvSpPr>
-          <p:cNvPr id="8" name="Title 1">
-            <a:extLst>
-              <a:ext uri="{FF2B5EF4-FFF2-40B4-BE49-F238E27FC236}">
-                <a16:creationId xmlns:a16="http://schemas.microsoft.com/office/drawing/2014/main" id="{173AEED6-DE13-28E0-B122-9E2C3B887E7C}"/>
+          <p:cNvPr id="5" name="Right Arrow 4">
+            <a:extLst>
+              <a:ext uri="{FF2B5EF4-FFF2-40B4-BE49-F238E27FC236}">
+                <a16:creationId xmlns:a16="http://schemas.microsoft.com/office/drawing/2014/main" id="{62BEC3BC-C5DD-BD9F-AE93-B65AE5A40C0D}"/>
+              </a:ext>
+            </a:extLst>
+          </p:cNvPr>
+          <p:cNvSpPr/>
+          <p:nvPr/>
+        </p:nvSpPr>
+        <p:spPr>
+          <a:xfrm rot="16838298">
+            <a:off x="3715757" y="3711121"/>
+            <a:ext cx="502693" cy="222079"/>
+          </a:xfrm>
+          <a:prstGeom prst="rightArrow">
+            <a:avLst/>
+          </a:prstGeom>
+        </p:spPr>
+        <p:style>
+          <a:lnRef idx="2">
+            <a:schemeClr val="accent1">
+              <a:shade val="50000"/>
+            </a:schemeClr>
+          </a:lnRef>
+          <a:fillRef idx="1">
+            <a:schemeClr val="accent1"/>
+          </a:fillRef>
+          <a:effectRef idx="0">
+            <a:schemeClr val="accent1"/>
+          </a:effectRef>
+          <a:fontRef idx="minor">
+            <a:schemeClr val="lt1"/>
+          </a:fontRef>
+        </p:style>
+        <p:txBody>
+          <a:bodyPr rtlCol="0" anchor="ctr"/>
+          <a:lstStyle/>
+          <a:p>
+            <a:pPr algn="ctr"/>
+            <a:endParaRPr lang="en-US"/>
+          </a:p>
+        </p:txBody>
+      </p:sp>
+      <p:sp>
+        <p:nvSpPr>
+          <p:cNvPr id="6" name="Title 1">
+            <a:extLst>
+              <a:ext uri="{FF2B5EF4-FFF2-40B4-BE49-F238E27FC236}">
+                <a16:creationId xmlns:a16="http://schemas.microsoft.com/office/drawing/2014/main" id="{8A341F61-97C8-DCA6-FDBE-865FB2D7AC35}"/>
               </a:ext>
             </a:extLst>
           </p:cNvPr>
@@ -5871,8 +7174,8 @@
         </p:nvSpPr>
         <p:spPr>
           <a:xfrm>
-            <a:off x="6855382" y="5247396"/>
-            <a:ext cx="4779870" cy="331823"/>
+            <a:off x="2548004" y="3893381"/>
+            <a:ext cx="2476164" cy="698011"/>
           </a:xfrm>
           <a:prstGeom prst="rect">
             <a:avLst/>
@@ -5880,7 +7183,7 @@
         </p:spPr>
         <p:txBody>
           <a:bodyPr vert="horz" lIns="91440" tIns="45720" rIns="91440" bIns="45720" rtlCol="0" anchor="b">
-            <a:normAutofit lnSpcReduction="10000"/>
+            <a:normAutofit fontScale="97500"/>
           </a:bodyPr>
           <a:lstStyle>
             <a:lvl1pPr algn="ctr" defTabSz="914400" rtl="0" eaLnBrk="1" latinLnBrk="0" hangingPunct="1">
@@ -5902,20 +7205,65 @@
             </a:lvl1pPr>
           </a:lstStyle>
           <a:p>
-            <a:pPr algn="l"/>
-            <a:r>
-              <a:rPr lang="en-US" sz="1800" dirty="0"/>
-              <a:t>Just normalized to 490</a:t>
+            <a:r>
+              <a:rPr lang="en-US" sz="2800" dirty="0"/>
+              <a:t>Normalized area</a:t>
             </a:r>
           </a:p>
         </p:txBody>
       </p:sp>
       <p:sp>
         <p:nvSpPr>
-          <p:cNvPr id="9" name="Title 1">
-            <a:extLst>
-              <a:ext uri="{FF2B5EF4-FFF2-40B4-BE49-F238E27FC236}">
-                <a16:creationId xmlns:a16="http://schemas.microsoft.com/office/drawing/2014/main" id="{8EC4B083-340D-949D-673B-6862F5DFFC36}"/>
+          <p:cNvPr id="7" name="Right Arrow 6">
+            <a:extLst>
+              <a:ext uri="{FF2B5EF4-FFF2-40B4-BE49-F238E27FC236}">
+                <a16:creationId xmlns:a16="http://schemas.microsoft.com/office/drawing/2014/main" id="{72DDD856-B9B0-F03A-0141-95D139A602A8}"/>
+              </a:ext>
+            </a:extLst>
+          </p:cNvPr>
+          <p:cNvSpPr/>
+          <p:nvPr/>
+        </p:nvSpPr>
+        <p:spPr>
+          <a:xfrm rot="14467865">
+            <a:off x="8124304" y="3692389"/>
+            <a:ext cx="502693" cy="222079"/>
+          </a:xfrm>
+          <a:prstGeom prst="rightArrow">
+            <a:avLst/>
+          </a:prstGeom>
+        </p:spPr>
+        <p:style>
+          <a:lnRef idx="2">
+            <a:schemeClr val="accent1">
+              <a:shade val="50000"/>
+            </a:schemeClr>
+          </a:lnRef>
+          <a:fillRef idx="1">
+            <a:schemeClr val="accent1"/>
+          </a:fillRef>
+          <a:effectRef idx="0">
+            <a:schemeClr val="accent1"/>
+          </a:effectRef>
+          <a:fontRef idx="minor">
+            <a:schemeClr val="lt1"/>
+          </a:fontRef>
+        </p:style>
+        <p:txBody>
+          <a:bodyPr rtlCol="0" anchor="ctr"/>
+          <a:lstStyle/>
+          <a:p>
+            <a:pPr algn="ctr"/>
+            <a:endParaRPr lang="en-US"/>
+          </a:p>
+        </p:txBody>
+      </p:sp>
+      <p:sp>
+        <p:nvSpPr>
+          <p:cNvPr id="8" name="Title 1">
+            <a:extLst>
+              <a:ext uri="{FF2B5EF4-FFF2-40B4-BE49-F238E27FC236}">
+                <a16:creationId xmlns:a16="http://schemas.microsoft.com/office/drawing/2014/main" id="{21DBB767-C1D0-3FE1-20B7-F7B71FC16971}"/>
               </a:ext>
             </a:extLst>
           </p:cNvPr>
@@ -5926,8 +7274,8 @@
         </p:nvSpPr>
         <p:spPr>
           <a:xfrm>
-            <a:off x="1132859" y="5277808"/>
-            <a:ext cx="4779870" cy="331823"/>
+            <a:off x="8212731" y="3889764"/>
+            <a:ext cx="2476164" cy="698011"/>
           </a:xfrm>
           <a:prstGeom prst="rect">
             <a:avLst/>
@@ -5935,7 +7283,7 @@
         </p:spPr>
         <p:txBody>
           <a:bodyPr vert="horz" lIns="91440" tIns="45720" rIns="91440" bIns="45720" rtlCol="0" anchor="b">
-            <a:normAutofit lnSpcReduction="10000"/>
+            <a:normAutofit fontScale="97500"/>
           </a:bodyPr>
           <a:lstStyle>
             <a:lvl1pPr algn="ctr" defTabSz="914400" rtl="0" eaLnBrk="1" latinLnBrk="0" hangingPunct="1">
@@ -5957,78 +7305,1631 @@
             </a:lvl1pPr>
           </a:lstStyle>
           <a:p>
-            <a:pPr algn="l"/>
-            <a:r>
-              <a:rPr lang="en-US" sz="1800" dirty="0"/>
-              <a:t>Smoothed</a:t>
+            <a:r>
+              <a:rPr lang="en-US" sz="2800" dirty="0"/>
+              <a:t>Measured area</a:t>
             </a:r>
           </a:p>
         </p:txBody>
       </p:sp>
-      <p:pic>
-        <p:nvPicPr>
-          <p:cNvPr id="11" name="Picture 10">
-            <a:extLst>
-              <a:ext uri="{FF2B5EF4-FFF2-40B4-BE49-F238E27FC236}">
-                <a16:creationId xmlns:a16="http://schemas.microsoft.com/office/drawing/2014/main" id="{E30B7DDD-8517-607D-ED92-13B27C3204BA}"/>
-              </a:ext>
-            </a:extLst>
-          </p:cNvPr>
-          <p:cNvPicPr>
-            <a:picLocks noChangeAspect="1"/>
-          </p:cNvPicPr>
+      <mc:AlternateContent xmlns:mc="http://schemas.openxmlformats.org/markup-compatibility/2006" xmlns:p14="http://schemas.microsoft.com/office/powerpoint/2010/main">
+        <mc:Choice Requires="p14">
+          <p:contentPart p14:bwMode="auto" r:id="rId3">
+            <p14:nvContentPartPr>
+              <p14:cNvPr id="41" name="Ink 40">
+                <a:extLst>
+                  <a:ext uri="{FF2B5EF4-FFF2-40B4-BE49-F238E27FC236}">
+                    <a16:creationId xmlns:a16="http://schemas.microsoft.com/office/drawing/2014/main" id="{99496E8A-DBAE-620B-EC27-1F6F575172A6}"/>
+                  </a:ext>
+                </a:extLst>
+              </p14:cNvPr>
+              <p14:cNvContentPartPr/>
+              <p14:nvPr/>
+            </p14:nvContentPartPr>
+            <p14:xfrm>
+              <a:off x="5155626" y="2465625"/>
+              <a:ext cx="2611800" cy="1665000"/>
+            </p14:xfrm>
+          </p:contentPart>
+        </mc:Choice>
+        <mc:Fallback xmlns="">
+          <p:pic>
+            <p:nvPicPr>
+              <p:cNvPr id="41" name="Ink 40">
+                <a:extLst>
+                  <a:ext uri="{FF2B5EF4-FFF2-40B4-BE49-F238E27FC236}">
+                    <a16:creationId xmlns:a16="http://schemas.microsoft.com/office/drawing/2014/main" id="{99496E8A-DBAE-620B-EC27-1F6F575172A6}"/>
+                  </a:ext>
+                </a:extLst>
+              </p:cNvPr>
+              <p:cNvPicPr/>
+              <p:nvPr/>
+            </p:nvPicPr>
+            <p:blipFill>
+              <a:blip r:embed="rId4"/>
+              <a:stretch>
+                <a:fillRect/>
+              </a:stretch>
+            </p:blipFill>
+            <p:spPr>
+              <a:xfrm>
+                <a:off x="5146986" y="2456625"/>
+                <a:ext cx="2629440" cy="1682640"/>
+              </a:xfrm>
+              <a:prstGeom prst="rect">
+                <a:avLst/>
+              </a:prstGeom>
+            </p:spPr>
+          </p:pic>
+        </mc:Fallback>
+      </mc:AlternateContent>
+      <mc:AlternateContent xmlns:mc="http://schemas.openxmlformats.org/markup-compatibility/2006" xmlns:p14="http://schemas.microsoft.com/office/powerpoint/2010/main">
+        <mc:Choice Requires="p14">
+          <p:contentPart p14:bwMode="auto" r:id="rId5">
+            <p14:nvContentPartPr>
+              <p14:cNvPr id="42" name="Ink 41">
+                <a:extLst>
+                  <a:ext uri="{FF2B5EF4-FFF2-40B4-BE49-F238E27FC236}">
+                    <a16:creationId xmlns:a16="http://schemas.microsoft.com/office/drawing/2014/main" id="{56FD0881-1302-3D2C-FEDE-41FA22F3BE73}"/>
+                  </a:ext>
+                </a:extLst>
+              </p14:cNvPr>
+              <p14:cNvContentPartPr/>
+              <p14:nvPr/>
+            </p14:nvContentPartPr>
+            <p14:xfrm>
+              <a:off x="5170386" y="2408025"/>
+              <a:ext cx="2586960" cy="1424520"/>
+            </p14:xfrm>
+          </p:contentPart>
+        </mc:Choice>
+        <mc:Fallback xmlns="">
+          <p:pic>
+            <p:nvPicPr>
+              <p:cNvPr id="42" name="Ink 41">
+                <a:extLst>
+                  <a:ext uri="{FF2B5EF4-FFF2-40B4-BE49-F238E27FC236}">
+                    <a16:creationId xmlns:a16="http://schemas.microsoft.com/office/drawing/2014/main" id="{56FD0881-1302-3D2C-FEDE-41FA22F3BE73}"/>
+                  </a:ext>
+                </a:extLst>
+              </p:cNvPr>
+              <p:cNvPicPr/>
+              <p:nvPr/>
+            </p:nvPicPr>
+            <p:blipFill>
+              <a:blip r:embed="rId6"/>
+              <a:stretch>
+                <a:fillRect/>
+              </a:stretch>
+            </p:blipFill>
+            <p:spPr>
+              <a:xfrm>
+                <a:off x="5161746" y="2399025"/>
+                <a:ext cx="2604600" cy="1442160"/>
+              </a:xfrm>
+              <a:prstGeom prst="rect">
+                <a:avLst/>
+              </a:prstGeom>
+            </p:spPr>
+          </p:pic>
+        </mc:Fallback>
+      </mc:AlternateContent>
+      <p:grpSp>
+        <p:nvGrpSpPr>
+          <p:cNvPr id="55" name="Group 54">
+            <a:extLst>
+              <a:ext uri="{FF2B5EF4-FFF2-40B4-BE49-F238E27FC236}">
+                <a16:creationId xmlns:a16="http://schemas.microsoft.com/office/drawing/2014/main" id="{07B38E3B-96E1-42A0-1196-C786C16D618D}"/>
+              </a:ext>
+            </a:extLst>
+          </p:cNvPr>
+          <p:cNvGrpSpPr/>
           <p:nvPr/>
-        </p:nvPicPr>
-        <p:blipFill>
-          <a:blip r:embed="rId2"/>
-          <a:stretch>
-            <a:fillRect/>
-          </a:stretch>
-        </p:blipFill>
-        <p:spPr>
+        </p:nvGrpSpPr>
+        <p:grpSpPr>
           <a:xfrm>
-            <a:off x="6044427" y="1127299"/>
-            <a:ext cx="5590825" cy="3909774"/>
+            <a:off x="9499386" y="3182745"/>
+            <a:ext cx="876600" cy="478800"/>
+            <a:chOff x="9499386" y="3182745"/>
+            <a:chExt cx="876600" cy="478800"/>
           </a:xfrm>
-          <a:prstGeom prst="rect">
-            <a:avLst/>
-          </a:prstGeom>
-        </p:spPr>
-      </p:pic>
-      <p:pic>
-        <p:nvPicPr>
-          <p:cNvPr id="4" name="Picture 3">
-            <a:extLst>
-              <a:ext uri="{FF2B5EF4-FFF2-40B4-BE49-F238E27FC236}">
-                <a16:creationId xmlns:a16="http://schemas.microsoft.com/office/drawing/2014/main" id="{E50F2E3C-FAE3-3E18-AC55-BBE45C14F8A7}"/>
-              </a:ext>
-            </a:extLst>
-          </p:cNvPr>
-          <p:cNvPicPr>
-            <a:picLocks noChangeAspect="1"/>
-          </p:cNvPicPr>
+        </p:grpSpPr>
+        <mc:AlternateContent xmlns:mc="http://schemas.openxmlformats.org/markup-compatibility/2006" xmlns:p14="http://schemas.microsoft.com/office/powerpoint/2010/main">
+          <mc:Choice Requires="p14">
+            <p:contentPart p14:bwMode="auto" r:id="rId7">
+              <p14:nvContentPartPr>
+                <p14:cNvPr id="44" name="Ink 43">
+                  <a:extLst>
+                    <a:ext uri="{FF2B5EF4-FFF2-40B4-BE49-F238E27FC236}">
+                      <a16:creationId xmlns:a16="http://schemas.microsoft.com/office/drawing/2014/main" id="{7A8CC5E1-C67B-212E-1CF4-6630CC4CDAAE}"/>
+                    </a:ext>
+                  </a:extLst>
+                </p14:cNvPr>
+                <p14:cNvContentPartPr/>
+                <p14:nvPr/>
+              </p14:nvContentPartPr>
+              <p14:xfrm>
+                <a:off x="9499386" y="3252225"/>
+                <a:ext cx="418680" cy="357120"/>
+              </p14:xfrm>
+            </p:contentPart>
+          </mc:Choice>
+          <mc:Fallback xmlns="">
+            <p:pic>
+              <p:nvPicPr>
+                <p:cNvPr id="44" name="Ink 43">
+                  <a:extLst>
+                    <a:ext uri="{FF2B5EF4-FFF2-40B4-BE49-F238E27FC236}">
+                      <a16:creationId xmlns:a16="http://schemas.microsoft.com/office/drawing/2014/main" id="{7A8CC5E1-C67B-212E-1CF4-6630CC4CDAAE}"/>
+                    </a:ext>
+                  </a:extLst>
+                </p:cNvPr>
+                <p:cNvPicPr/>
+                <p:nvPr/>
+              </p:nvPicPr>
+              <p:blipFill>
+                <a:blip r:embed="rId8"/>
+                <a:stretch>
+                  <a:fillRect/>
+                </a:stretch>
+              </p:blipFill>
+              <p:spPr>
+                <a:xfrm>
+                  <a:off x="9490746" y="3243225"/>
+                  <a:ext cx="436320" cy="374760"/>
+                </a:xfrm>
+                <a:prstGeom prst="rect">
+                  <a:avLst/>
+                </a:prstGeom>
+              </p:spPr>
+            </p:pic>
+          </mc:Fallback>
+        </mc:AlternateContent>
+        <mc:AlternateContent xmlns:mc="http://schemas.openxmlformats.org/markup-compatibility/2006" xmlns:p14="http://schemas.microsoft.com/office/powerpoint/2010/main">
+          <mc:Choice Requires="p14">
+            <p:contentPart p14:bwMode="auto" r:id="rId9">
+              <p14:nvContentPartPr>
+                <p14:cNvPr id="45" name="Ink 44">
+                  <a:extLst>
+                    <a:ext uri="{FF2B5EF4-FFF2-40B4-BE49-F238E27FC236}">
+                      <a16:creationId xmlns:a16="http://schemas.microsoft.com/office/drawing/2014/main" id="{FA580891-521B-88F5-3EB2-E2549514F2AC}"/>
+                    </a:ext>
+                  </a:extLst>
+                </p14:cNvPr>
+                <p14:cNvContentPartPr/>
+                <p14:nvPr/>
+              </p14:nvContentPartPr>
+              <p14:xfrm>
+                <a:off x="9512346" y="3459225"/>
+                <a:ext cx="229320" cy="9720"/>
+              </p14:xfrm>
+            </p:contentPart>
+          </mc:Choice>
+          <mc:Fallback xmlns="">
+            <p:pic>
+              <p:nvPicPr>
+                <p:cNvPr id="45" name="Ink 44">
+                  <a:extLst>
+                    <a:ext uri="{FF2B5EF4-FFF2-40B4-BE49-F238E27FC236}">
+                      <a16:creationId xmlns:a16="http://schemas.microsoft.com/office/drawing/2014/main" id="{FA580891-521B-88F5-3EB2-E2549514F2AC}"/>
+                    </a:ext>
+                  </a:extLst>
+                </p:cNvPr>
+                <p:cNvPicPr/>
+                <p:nvPr/>
+              </p:nvPicPr>
+              <p:blipFill>
+                <a:blip r:embed="rId10"/>
+                <a:stretch>
+                  <a:fillRect/>
+                </a:stretch>
+              </p:blipFill>
+              <p:spPr>
+                <a:xfrm>
+                  <a:off x="9503706" y="3450225"/>
+                  <a:ext cx="246960" cy="27360"/>
+                </a:xfrm>
+                <a:prstGeom prst="rect">
+                  <a:avLst/>
+                </a:prstGeom>
+              </p:spPr>
+            </p:pic>
+          </mc:Fallback>
+        </mc:AlternateContent>
+        <mc:AlternateContent xmlns:mc="http://schemas.openxmlformats.org/markup-compatibility/2006" xmlns:p14="http://schemas.microsoft.com/office/powerpoint/2010/main">
+          <mc:Choice Requires="p14">
+            <p:contentPart p14:bwMode="auto" r:id="rId11">
+              <p14:nvContentPartPr>
+                <p14:cNvPr id="47" name="Ink 46">
+                  <a:extLst>
+                    <a:ext uri="{FF2B5EF4-FFF2-40B4-BE49-F238E27FC236}">
+                      <a16:creationId xmlns:a16="http://schemas.microsoft.com/office/drawing/2014/main" id="{C7D54C33-C313-C8AC-9A23-0F66ECC82FB3}"/>
+                    </a:ext>
+                  </a:extLst>
+                </p14:cNvPr>
+                <p14:cNvContentPartPr/>
+                <p14:nvPr/>
+              </p14:nvContentPartPr>
+              <p14:xfrm>
+                <a:off x="10016346" y="3516825"/>
+                <a:ext cx="14040" cy="144720"/>
+              </p14:xfrm>
+            </p:contentPart>
+          </mc:Choice>
+          <mc:Fallback xmlns="">
+            <p:pic>
+              <p:nvPicPr>
+                <p:cNvPr id="47" name="Ink 46">
+                  <a:extLst>
+                    <a:ext uri="{FF2B5EF4-FFF2-40B4-BE49-F238E27FC236}">
+                      <a16:creationId xmlns:a16="http://schemas.microsoft.com/office/drawing/2014/main" id="{C7D54C33-C313-C8AC-9A23-0F66ECC82FB3}"/>
+                    </a:ext>
+                  </a:extLst>
+                </p:cNvPr>
+                <p:cNvPicPr/>
+                <p:nvPr/>
+              </p:nvPicPr>
+              <p:blipFill>
+                <a:blip r:embed="rId12"/>
+                <a:stretch>
+                  <a:fillRect/>
+                </a:stretch>
+              </p:blipFill>
+              <p:spPr>
+                <a:xfrm>
+                  <a:off x="10007706" y="3508185"/>
+                  <a:ext cx="31680" cy="162360"/>
+                </a:xfrm>
+                <a:prstGeom prst="rect">
+                  <a:avLst/>
+                </a:prstGeom>
+              </p:spPr>
+            </p:pic>
+          </mc:Fallback>
+        </mc:AlternateContent>
+        <mc:AlternateContent xmlns:mc="http://schemas.openxmlformats.org/markup-compatibility/2006" xmlns:p14="http://schemas.microsoft.com/office/powerpoint/2010/main">
+          <mc:Choice Requires="p14">
+            <p:contentPart p14:bwMode="auto" r:id="rId13">
+              <p14:nvContentPartPr>
+                <p14:cNvPr id="48" name="Ink 47">
+                  <a:extLst>
+                    <a:ext uri="{FF2B5EF4-FFF2-40B4-BE49-F238E27FC236}">
+                      <a16:creationId xmlns:a16="http://schemas.microsoft.com/office/drawing/2014/main" id="{855CB857-7B52-0A28-9CDF-BAC020B1A2F2}"/>
+                    </a:ext>
+                  </a:extLst>
+                </p14:cNvPr>
+                <p14:cNvContentPartPr/>
+                <p14:nvPr/>
+              </p14:nvContentPartPr>
+              <p14:xfrm>
+                <a:off x="10038306" y="3459225"/>
+                <a:ext cx="17280" cy="5400"/>
+              </p14:xfrm>
+            </p:contentPart>
+          </mc:Choice>
+          <mc:Fallback xmlns="">
+            <p:pic>
+              <p:nvPicPr>
+                <p:cNvPr id="48" name="Ink 47">
+                  <a:extLst>
+                    <a:ext uri="{FF2B5EF4-FFF2-40B4-BE49-F238E27FC236}">
+                      <a16:creationId xmlns:a16="http://schemas.microsoft.com/office/drawing/2014/main" id="{855CB857-7B52-0A28-9CDF-BAC020B1A2F2}"/>
+                    </a:ext>
+                  </a:extLst>
+                </p:cNvPr>
+                <p:cNvPicPr/>
+                <p:nvPr/>
+              </p:nvPicPr>
+              <p:blipFill>
+                <a:blip r:embed="rId14"/>
+                <a:stretch>
+                  <a:fillRect/>
+                </a:stretch>
+              </p:blipFill>
+              <p:spPr>
+                <a:xfrm>
+                  <a:off x="10029306" y="3450585"/>
+                  <a:ext cx="34920" cy="23040"/>
+                </a:xfrm>
+                <a:prstGeom prst="rect">
+                  <a:avLst/>
+                </a:prstGeom>
+              </p:spPr>
+            </p:pic>
+          </mc:Fallback>
+        </mc:AlternateContent>
+        <mc:AlternateContent xmlns:mc="http://schemas.openxmlformats.org/markup-compatibility/2006" xmlns:p14="http://schemas.microsoft.com/office/powerpoint/2010/main">
+          <mc:Choice Requires="p14">
+            <p:contentPart p14:bwMode="auto" r:id="rId15">
+              <p14:nvContentPartPr>
+                <p14:cNvPr id="49" name="Ink 48">
+                  <a:extLst>
+                    <a:ext uri="{FF2B5EF4-FFF2-40B4-BE49-F238E27FC236}">
+                      <a16:creationId xmlns:a16="http://schemas.microsoft.com/office/drawing/2014/main" id="{C5567997-96E4-D35A-7681-4A5F75FD8378}"/>
+                    </a:ext>
+                  </a:extLst>
+                </p14:cNvPr>
+                <p14:cNvContentPartPr/>
+                <p14:nvPr/>
+              </p14:nvContentPartPr>
+              <p14:xfrm>
+                <a:off x="9984306" y="3186705"/>
+                <a:ext cx="85320" cy="130320"/>
+              </p14:xfrm>
+            </p:contentPart>
+          </mc:Choice>
+          <mc:Fallback xmlns="">
+            <p:pic>
+              <p:nvPicPr>
+                <p:cNvPr id="49" name="Ink 48">
+                  <a:extLst>
+                    <a:ext uri="{FF2B5EF4-FFF2-40B4-BE49-F238E27FC236}">
+                      <a16:creationId xmlns:a16="http://schemas.microsoft.com/office/drawing/2014/main" id="{C5567997-96E4-D35A-7681-4A5F75FD8378}"/>
+                    </a:ext>
+                  </a:extLst>
+                </p:cNvPr>
+                <p:cNvPicPr/>
+                <p:nvPr/>
+              </p:nvPicPr>
+              <p:blipFill>
+                <a:blip r:embed="rId16"/>
+                <a:stretch>
+                  <a:fillRect/>
+                </a:stretch>
+              </p:blipFill>
+              <p:spPr>
+                <a:xfrm>
+                  <a:off x="9975666" y="3178065"/>
+                  <a:ext cx="102960" cy="147960"/>
+                </a:xfrm>
+                <a:prstGeom prst="rect">
+                  <a:avLst/>
+                </a:prstGeom>
+              </p:spPr>
+            </p:pic>
+          </mc:Fallback>
+        </mc:AlternateContent>
+        <mc:AlternateContent xmlns:mc="http://schemas.openxmlformats.org/markup-compatibility/2006" xmlns:p14="http://schemas.microsoft.com/office/powerpoint/2010/main">
+          <mc:Choice Requires="p14">
+            <p:contentPart p14:bwMode="auto" r:id="rId17">
+              <p14:nvContentPartPr>
+                <p14:cNvPr id="50" name="Ink 49">
+                  <a:extLst>
+                    <a:ext uri="{FF2B5EF4-FFF2-40B4-BE49-F238E27FC236}">
+                      <a16:creationId xmlns:a16="http://schemas.microsoft.com/office/drawing/2014/main" id="{E04BF5A5-F214-A9C0-9398-4A4D08AC80AF}"/>
+                    </a:ext>
+                  </a:extLst>
+                </p14:cNvPr>
+                <p14:cNvContentPartPr/>
+                <p14:nvPr/>
+              </p14:nvContentPartPr>
+              <p14:xfrm>
+                <a:off x="10105266" y="3182745"/>
+                <a:ext cx="115920" cy="139680"/>
+              </p14:xfrm>
+            </p:contentPart>
+          </mc:Choice>
+          <mc:Fallback xmlns="">
+            <p:pic>
+              <p:nvPicPr>
+                <p:cNvPr id="50" name="Ink 49">
+                  <a:extLst>
+                    <a:ext uri="{FF2B5EF4-FFF2-40B4-BE49-F238E27FC236}">
+                      <a16:creationId xmlns:a16="http://schemas.microsoft.com/office/drawing/2014/main" id="{E04BF5A5-F214-A9C0-9398-4A4D08AC80AF}"/>
+                    </a:ext>
+                  </a:extLst>
+                </p:cNvPr>
+                <p:cNvPicPr/>
+                <p:nvPr/>
+              </p:nvPicPr>
+              <p:blipFill>
+                <a:blip r:embed="rId18"/>
+                <a:stretch>
+                  <a:fillRect/>
+                </a:stretch>
+              </p:blipFill>
+              <p:spPr>
+                <a:xfrm>
+                  <a:off x="10096626" y="3173745"/>
+                  <a:ext cx="133560" cy="157320"/>
+                </a:xfrm>
+                <a:prstGeom prst="rect">
+                  <a:avLst/>
+                </a:prstGeom>
+              </p:spPr>
+            </p:pic>
+          </mc:Fallback>
+        </mc:AlternateContent>
+        <mc:AlternateContent xmlns:mc="http://schemas.openxmlformats.org/markup-compatibility/2006" xmlns:p14="http://schemas.microsoft.com/office/powerpoint/2010/main">
+          <mc:Choice Requires="p14">
+            <p:contentPart p14:bwMode="auto" r:id="rId19">
+              <p14:nvContentPartPr>
+                <p14:cNvPr id="51" name="Ink 50">
+                  <a:extLst>
+                    <a:ext uri="{FF2B5EF4-FFF2-40B4-BE49-F238E27FC236}">
+                      <a16:creationId xmlns:a16="http://schemas.microsoft.com/office/drawing/2014/main" id="{3D97ED9B-56B8-C616-F590-1EBF6D6F68F0}"/>
+                    </a:ext>
+                  </a:extLst>
+                </p14:cNvPr>
+                <p14:cNvContentPartPr/>
+                <p14:nvPr/>
+              </p14:nvContentPartPr>
+              <p14:xfrm>
+                <a:off x="10118226" y="3262305"/>
+                <a:ext cx="106920" cy="5400"/>
+              </p14:xfrm>
+            </p:contentPart>
+          </mc:Choice>
+          <mc:Fallback xmlns="">
+            <p:pic>
+              <p:nvPicPr>
+                <p:cNvPr id="51" name="Ink 50">
+                  <a:extLst>
+                    <a:ext uri="{FF2B5EF4-FFF2-40B4-BE49-F238E27FC236}">
+                      <a16:creationId xmlns:a16="http://schemas.microsoft.com/office/drawing/2014/main" id="{3D97ED9B-56B8-C616-F590-1EBF6D6F68F0}"/>
+                    </a:ext>
+                  </a:extLst>
+                </p:cNvPr>
+                <p:cNvPicPr/>
+                <p:nvPr/>
+              </p:nvPicPr>
+              <p:blipFill>
+                <a:blip r:embed="rId20"/>
+                <a:stretch>
+                  <a:fillRect/>
+                </a:stretch>
+              </p:blipFill>
+              <p:spPr>
+                <a:xfrm>
+                  <a:off x="10109586" y="3253305"/>
+                  <a:ext cx="124560" cy="23040"/>
+                </a:xfrm>
+                <a:prstGeom prst="rect">
+                  <a:avLst/>
+                </a:prstGeom>
+              </p:spPr>
+            </p:pic>
+          </mc:Fallback>
+        </mc:AlternateContent>
+        <mc:AlternateContent xmlns:mc="http://schemas.openxmlformats.org/markup-compatibility/2006" xmlns:p14="http://schemas.microsoft.com/office/powerpoint/2010/main">
+          <mc:Choice Requires="p14">
+            <p:contentPart p14:bwMode="auto" r:id="rId21">
+              <p14:nvContentPartPr>
+                <p14:cNvPr id="52" name="Ink 51">
+                  <a:extLst>
+                    <a:ext uri="{FF2B5EF4-FFF2-40B4-BE49-F238E27FC236}">
+                      <a16:creationId xmlns:a16="http://schemas.microsoft.com/office/drawing/2014/main" id="{FA606BF8-E89C-A418-B0F2-CA863D5C2837}"/>
+                    </a:ext>
+                  </a:extLst>
+                </p14:cNvPr>
+                <p14:cNvContentPartPr/>
+                <p14:nvPr/>
+              </p14:nvContentPartPr>
+              <p14:xfrm>
+                <a:off x="10315146" y="3184185"/>
+                <a:ext cx="7200" cy="150480"/>
+              </p14:xfrm>
+            </p:contentPart>
+          </mc:Choice>
+          <mc:Fallback xmlns="">
+            <p:pic>
+              <p:nvPicPr>
+                <p:cNvPr id="52" name="Ink 51">
+                  <a:extLst>
+                    <a:ext uri="{FF2B5EF4-FFF2-40B4-BE49-F238E27FC236}">
+                      <a16:creationId xmlns:a16="http://schemas.microsoft.com/office/drawing/2014/main" id="{FA606BF8-E89C-A418-B0F2-CA863D5C2837}"/>
+                    </a:ext>
+                  </a:extLst>
+                </p:cNvPr>
+                <p:cNvPicPr/>
+                <p:nvPr/>
+              </p:nvPicPr>
+              <p:blipFill>
+                <a:blip r:embed="rId22"/>
+                <a:stretch>
+                  <a:fillRect/>
+                </a:stretch>
+              </p:blipFill>
+              <p:spPr>
+                <a:xfrm>
+                  <a:off x="10306506" y="3175185"/>
+                  <a:ext cx="24840" cy="168120"/>
+                </a:xfrm>
+                <a:prstGeom prst="rect">
+                  <a:avLst/>
+                </a:prstGeom>
+              </p:spPr>
+            </p:pic>
+          </mc:Fallback>
+        </mc:AlternateContent>
+        <mc:AlternateContent xmlns:mc="http://schemas.openxmlformats.org/markup-compatibility/2006" xmlns:p14="http://schemas.microsoft.com/office/powerpoint/2010/main">
+          <mc:Choice Requires="p14">
+            <p:contentPart p14:bwMode="auto" r:id="rId23">
+              <p14:nvContentPartPr>
+                <p14:cNvPr id="53" name="Ink 52">
+                  <a:extLst>
+                    <a:ext uri="{FF2B5EF4-FFF2-40B4-BE49-F238E27FC236}">
+                      <a16:creationId xmlns:a16="http://schemas.microsoft.com/office/drawing/2014/main" id="{A255DE4D-22F6-408D-085E-49CED5724518}"/>
+                    </a:ext>
+                  </a:extLst>
+                </p14:cNvPr>
+                <p14:cNvContentPartPr/>
+                <p14:nvPr/>
+              </p14:nvContentPartPr>
+              <p14:xfrm>
+                <a:off x="10277346" y="3195345"/>
+                <a:ext cx="98640" cy="4320"/>
+              </p14:xfrm>
+            </p:contentPart>
+          </mc:Choice>
+          <mc:Fallback xmlns="">
+            <p:pic>
+              <p:nvPicPr>
+                <p:cNvPr id="53" name="Ink 52">
+                  <a:extLst>
+                    <a:ext uri="{FF2B5EF4-FFF2-40B4-BE49-F238E27FC236}">
+                      <a16:creationId xmlns:a16="http://schemas.microsoft.com/office/drawing/2014/main" id="{A255DE4D-22F6-408D-085E-49CED5724518}"/>
+                    </a:ext>
+                  </a:extLst>
+                </p:cNvPr>
+                <p:cNvPicPr/>
+                <p:nvPr/>
+              </p:nvPicPr>
+              <p:blipFill>
+                <a:blip r:embed="rId24"/>
+                <a:stretch>
+                  <a:fillRect/>
+                </a:stretch>
+              </p:blipFill>
+              <p:spPr>
+                <a:xfrm>
+                  <a:off x="10268706" y="3186705"/>
+                  <a:ext cx="116280" cy="21960"/>
+                </a:xfrm>
+                <a:prstGeom prst="rect">
+                  <a:avLst/>
+                </a:prstGeom>
+              </p:spPr>
+            </p:pic>
+          </mc:Fallback>
+        </mc:AlternateContent>
+      </p:grpSp>
+      <p:grpSp>
+        <p:nvGrpSpPr>
+          <p:cNvPr id="65" name="Group 64">
+            <a:extLst>
+              <a:ext uri="{FF2B5EF4-FFF2-40B4-BE49-F238E27FC236}">
+                <a16:creationId xmlns:a16="http://schemas.microsoft.com/office/drawing/2014/main" id="{9594C3BB-5DA3-8FBB-D3E3-99750E83401F}"/>
+              </a:ext>
+            </a:extLst>
+          </p:cNvPr>
+          <p:cNvGrpSpPr/>
           <p:nvPr/>
-        </p:nvPicPr>
-        <p:blipFill>
-          <a:blip r:embed="rId3"/>
-          <a:stretch>
-            <a:fillRect/>
-          </a:stretch>
-        </p:blipFill>
-        <p:spPr>
+        </p:nvGrpSpPr>
+        <p:grpSpPr>
           <a:xfrm>
-            <a:off x="530436" y="1127299"/>
-            <a:ext cx="5513991" cy="3909774"/>
+            <a:off x="8647266" y="2864505"/>
+            <a:ext cx="2498400" cy="480240"/>
+            <a:chOff x="8647266" y="2864505"/>
+            <a:chExt cx="2498400" cy="480240"/>
           </a:xfrm>
-          <a:prstGeom prst="rect">
-            <a:avLst/>
-          </a:prstGeom>
-        </p:spPr>
-      </p:pic>
+        </p:grpSpPr>
+        <mc:AlternateContent xmlns:mc="http://schemas.openxmlformats.org/markup-compatibility/2006" xmlns:p14="http://schemas.microsoft.com/office/powerpoint/2010/main">
+          <mc:Choice Requires="p14">
+            <p:contentPart p14:bwMode="auto" r:id="rId25">
+              <p14:nvContentPartPr>
+                <p14:cNvPr id="57" name="Ink 56">
+                  <a:extLst>
+                    <a:ext uri="{FF2B5EF4-FFF2-40B4-BE49-F238E27FC236}">
+                      <a16:creationId xmlns:a16="http://schemas.microsoft.com/office/drawing/2014/main" id="{13A2EFA2-9C51-4057-202E-EF8B0B27A6AD}"/>
+                    </a:ext>
+                  </a:extLst>
+                </p14:cNvPr>
+                <p14:cNvContentPartPr/>
+                <p14:nvPr/>
+              </p14:nvContentPartPr>
+              <p14:xfrm>
+                <a:off x="8647986" y="3164385"/>
+                <a:ext cx="141120" cy="7560"/>
+              </p14:xfrm>
+            </p:contentPart>
+          </mc:Choice>
+          <mc:Fallback xmlns="">
+            <p:pic>
+              <p:nvPicPr>
+                <p:cNvPr id="57" name="Ink 56">
+                  <a:extLst>
+                    <a:ext uri="{FF2B5EF4-FFF2-40B4-BE49-F238E27FC236}">
+                      <a16:creationId xmlns:a16="http://schemas.microsoft.com/office/drawing/2014/main" id="{13A2EFA2-9C51-4057-202E-EF8B0B27A6AD}"/>
+                    </a:ext>
+                  </a:extLst>
+                </p:cNvPr>
+                <p:cNvPicPr/>
+                <p:nvPr/>
+              </p:nvPicPr>
+              <p:blipFill>
+                <a:blip r:embed="rId26"/>
+                <a:stretch>
+                  <a:fillRect/>
+                </a:stretch>
+              </p:blipFill>
+              <p:spPr>
+                <a:xfrm>
+                  <a:off x="8639346" y="3155385"/>
+                  <a:ext cx="158760" cy="25200"/>
+                </a:xfrm>
+                <a:prstGeom prst="rect">
+                  <a:avLst/>
+                </a:prstGeom>
+              </p:spPr>
+            </p:pic>
+          </mc:Fallback>
+        </mc:AlternateContent>
+        <mc:AlternateContent xmlns:mc="http://schemas.openxmlformats.org/markup-compatibility/2006" xmlns:p14="http://schemas.microsoft.com/office/powerpoint/2010/main">
+          <mc:Choice Requires="p14">
+            <p:contentPart p14:bwMode="auto" r:id="rId27">
+              <p14:nvContentPartPr>
+                <p14:cNvPr id="56" name="Ink 55">
+                  <a:extLst>
+                    <a:ext uri="{FF2B5EF4-FFF2-40B4-BE49-F238E27FC236}">
+                      <a16:creationId xmlns:a16="http://schemas.microsoft.com/office/drawing/2014/main" id="{BC5DFA67-D954-62FF-02A5-A093A8BE2AAA}"/>
+                    </a:ext>
+                  </a:extLst>
+                </p14:cNvPr>
+                <p14:cNvContentPartPr/>
+                <p14:nvPr/>
+              </p14:nvContentPartPr>
+              <p14:xfrm>
+                <a:off x="8647266" y="3079425"/>
+                <a:ext cx="127440" cy="3240"/>
+              </p14:xfrm>
+            </p:contentPart>
+          </mc:Choice>
+          <mc:Fallback xmlns="">
+            <p:pic>
+              <p:nvPicPr>
+                <p:cNvPr id="56" name="Ink 55">
+                  <a:extLst>
+                    <a:ext uri="{FF2B5EF4-FFF2-40B4-BE49-F238E27FC236}">
+                      <a16:creationId xmlns:a16="http://schemas.microsoft.com/office/drawing/2014/main" id="{BC5DFA67-D954-62FF-02A5-A093A8BE2AAA}"/>
+                    </a:ext>
+                  </a:extLst>
+                </p:cNvPr>
+                <p:cNvPicPr/>
+                <p:nvPr/>
+              </p:nvPicPr>
+              <p:blipFill>
+                <a:blip r:embed="rId28"/>
+                <a:stretch>
+                  <a:fillRect/>
+                </a:stretch>
+              </p:blipFill>
+              <p:spPr>
+                <a:xfrm>
+                  <a:off x="8638626" y="3070425"/>
+                  <a:ext cx="145080" cy="20880"/>
+                </a:xfrm>
+                <a:prstGeom prst="rect">
+                  <a:avLst/>
+                </a:prstGeom>
+              </p:spPr>
+            </p:pic>
+          </mc:Fallback>
+        </mc:AlternateContent>
+        <mc:AlternateContent xmlns:mc="http://schemas.openxmlformats.org/markup-compatibility/2006" xmlns:p14="http://schemas.microsoft.com/office/powerpoint/2010/main">
+          <mc:Choice Requires="p14">
+            <p:contentPart p14:bwMode="auto" r:id="rId29">
+              <p14:nvContentPartPr>
+                <p14:cNvPr id="58" name="Ink 57">
+                  <a:extLst>
+                    <a:ext uri="{FF2B5EF4-FFF2-40B4-BE49-F238E27FC236}">
+                      <a16:creationId xmlns:a16="http://schemas.microsoft.com/office/drawing/2014/main" id="{17C4CA82-8070-AA91-0DC8-CF1E8E4971D4}"/>
+                    </a:ext>
+                  </a:extLst>
+                </p14:cNvPr>
+                <p14:cNvContentPartPr/>
+                <p14:nvPr/>
+              </p14:nvContentPartPr>
+              <p14:xfrm>
+                <a:off x="9031026" y="3071145"/>
+                <a:ext cx="1494000" cy="17280"/>
+              </p14:xfrm>
+            </p:contentPart>
+          </mc:Choice>
+          <mc:Fallback xmlns="">
+            <p:pic>
+              <p:nvPicPr>
+                <p:cNvPr id="58" name="Ink 57">
+                  <a:extLst>
+                    <a:ext uri="{FF2B5EF4-FFF2-40B4-BE49-F238E27FC236}">
+                      <a16:creationId xmlns:a16="http://schemas.microsoft.com/office/drawing/2014/main" id="{17C4CA82-8070-AA91-0DC8-CF1E8E4971D4}"/>
+                    </a:ext>
+                  </a:extLst>
+                </p:cNvPr>
+                <p:cNvPicPr/>
+                <p:nvPr/>
+              </p:nvPicPr>
+              <p:blipFill>
+                <a:blip r:embed="rId30"/>
+                <a:stretch>
+                  <a:fillRect/>
+                </a:stretch>
+              </p:blipFill>
+              <p:spPr>
+                <a:xfrm>
+                  <a:off x="9022386" y="3062505"/>
+                  <a:ext cx="1511640" cy="34920"/>
+                </a:xfrm>
+                <a:prstGeom prst="rect">
+                  <a:avLst/>
+                </a:prstGeom>
+              </p:spPr>
+            </p:pic>
+          </mc:Fallback>
+        </mc:AlternateContent>
+        <mc:AlternateContent xmlns:mc="http://schemas.openxmlformats.org/markup-compatibility/2006" xmlns:p14="http://schemas.microsoft.com/office/powerpoint/2010/main">
+          <mc:Choice Requires="p14">
+            <p:contentPart p14:bwMode="auto" r:id="rId31">
+              <p14:nvContentPartPr>
+                <p14:cNvPr id="61" name="Ink 60">
+                  <a:extLst>
+                    <a:ext uri="{FF2B5EF4-FFF2-40B4-BE49-F238E27FC236}">
+                      <a16:creationId xmlns:a16="http://schemas.microsoft.com/office/drawing/2014/main" id="{6A16CA25-656F-7376-9720-5C3C0E6309B2}"/>
+                    </a:ext>
+                  </a:extLst>
+                </p14:cNvPr>
+                <p14:cNvContentPartPr/>
+                <p14:nvPr/>
+              </p14:nvContentPartPr>
+              <p14:xfrm>
+                <a:off x="10704306" y="2864505"/>
+                <a:ext cx="340200" cy="456480"/>
+              </p14:xfrm>
+            </p:contentPart>
+          </mc:Choice>
+          <mc:Fallback xmlns="">
+            <p:pic>
+              <p:nvPicPr>
+                <p:cNvPr id="61" name="Ink 60">
+                  <a:extLst>
+                    <a:ext uri="{FF2B5EF4-FFF2-40B4-BE49-F238E27FC236}">
+                      <a16:creationId xmlns:a16="http://schemas.microsoft.com/office/drawing/2014/main" id="{6A16CA25-656F-7376-9720-5C3C0E6309B2}"/>
+                    </a:ext>
+                  </a:extLst>
+                </p:cNvPr>
+                <p:cNvPicPr/>
+                <p:nvPr/>
+              </p:nvPicPr>
+              <p:blipFill>
+                <a:blip r:embed="rId32"/>
+                <a:stretch>
+                  <a:fillRect/>
+                </a:stretch>
+              </p:blipFill>
+              <p:spPr>
+                <a:xfrm>
+                  <a:off x="10695306" y="2855505"/>
+                  <a:ext cx="357840" cy="474120"/>
+                </a:xfrm>
+                <a:prstGeom prst="rect">
+                  <a:avLst/>
+                </a:prstGeom>
+              </p:spPr>
+            </p:pic>
+          </mc:Fallback>
+        </mc:AlternateContent>
+        <mc:AlternateContent xmlns:mc="http://schemas.openxmlformats.org/markup-compatibility/2006" xmlns:p14="http://schemas.microsoft.com/office/powerpoint/2010/main">
+          <mc:Choice Requires="p14">
+            <p:contentPart p14:bwMode="auto" r:id="rId33">
+              <p14:nvContentPartPr>
+                <p14:cNvPr id="62" name="Ink 61">
+                  <a:extLst>
+                    <a:ext uri="{FF2B5EF4-FFF2-40B4-BE49-F238E27FC236}">
+                      <a16:creationId xmlns:a16="http://schemas.microsoft.com/office/drawing/2014/main" id="{8818DC1E-D71A-BF07-E743-3647F2B7D511}"/>
+                    </a:ext>
+                  </a:extLst>
+                </p14:cNvPr>
+                <p14:cNvContentPartPr/>
+                <p14:nvPr/>
+              </p14:nvContentPartPr>
+              <p14:xfrm>
+                <a:off x="10769106" y="3133425"/>
+                <a:ext cx="208440" cy="3240"/>
+              </p14:xfrm>
+            </p:contentPart>
+          </mc:Choice>
+          <mc:Fallback xmlns="">
+            <p:pic>
+              <p:nvPicPr>
+                <p:cNvPr id="62" name="Ink 61">
+                  <a:extLst>
+                    <a:ext uri="{FF2B5EF4-FFF2-40B4-BE49-F238E27FC236}">
+                      <a16:creationId xmlns:a16="http://schemas.microsoft.com/office/drawing/2014/main" id="{8818DC1E-D71A-BF07-E743-3647F2B7D511}"/>
+                    </a:ext>
+                  </a:extLst>
+                </p:cNvPr>
+                <p:cNvPicPr/>
+                <p:nvPr/>
+              </p:nvPicPr>
+              <p:blipFill>
+                <a:blip r:embed="rId34"/>
+                <a:stretch>
+                  <a:fillRect/>
+                </a:stretch>
+              </p:blipFill>
+              <p:spPr>
+                <a:xfrm>
+                  <a:off x="10760106" y="3124785"/>
+                  <a:ext cx="226080" cy="20880"/>
+                </a:xfrm>
+                <a:prstGeom prst="rect">
+                  <a:avLst/>
+                </a:prstGeom>
+              </p:spPr>
+            </p:pic>
+          </mc:Fallback>
+        </mc:AlternateContent>
+        <mc:AlternateContent xmlns:mc="http://schemas.openxmlformats.org/markup-compatibility/2006" xmlns:p14="http://schemas.microsoft.com/office/powerpoint/2010/main">
+          <mc:Choice Requires="p14">
+            <p:contentPart p14:bwMode="auto" r:id="rId35">
+              <p14:nvContentPartPr>
+                <p14:cNvPr id="63" name="Ink 62">
+                  <a:extLst>
+                    <a:ext uri="{FF2B5EF4-FFF2-40B4-BE49-F238E27FC236}">
+                      <a16:creationId xmlns:a16="http://schemas.microsoft.com/office/drawing/2014/main" id="{B238E0DF-EC12-52EE-81B6-92D4C6D01E00}"/>
+                    </a:ext>
+                  </a:extLst>
+                </p14:cNvPr>
+                <p14:cNvContentPartPr/>
+                <p14:nvPr/>
+              </p14:nvContentPartPr>
+              <p14:xfrm>
+                <a:off x="11123346" y="3220185"/>
+                <a:ext cx="5400" cy="124560"/>
+              </p14:xfrm>
+            </p:contentPart>
+          </mc:Choice>
+          <mc:Fallback xmlns="">
+            <p:pic>
+              <p:nvPicPr>
+                <p:cNvPr id="63" name="Ink 62">
+                  <a:extLst>
+                    <a:ext uri="{FF2B5EF4-FFF2-40B4-BE49-F238E27FC236}">
+                      <a16:creationId xmlns:a16="http://schemas.microsoft.com/office/drawing/2014/main" id="{B238E0DF-EC12-52EE-81B6-92D4C6D01E00}"/>
+                    </a:ext>
+                  </a:extLst>
+                </p:cNvPr>
+                <p:cNvPicPr/>
+                <p:nvPr/>
+              </p:nvPicPr>
+              <p:blipFill>
+                <a:blip r:embed="rId36"/>
+                <a:stretch>
+                  <a:fillRect/>
+                </a:stretch>
+              </p:blipFill>
+              <p:spPr>
+                <a:xfrm>
+                  <a:off x="11114706" y="3211545"/>
+                  <a:ext cx="23040" cy="142200"/>
+                </a:xfrm>
+                <a:prstGeom prst="rect">
+                  <a:avLst/>
+                </a:prstGeom>
+              </p:spPr>
+            </p:pic>
+          </mc:Fallback>
+        </mc:AlternateContent>
+        <mc:AlternateContent xmlns:mc="http://schemas.openxmlformats.org/markup-compatibility/2006" xmlns:p14="http://schemas.microsoft.com/office/powerpoint/2010/main">
+          <mc:Choice Requires="p14">
+            <p:contentPart p14:bwMode="auto" r:id="rId37">
+              <p14:nvContentPartPr>
+                <p14:cNvPr id="64" name="Ink 63">
+                  <a:extLst>
+                    <a:ext uri="{FF2B5EF4-FFF2-40B4-BE49-F238E27FC236}">
+                      <a16:creationId xmlns:a16="http://schemas.microsoft.com/office/drawing/2014/main" id="{D4A8B3F5-3AC6-7879-A8AE-553AF0C42F3E}"/>
+                    </a:ext>
+                  </a:extLst>
+                </p14:cNvPr>
+                <p14:cNvContentPartPr/>
+                <p14:nvPr/>
+              </p14:nvContentPartPr>
+              <p14:xfrm>
+                <a:off x="11142786" y="3153225"/>
+                <a:ext cx="2880" cy="360"/>
+              </p14:xfrm>
+            </p:contentPart>
+          </mc:Choice>
+          <mc:Fallback xmlns="">
+            <p:pic>
+              <p:nvPicPr>
+                <p:cNvPr id="64" name="Ink 63">
+                  <a:extLst>
+                    <a:ext uri="{FF2B5EF4-FFF2-40B4-BE49-F238E27FC236}">
+                      <a16:creationId xmlns:a16="http://schemas.microsoft.com/office/drawing/2014/main" id="{D4A8B3F5-3AC6-7879-A8AE-553AF0C42F3E}"/>
+                    </a:ext>
+                  </a:extLst>
+                </p:cNvPr>
+                <p:cNvPicPr/>
+                <p:nvPr/>
+              </p:nvPicPr>
+              <p:blipFill>
+                <a:blip r:embed="rId38"/>
+                <a:stretch>
+                  <a:fillRect/>
+                </a:stretch>
+              </p:blipFill>
+              <p:spPr>
+                <a:xfrm>
+                  <a:off x="11133786" y="3144585"/>
+                  <a:ext cx="20520" cy="18000"/>
+                </a:xfrm>
+                <a:prstGeom prst="rect">
+                  <a:avLst/>
+                </a:prstGeom>
+              </p:spPr>
+            </p:pic>
+          </mc:Fallback>
+        </mc:AlternateContent>
+      </p:grpSp>
+      <p:grpSp>
+        <p:nvGrpSpPr>
+          <p:cNvPr id="72" name="Group 71">
+            <a:extLst>
+              <a:ext uri="{FF2B5EF4-FFF2-40B4-BE49-F238E27FC236}">
+                <a16:creationId xmlns:a16="http://schemas.microsoft.com/office/drawing/2014/main" id="{0AD42226-A60A-6649-CDD0-C622DBB63E10}"/>
+              </a:ext>
+            </a:extLst>
+          </p:cNvPr>
+          <p:cNvGrpSpPr/>
+          <p:nvPr/>
+        </p:nvGrpSpPr>
+        <p:grpSpPr>
+          <a:xfrm>
+            <a:off x="9616746" y="2499105"/>
+            <a:ext cx="630720" cy="413280"/>
+            <a:chOff x="9616746" y="2499105"/>
+            <a:chExt cx="630720" cy="413280"/>
+          </a:xfrm>
+        </p:grpSpPr>
+        <mc:AlternateContent xmlns:mc="http://schemas.openxmlformats.org/markup-compatibility/2006" xmlns:p14="http://schemas.microsoft.com/office/powerpoint/2010/main">
+          <mc:Choice Requires="p14">
+            <p:contentPart p14:bwMode="auto" r:id="rId39">
+              <p14:nvContentPartPr>
+                <p14:cNvPr id="66" name="Ink 65">
+                  <a:extLst>
+                    <a:ext uri="{FF2B5EF4-FFF2-40B4-BE49-F238E27FC236}">
+                      <a16:creationId xmlns:a16="http://schemas.microsoft.com/office/drawing/2014/main" id="{8186AEDA-28C6-CC9D-4A24-913E3B5DD415}"/>
+                    </a:ext>
+                  </a:extLst>
+                </p14:cNvPr>
+                <p14:cNvContentPartPr/>
+                <p14:nvPr/>
+              </p14:nvContentPartPr>
+              <p14:xfrm>
+                <a:off x="9616746" y="2499105"/>
+                <a:ext cx="254160" cy="335520"/>
+              </p14:xfrm>
+            </p:contentPart>
+          </mc:Choice>
+          <mc:Fallback xmlns="">
+            <p:pic>
+              <p:nvPicPr>
+                <p:cNvPr id="66" name="Ink 65">
+                  <a:extLst>
+                    <a:ext uri="{FF2B5EF4-FFF2-40B4-BE49-F238E27FC236}">
+                      <a16:creationId xmlns:a16="http://schemas.microsoft.com/office/drawing/2014/main" id="{8186AEDA-28C6-CC9D-4A24-913E3B5DD415}"/>
+                    </a:ext>
+                  </a:extLst>
+                </p:cNvPr>
+                <p:cNvPicPr/>
+                <p:nvPr/>
+              </p:nvPicPr>
+              <p:blipFill>
+                <a:blip r:embed="rId40"/>
+                <a:stretch>
+                  <a:fillRect/>
+                </a:stretch>
+              </p:blipFill>
+              <p:spPr>
+                <a:xfrm>
+                  <a:off x="9607746" y="2490465"/>
+                  <a:ext cx="271800" cy="353160"/>
+                </a:xfrm>
+                <a:prstGeom prst="rect">
+                  <a:avLst/>
+                </a:prstGeom>
+              </p:spPr>
+            </p:pic>
+          </mc:Fallback>
+        </mc:AlternateContent>
+        <mc:AlternateContent xmlns:mc="http://schemas.openxmlformats.org/markup-compatibility/2006" xmlns:p14="http://schemas.microsoft.com/office/powerpoint/2010/main">
+          <mc:Choice Requires="p14">
+            <p:contentPart p14:bwMode="auto" r:id="rId41">
+              <p14:nvContentPartPr>
+                <p14:cNvPr id="67" name="Ink 66">
+                  <a:extLst>
+                    <a:ext uri="{FF2B5EF4-FFF2-40B4-BE49-F238E27FC236}">
+                      <a16:creationId xmlns:a16="http://schemas.microsoft.com/office/drawing/2014/main" id="{28DA6AB9-19CD-CDCC-5EAD-C47B3FCE9007}"/>
+                    </a:ext>
+                  </a:extLst>
+                </p14:cNvPr>
+                <p14:cNvContentPartPr/>
+                <p14:nvPr/>
+              </p14:nvContentPartPr>
+              <p14:xfrm>
+                <a:off x="9666786" y="2682345"/>
+                <a:ext cx="159840" cy="5760"/>
+              </p14:xfrm>
+            </p:contentPart>
+          </mc:Choice>
+          <mc:Fallback xmlns="">
+            <p:pic>
+              <p:nvPicPr>
+                <p:cNvPr id="67" name="Ink 66">
+                  <a:extLst>
+                    <a:ext uri="{FF2B5EF4-FFF2-40B4-BE49-F238E27FC236}">
+                      <a16:creationId xmlns:a16="http://schemas.microsoft.com/office/drawing/2014/main" id="{28DA6AB9-19CD-CDCC-5EAD-C47B3FCE9007}"/>
+                    </a:ext>
+                  </a:extLst>
+                </p:cNvPr>
+                <p:cNvPicPr/>
+                <p:nvPr/>
+              </p:nvPicPr>
+              <p:blipFill>
+                <a:blip r:embed="rId42"/>
+                <a:stretch>
+                  <a:fillRect/>
+                </a:stretch>
+              </p:blipFill>
+              <p:spPr>
+                <a:xfrm>
+                  <a:off x="9657786" y="2673345"/>
+                  <a:ext cx="177480" cy="23400"/>
+                </a:xfrm>
+                <a:prstGeom prst="rect">
+                  <a:avLst/>
+                </a:prstGeom>
+              </p:spPr>
+            </p:pic>
+          </mc:Fallback>
+        </mc:AlternateContent>
+        <mc:AlternateContent xmlns:mc="http://schemas.openxmlformats.org/markup-compatibility/2006" xmlns:p14="http://schemas.microsoft.com/office/powerpoint/2010/main">
+          <mc:Choice Requires="p14">
+            <p:contentPart p14:bwMode="auto" r:id="rId43">
+              <p14:nvContentPartPr>
+                <p14:cNvPr id="68" name="Ink 67">
+                  <a:extLst>
+                    <a:ext uri="{FF2B5EF4-FFF2-40B4-BE49-F238E27FC236}">
+                      <a16:creationId xmlns:a16="http://schemas.microsoft.com/office/drawing/2014/main" id="{793E379F-FBBA-DC49-9703-79581EBEB840}"/>
+                    </a:ext>
+                  </a:extLst>
+                </p14:cNvPr>
+                <p14:cNvContentPartPr/>
+                <p14:nvPr/>
+              </p14:nvContentPartPr>
+              <p14:xfrm>
+                <a:off x="9920946" y="2762985"/>
+                <a:ext cx="73080" cy="106200"/>
+              </p14:xfrm>
+            </p:contentPart>
+          </mc:Choice>
+          <mc:Fallback xmlns="">
+            <p:pic>
+              <p:nvPicPr>
+                <p:cNvPr id="68" name="Ink 67">
+                  <a:extLst>
+                    <a:ext uri="{FF2B5EF4-FFF2-40B4-BE49-F238E27FC236}">
+                      <a16:creationId xmlns:a16="http://schemas.microsoft.com/office/drawing/2014/main" id="{793E379F-FBBA-DC49-9703-79581EBEB840}"/>
+                    </a:ext>
+                  </a:extLst>
+                </p:cNvPr>
+                <p:cNvPicPr/>
+                <p:nvPr/>
+              </p:nvPicPr>
+              <p:blipFill>
+                <a:blip r:embed="rId44"/>
+                <a:stretch>
+                  <a:fillRect/>
+                </a:stretch>
+              </p:blipFill>
+              <p:spPr>
+                <a:xfrm>
+                  <a:off x="9912306" y="2753985"/>
+                  <a:ext cx="90720" cy="123840"/>
+                </a:xfrm>
+                <a:prstGeom prst="rect">
+                  <a:avLst/>
+                </a:prstGeom>
+              </p:spPr>
+            </p:pic>
+          </mc:Fallback>
+        </mc:AlternateContent>
+        <mc:AlternateContent xmlns:mc="http://schemas.openxmlformats.org/markup-compatibility/2006" xmlns:p14="http://schemas.microsoft.com/office/powerpoint/2010/main">
+          <mc:Choice Requires="p14">
+            <p:contentPart p14:bwMode="auto" r:id="rId45">
+              <p14:nvContentPartPr>
+                <p14:cNvPr id="69" name="Ink 68">
+                  <a:extLst>
+                    <a:ext uri="{FF2B5EF4-FFF2-40B4-BE49-F238E27FC236}">
+                      <a16:creationId xmlns:a16="http://schemas.microsoft.com/office/drawing/2014/main" id="{1DABCF0D-6E01-68E0-7E7B-AB54D1B7C083}"/>
+                    </a:ext>
+                  </a:extLst>
+                </p14:cNvPr>
+                <p14:cNvContentPartPr/>
+                <p14:nvPr/>
+              </p14:nvContentPartPr>
+              <p14:xfrm>
+                <a:off x="10031106" y="2786385"/>
+                <a:ext cx="61560" cy="102600"/>
+              </p14:xfrm>
+            </p:contentPart>
+          </mc:Choice>
+          <mc:Fallback xmlns="">
+            <p:pic>
+              <p:nvPicPr>
+                <p:cNvPr id="69" name="Ink 68">
+                  <a:extLst>
+                    <a:ext uri="{FF2B5EF4-FFF2-40B4-BE49-F238E27FC236}">
+                      <a16:creationId xmlns:a16="http://schemas.microsoft.com/office/drawing/2014/main" id="{1DABCF0D-6E01-68E0-7E7B-AB54D1B7C083}"/>
+                    </a:ext>
+                  </a:extLst>
+                </p:cNvPr>
+                <p:cNvPicPr/>
+                <p:nvPr/>
+              </p:nvPicPr>
+              <p:blipFill>
+                <a:blip r:embed="rId46"/>
+                <a:stretch>
+                  <a:fillRect/>
+                </a:stretch>
+              </p:blipFill>
+              <p:spPr>
+                <a:xfrm>
+                  <a:off x="10022106" y="2777745"/>
+                  <a:ext cx="79200" cy="120240"/>
+                </a:xfrm>
+                <a:prstGeom prst="rect">
+                  <a:avLst/>
+                </a:prstGeom>
+              </p:spPr>
+            </p:pic>
+          </mc:Fallback>
+        </mc:AlternateContent>
+        <mc:AlternateContent xmlns:mc="http://schemas.openxmlformats.org/markup-compatibility/2006" xmlns:p14="http://schemas.microsoft.com/office/powerpoint/2010/main">
+          <mc:Choice Requires="p14">
+            <p:contentPart p14:bwMode="auto" r:id="rId47">
+              <p14:nvContentPartPr>
+                <p14:cNvPr id="70" name="Ink 69">
+                  <a:extLst>
+                    <a:ext uri="{FF2B5EF4-FFF2-40B4-BE49-F238E27FC236}">
+                      <a16:creationId xmlns:a16="http://schemas.microsoft.com/office/drawing/2014/main" id="{1834A17D-C6E4-DB30-C693-FE9CBE091AFC}"/>
+                    </a:ext>
+                  </a:extLst>
+                </p14:cNvPr>
+                <p14:cNvContentPartPr/>
+                <p14:nvPr/>
+              </p14:nvContentPartPr>
+              <p14:xfrm>
+                <a:off x="10156026" y="2691345"/>
+                <a:ext cx="49680" cy="221040"/>
+              </p14:xfrm>
+            </p:contentPart>
+          </mc:Choice>
+          <mc:Fallback xmlns="">
+            <p:pic>
+              <p:nvPicPr>
+                <p:cNvPr id="70" name="Ink 69">
+                  <a:extLst>
+                    <a:ext uri="{FF2B5EF4-FFF2-40B4-BE49-F238E27FC236}">
+                      <a16:creationId xmlns:a16="http://schemas.microsoft.com/office/drawing/2014/main" id="{1834A17D-C6E4-DB30-C693-FE9CBE091AFC}"/>
+                    </a:ext>
+                  </a:extLst>
+                </p:cNvPr>
+                <p:cNvPicPr/>
+                <p:nvPr/>
+              </p:nvPicPr>
+              <p:blipFill>
+                <a:blip r:embed="rId48"/>
+                <a:stretch>
+                  <a:fillRect/>
+                </a:stretch>
+              </p:blipFill>
+              <p:spPr>
+                <a:xfrm>
+                  <a:off x="10147386" y="2682345"/>
+                  <a:ext cx="67320" cy="238680"/>
+                </a:xfrm>
+                <a:prstGeom prst="rect">
+                  <a:avLst/>
+                </a:prstGeom>
+              </p:spPr>
+            </p:pic>
+          </mc:Fallback>
+        </mc:AlternateContent>
+        <mc:AlternateContent xmlns:mc="http://schemas.openxmlformats.org/markup-compatibility/2006" xmlns:p14="http://schemas.microsoft.com/office/powerpoint/2010/main">
+          <mc:Choice Requires="p14">
+            <p:contentPart p14:bwMode="auto" r:id="rId49">
+              <p14:nvContentPartPr>
+                <p14:cNvPr id="71" name="Ink 70">
+                  <a:extLst>
+                    <a:ext uri="{FF2B5EF4-FFF2-40B4-BE49-F238E27FC236}">
+                      <a16:creationId xmlns:a16="http://schemas.microsoft.com/office/drawing/2014/main" id="{2184D7AB-2E7C-3126-C955-A85F42C5CBC8}"/>
+                    </a:ext>
+                  </a:extLst>
+                </p14:cNvPr>
+                <p14:cNvContentPartPr/>
+                <p14:nvPr/>
+              </p14:nvContentPartPr>
+              <p14:xfrm>
+                <a:off x="10155306" y="2780985"/>
+                <a:ext cx="92160" cy="4680"/>
+              </p14:xfrm>
+            </p:contentPart>
+          </mc:Choice>
+          <mc:Fallback xmlns="">
+            <p:pic>
+              <p:nvPicPr>
+                <p:cNvPr id="71" name="Ink 70">
+                  <a:extLst>
+                    <a:ext uri="{FF2B5EF4-FFF2-40B4-BE49-F238E27FC236}">
+                      <a16:creationId xmlns:a16="http://schemas.microsoft.com/office/drawing/2014/main" id="{2184D7AB-2E7C-3126-C955-A85F42C5CBC8}"/>
+                    </a:ext>
+                  </a:extLst>
+                </p:cNvPr>
+                <p:cNvPicPr/>
+                <p:nvPr/>
+              </p:nvPicPr>
+              <p:blipFill>
+                <a:blip r:embed="rId50"/>
+                <a:stretch>
+                  <a:fillRect/>
+                </a:stretch>
+              </p:blipFill>
+              <p:spPr>
+                <a:xfrm>
+                  <a:off x="10146306" y="2771985"/>
+                  <a:ext cx="109800" cy="22320"/>
+                </a:xfrm>
+                <a:prstGeom prst="rect">
+                  <a:avLst/>
+                </a:prstGeom>
+              </p:spPr>
+            </p:pic>
+          </mc:Fallback>
+        </mc:AlternateContent>
+      </p:grpSp>
+      <p:grpSp>
+        <p:nvGrpSpPr>
+          <p:cNvPr id="79" name="Group 78">
+            <a:extLst>
+              <a:ext uri="{FF2B5EF4-FFF2-40B4-BE49-F238E27FC236}">
+                <a16:creationId xmlns:a16="http://schemas.microsoft.com/office/drawing/2014/main" id="{736E0AA5-6A32-6FBA-D4D5-86164D6082E9}"/>
+              </a:ext>
+            </a:extLst>
+          </p:cNvPr>
+          <p:cNvGrpSpPr/>
+          <p:nvPr/>
+        </p:nvGrpSpPr>
+        <p:grpSpPr>
+          <a:xfrm>
+            <a:off x="9965946" y="2271585"/>
+            <a:ext cx="362160" cy="215280"/>
+            <a:chOff x="9965946" y="2271585"/>
+            <a:chExt cx="362160" cy="215280"/>
+          </a:xfrm>
+        </p:grpSpPr>
+        <mc:AlternateContent xmlns:mc="http://schemas.openxmlformats.org/markup-compatibility/2006" xmlns:p14="http://schemas.microsoft.com/office/powerpoint/2010/main">
+          <mc:Choice Requires="p14">
+            <p:contentPart p14:bwMode="auto" r:id="rId51">
+              <p14:nvContentPartPr>
+                <p14:cNvPr id="73" name="Ink 72">
+                  <a:extLst>
+                    <a:ext uri="{FF2B5EF4-FFF2-40B4-BE49-F238E27FC236}">
+                      <a16:creationId xmlns:a16="http://schemas.microsoft.com/office/drawing/2014/main" id="{F0BAC5B0-E838-4A43-F3A5-9491029F468E}"/>
+                    </a:ext>
+                  </a:extLst>
+                </p14:cNvPr>
+                <p14:cNvContentPartPr/>
+                <p14:nvPr/>
+              </p14:nvContentPartPr>
+              <p14:xfrm>
+                <a:off x="9965946" y="2301465"/>
+                <a:ext cx="76680" cy="148680"/>
+              </p14:xfrm>
+            </p:contentPart>
+          </mc:Choice>
+          <mc:Fallback xmlns="">
+            <p:pic>
+              <p:nvPicPr>
+                <p:cNvPr id="73" name="Ink 72">
+                  <a:extLst>
+                    <a:ext uri="{FF2B5EF4-FFF2-40B4-BE49-F238E27FC236}">
+                      <a16:creationId xmlns:a16="http://schemas.microsoft.com/office/drawing/2014/main" id="{F0BAC5B0-E838-4A43-F3A5-9491029F468E}"/>
+                    </a:ext>
+                  </a:extLst>
+                </p:cNvPr>
+                <p:cNvPicPr/>
+                <p:nvPr/>
+              </p:nvPicPr>
+              <p:blipFill>
+                <a:blip r:embed="rId52"/>
+                <a:stretch>
+                  <a:fillRect/>
+                </a:stretch>
+              </p:blipFill>
+              <p:spPr>
+                <a:xfrm>
+                  <a:off x="9956946" y="2292825"/>
+                  <a:ext cx="94320" cy="166320"/>
+                </a:xfrm>
+                <a:prstGeom prst="rect">
+                  <a:avLst/>
+                </a:prstGeom>
+              </p:spPr>
+            </p:pic>
+          </mc:Fallback>
+        </mc:AlternateContent>
+        <mc:AlternateContent xmlns:mc="http://schemas.openxmlformats.org/markup-compatibility/2006" xmlns:p14="http://schemas.microsoft.com/office/powerpoint/2010/main">
+          <mc:Choice Requires="p14">
+            <p:contentPart p14:bwMode="auto" r:id="rId53">
+              <p14:nvContentPartPr>
+                <p14:cNvPr id="74" name="Ink 73">
+                  <a:extLst>
+                    <a:ext uri="{FF2B5EF4-FFF2-40B4-BE49-F238E27FC236}">
+                      <a16:creationId xmlns:a16="http://schemas.microsoft.com/office/drawing/2014/main" id="{9ADF1B10-2AA7-2F75-76CC-384F2ED1EA07}"/>
+                    </a:ext>
+                  </a:extLst>
+                </p14:cNvPr>
+                <p14:cNvContentPartPr/>
+                <p14:nvPr/>
+              </p14:nvContentPartPr>
+              <p14:xfrm>
+                <a:off x="10074666" y="2271585"/>
+                <a:ext cx="85320" cy="200520"/>
+              </p14:xfrm>
+            </p:contentPart>
+          </mc:Choice>
+          <mc:Fallback xmlns="">
+            <p:pic>
+              <p:nvPicPr>
+                <p:cNvPr id="74" name="Ink 73">
+                  <a:extLst>
+                    <a:ext uri="{FF2B5EF4-FFF2-40B4-BE49-F238E27FC236}">
+                      <a16:creationId xmlns:a16="http://schemas.microsoft.com/office/drawing/2014/main" id="{9ADF1B10-2AA7-2F75-76CC-384F2ED1EA07}"/>
+                    </a:ext>
+                  </a:extLst>
+                </p:cNvPr>
+                <p:cNvPicPr/>
+                <p:nvPr/>
+              </p:nvPicPr>
+              <p:blipFill>
+                <a:blip r:embed="rId54"/>
+                <a:stretch>
+                  <a:fillRect/>
+                </a:stretch>
+              </p:blipFill>
+              <p:spPr>
+                <a:xfrm>
+                  <a:off x="10066026" y="2262945"/>
+                  <a:ext cx="102960" cy="218160"/>
+                </a:xfrm>
+                <a:prstGeom prst="rect">
+                  <a:avLst/>
+                </a:prstGeom>
+              </p:spPr>
+            </p:pic>
+          </mc:Fallback>
+        </mc:AlternateContent>
+        <mc:AlternateContent xmlns:mc="http://schemas.openxmlformats.org/markup-compatibility/2006" xmlns:p14="http://schemas.microsoft.com/office/powerpoint/2010/main">
+          <mc:Choice Requires="p14">
+            <p:contentPart p14:bwMode="auto" r:id="rId55">
+              <p14:nvContentPartPr>
+                <p14:cNvPr id="75" name="Ink 74">
+                  <a:extLst>
+                    <a:ext uri="{FF2B5EF4-FFF2-40B4-BE49-F238E27FC236}">
+                      <a16:creationId xmlns:a16="http://schemas.microsoft.com/office/drawing/2014/main" id="{FDA89BC0-92FA-8246-9098-0D67DDF253DA}"/>
+                    </a:ext>
+                  </a:extLst>
+                </p14:cNvPr>
+                <p14:cNvContentPartPr/>
+                <p14:nvPr/>
+              </p14:nvContentPartPr>
+              <p14:xfrm>
+                <a:off x="10101666" y="2395425"/>
+                <a:ext cx="51480" cy="4320"/>
+              </p14:xfrm>
+            </p:contentPart>
+          </mc:Choice>
+          <mc:Fallback xmlns="">
+            <p:pic>
+              <p:nvPicPr>
+                <p:cNvPr id="75" name="Ink 74">
+                  <a:extLst>
+                    <a:ext uri="{FF2B5EF4-FFF2-40B4-BE49-F238E27FC236}">
+                      <a16:creationId xmlns:a16="http://schemas.microsoft.com/office/drawing/2014/main" id="{FDA89BC0-92FA-8246-9098-0D67DDF253DA}"/>
+                    </a:ext>
+                  </a:extLst>
+                </p:cNvPr>
+                <p:cNvPicPr/>
+                <p:nvPr/>
+              </p:nvPicPr>
+              <p:blipFill>
+                <a:blip r:embed="rId56"/>
+                <a:stretch>
+                  <a:fillRect/>
+                </a:stretch>
+              </p:blipFill>
+              <p:spPr>
+                <a:xfrm>
+                  <a:off x="10093026" y="2386785"/>
+                  <a:ext cx="69120" cy="21960"/>
+                </a:xfrm>
+                <a:prstGeom prst="rect">
+                  <a:avLst/>
+                </a:prstGeom>
+              </p:spPr>
+            </p:pic>
+          </mc:Fallback>
+        </mc:AlternateContent>
+        <mc:AlternateContent xmlns:mc="http://schemas.openxmlformats.org/markup-compatibility/2006" xmlns:p14="http://schemas.microsoft.com/office/powerpoint/2010/main">
+          <mc:Choice Requires="p14">
+            <p:contentPart p14:bwMode="auto" r:id="rId57">
+              <p14:nvContentPartPr>
+                <p14:cNvPr id="76" name="Ink 75">
+                  <a:extLst>
+                    <a:ext uri="{FF2B5EF4-FFF2-40B4-BE49-F238E27FC236}">
+                      <a16:creationId xmlns:a16="http://schemas.microsoft.com/office/drawing/2014/main" id="{A208A370-521D-8363-8A1F-BBC10A73FBCA}"/>
+                    </a:ext>
+                  </a:extLst>
+                </p14:cNvPr>
+                <p14:cNvContentPartPr/>
+                <p14:nvPr/>
+              </p14:nvContentPartPr>
+              <p14:xfrm>
+                <a:off x="10253586" y="2370225"/>
+                <a:ext cx="17640" cy="116640"/>
+              </p14:xfrm>
+            </p:contentPart>
+          </mc:Choice>
+          <mc:Fallback xmlns="">
+            <p:pic>
+              <p:nvPicPr>
+                <p:cNvPr id="76" name="Ink 75">
+                  <a:extLst>
+                    <a:ext uri="{FF2B5EF4-FFF2-40B4-BE49-F238E27FC236}">
+                      <a16:creationId xmlns:a16="http://schemas.microsoft.com/office/drawing/2014/main" id="{A208A370-521D-8363-8A1F-BBC10A73FBCA}"/>
+                    </a:ext>
+                  </a:extLst>
+                </p:cNvPr>
+                <p:cNvPicPr/>
+                <p:nvPr/>
+              </p:nvPicPr>
+              <p:blipFill>
+                <a:blip r:embed="rId58"/>
+                <a:stretch>
+                  <a:fillRect/>
+                </a:stretch>
+              </p:blipFill>
+              <p:spPr>
+                <a:xfrm>
+                  <a:off x="10244586" y="2361225"/>
+                  <a:ext cx="35280" cy="134280"/>
+                </a:xfrm>
+                <a:prstGeom prst="rect">
+                  <a:avLst/>
+                </a:prstGeom>
+              </p:spPr>
+            </p:pic>
+          </mc:Fallback>
+        </mc:AlternateContent>
+        <mc:AlternateContent xmlns:mc="http://schemas.openxmlformats.org/markup-compatibility/2006" xmlns:p14="http://schemas.microsoft.com/office/powerpoint/2010/main">
+          <mc:Choice Requires="p14">
+            <p:contentPart p14:bwMode="auto" r:id="rId59">
+              <p14:nvContentPartPr>
+                <p14:cNvPr id="77" name="Ink 76">
+                  <a:extLst>
+                    <a:ext uri="{FF2B5EF4-FFF2-40B4-BE49-F238E27FC236}">
+                      <a16:creationId xmlns:a16="http://schemas.microsoft.com/office/drawing/2014/main" id="{C4368EF2-19ED-8DC5-E5AD-A9965F4A0FD5}"/>
+                    </a:ext>
+                  </a:extLst>
+                </p14:cNvPr>
+                <p14:cNvContentPartPr/>
+                <p14:nvPr/>
+              </p14:nvContentPartPr>
+              <p14:xfrm>
+                <a:off x="10263666" y="2356185"/>
+                <a:ext cx="17640" cy="65160"/>
+              </p14:xfrm>
+            </p:contentPart>
+          </mc:Choice>
+          <mc:Fallback xmlns="">
+            <p:pic>
+              <p:nvPicPr>
+                <p:cNvPr id="77" name="Ink 76">
+                  <a:extLst>
+                    <a:ext uri="{FF2B5EF4-FFF2-40B4-BE49-F238E27FC236}">
+                      <a16:creationId xmlns:a16="http://schemas.microsoft.com/office/drawing/2014/main" id="{C4368EF2-19ED-8DC5-E5AD-A9965F4A0FD5}"/>
+                    </a:ext>
+                  </a:extLst>
+                </p:cNvPr>
+                <p:cNvPicPr/>
+                <p:nvPr/>
+              </p:nvPicPr>
+              <p:blipFill>
+                <a:blip r:embed="rId60"/>
+                <a:stretch>
+                  <a:fillRect/>
+                </a:stretch>
+              </p:blipFill>
+              <p:spPr>
+                <a:xfrm>
+                  <a:off x="10254666" y="2347185"/>
+                  <a:ext cx="35280" cy="82800"/>
+                </a:xfrm>
+                <a:prstGeom prst="rect">
+                  <a:avLst/>
+                </a:prstGeom>
+              </p:spPr>
+            </p:pic>
+          </mc:Fallback>
+        </mc:AlternateContent>
+        <mc:AlternateContent xmlns:mc="http://schemas.openxmlformats.org/markup-compatibility/2006" xmlns:p14="http://schemas.microsoft.com/office/powerpoint/2010/main">
+          <mc:Choice Requires="p14">
+            <p:contentPart p14:bwMode="auto" r:id="rId61">
+              <p14:nvContentPartPr>
+                <p14:cNvPr id="78" name="Ink 77">
+                  <a:extLst>
+                    <a:ext uri="{FF2B5EF4-FFF2-40B4-BE49-F238E27FC236}">
+                      <a16:creationId xmlns:a16="http://schemas.microsoft.com/office/drawing/2014/main" id="{180CCCB2-32F5-B19D-530A-36F1CC71942C}"/>
+                    </a:ext>
+                  </a:extLst>
+                </p14:cNvPr>
+                <p14:cNvContentPartPr/>
+                <p14:nvPr/>
+              </p14:nvContentPartPr>
+              <p14:xfrm>
+                <a:off x="10246026" y="2355825"/>
+                <a:ext cx="82080" cy="1440"/>
+              </p14:xfrm>
+            </p:contentPart>
+          </mc:Choice>
+          <mc:Fallback xmlns="">
+            <p:pic>
+              <p:nvPicPr>
+                <p:cNvPr id="78" name="Ink 77">
+                  <a:extLst>
+                    <a:ext uri="{FF2B5EF4-FFF2-40B4-BE49-F238E27FC236}">
+                      <a16:creationId xmlns:a16="http://schemas.microsoft.com/office/drawing/2014/main" id="{180CCCB2-32F5-B19D-530A-36F1CC71942C}"/>
+                    </a:ext>
+                  </a:extLst>
+                </p:cNvPr>
+                <p:cNvPicPr/>
+                <p:nvPr/>
+              </p:nvPicPr>
+              <p:blipFill>
+                <a:blip r:embed="rId62"/>
+                <a:stretch>
+                  <a:fillRect/>
+                </a:stretch>
+              </p:blipFill>
+              <p:spPr>
+                <a:xfrm>
+                  <a:off x="10237026" y="2346825"/>
+                  <a:ext cx="99720" cy="19080"/>
+                </a:xfrm>
+                <a:prstGeom prst="rect">
+                  <a:avLst/>
+                </a:prstGeom>
+              </p:spPr>
+            </p:pic>
+          </mc:Fallback>
+        </mc:AlternateContent>
+      </p:grpSp>
     </p:spTree>
     <p:extLst>
       <p:ext uri="{BB962C8B-B14F-4D97-AF65-F5344CB8AC3E}">
-        <p14:creationId xmlns:p14="http://schemas.microsoft.com/office/powerpoint/2010/main" val="2750142128"/>
+        <p14:creationId xmlns:p14="http://schemas.microsoft.com/office/powerpoint/2010/main" val="953143329"/>
       </p:ext>
     </p:extLst>
   </p:cSld>
@@ -6074,7 +8975,7 @@
         <p:spPr>
           <a:xfrm>
             <a:off x="437720" y="261256"/>
-            <a:ext cx="8438148" cy="698011"/>
+            <a:ext cx="10941480" cy="698011"/>
           </a:xfrm>
         </p:spPr>
         <p:txBody>
@@ -6086,17 +8987,17 @@
             <a:pPr algn="l"/>
             <a:r>
               <a:rPr lang="en-US" sz="4000" dirty="0"/>
-              <a:t>Area (time) – smoothed</a:t>
+              <a:t>Area (time) – Normalized examples</a:t>
             </a:r>
           </a:p>
         </p:txBody>
       </p:sp>
       <p:pic>
         <p:nvPicPr>
-          <p:cNvPr id="7" name="Picture 6">
-            <a:extLst>
-              <a:ext uri="{FF2B5EF4-FFF2-40B4-BE49-F238E27FC236}">
-                <a16:creationId xmlns:a16="http://schemas.microsoft.com/office/drawing/2014/main" id="{12FC6D82-7282-7AAA-6AB4-51FB592900B7}"/>
+          <p:cNvPr id="4" name="Picture 3">
+            <a:extLst>
+              <a:ext uri="{FF2B5EF4-FFF2-40B4-BE49-F238E27FC236}">
+                <a16:creationId xmlns:a16="http://schemas.microsoft.com/office/drawing/2014/main" id="{5E5988FC-5593-4B34-A1E2-939AD796197B}"/>
               </a:ext>
             </a:extLst>
           </p:cNvPr>
@@ -6113,8 +9014,8 @@
         </p:blipFill>
         <p:spPr>
           <a:xfrm>
-            <a:off x="191911" y="1134533"/>
-            <a:ext cx="6118577" cy="4588933"/>
+            <a:off x="205783" y="959267"/>
+            <a:ext cx="6019006" cy="4514254"/>
           </a:xfrm>
           <a:prstGeom prst="rect">
             <a:avLst/>
@@ -6123,10 +9024,10 @@
       </p:pic>
       <p:pic>
         <p:nvPicPr>
-          <p:cNvPr id="12" name="Picture 11">
-            <a:extLst>
-              <a:ext uri="{FF2B5EF4-FFF2-40B4-BE49-F238E27FC236}">
-                <a16:creationId xmlns:a16="http://schemas.microsoft.com/office/drawing/2014/main" id="{A07EC139-5C54-9D0E-78B7-2646C48B052A}"/>
+          <p:cNvPr id="6" name="Picture 5">
+            <a:extLst>
+              <a:ext uri="{FF2B5EF4-FFF2-40B4-BE49-F238E27FC236}">
+                <a16:creationId xmlns:a16="http://schemas.microsoft.com/office/drawing/2014/main" id="{B100E076-FF37-190E-66E8-597FBBDB2933}"/>
               </a:ext>
             </a:extLst>
           </p:cNvPr>
@@ -6143,8 +9044,8 @@
         </p:blipFill>
         <p:spPr>
           <a:xfrm>
-            <a:off x="5939107" y="1226428"/>
-            <a:ext cx="5873521" cy="4405141"/>
+            <a:off x="5846648" y="1075178"/>
+            <a:ext cx="6019005" cy="4514254"/>
           </a:xfrm>
           <a:prstGeom prst="rect">
             <a:avLst/>
@@ -6154,7 +9055,7 @@
     </p:spTree>
     <p:extLst>
       <p:ext uri="{BB962C8B-B14F-4D97-AF65-F5344CB8AC3E}">
-        <p14:creationId xmlns:p14="http://schemas.microsoft.com/office/powerpoint/2010/main" val="57968910"/>
+        <p14:creationId xmlns:p14="http://schemas.microsoft.com/office/powerpoint/2010/main" val="351021535"/>
       </p:ext>
     </p:extLst>
   </p:cSld>
@@ -6181,105 +9082,106 @@
           <a:chExt cx="0" cy="0"/>
         </a:xfrm>
       </p:grpSpPr>
-      <mc:AlternateContent xmlns:mc="http://schemas.openxmlformats.org/markup-compatibility/2006" xmlns:a14="http://schemas.microsoft.com/office/drawing/2010/main">
-        <mc:Choice Requires="a14">
-          <p:sp>
-            <p:nvSpPr>
-              <p:cNvPr id="2" name="Title 1">
-                <a:extLst>
-                  <a:ext uri="{FF2B5EF4-FFF2-40B4-BE49-F238E27FC236}">
-                    <a16:creationId xmlns:a16="http://schemas.microsoft.com/office/drawing/2014/main" id="{553BC310-260C-4BBC-FFDE-C32713BA6ECC}"/>
-                  </a:ext>
-                </a:extLst>
-              </p:cNvPr>
-              <p:cNvSpPr>
-                <a:spLocks noGrp="1"/>
-              </p:cNvSpPr>
-              <p:nvPr>
-                <p:ph type="ctrTitle"/>
-              </p:nvPr>
-            </p:nvSpPr>
-            <p:spPr>
-              <a:xfrm>
-                <a:off x="3118435" y="2249364"/>
-                <a:ext cx="5955129" cy="752782"/>
-              </a:xfrm>
-            </p:spPr>
-            <p:txBody>
-              <a:bodyPr>
-                <a:normAutofit fontScale="90000"/>
-              </a:bodyPr>
-              <a:lstStyle/>
-              <a:p>
-                <a14:m>
-                  <m:oMath xmlns:m="http://schemas.openxmlformats.org/officeDocument/2006/math">
-                    <m:r>
-                      <m:rPr>
-                        <m:sty m:val="p"/>
-                      </m:rPr>
-                      <a:rPr lang="en-US" sz="4000" b="0" i="1" smtClean="0">
-                        <a:latin typeface="Cambria Math" panose="02040503050406030204" pitchFamily="18" charset="0"/>
-                      </a:rPr>
-                      <m:t>ϵ</m:t>
-                    </m:r>
-                  </m:oMath>
-                </a14:m>
-                <a:r>
-                  <a:rPr lang="en-US" sz="4000" dirty="0"/>
-                  <a:t> - EXTINCTION  COEFFICIENT</a:t>
-                </a:r>
-              </a:p>
-            </p:txBody>
-          </p:sp>
-        </mc:Choice>
-        <mc:Fallback xmlns="">
-          <p:sp>
-            <p:nvSpPr>
-              <p:cNvPr id="2" name="Title 1">
-                <a:extLst>
-                  <a:ext uri="{FF2B5EF4-FFF2-40B4-BE49-F238E27FC236}">
-                    <a16:creationId xmlns:a16="http://schemas.microsoft.com/office/drawing/2014/main" id="{553BC310-260C-4BBC-FFDE-C32713BA6ECC}"/>
-                  </a:ext>
-                </a:extLst>
-              </p:cNvPr>
-              <p:cNvSpPr>
-                <a:spLocks noGrp="1" noRot="1" noChangeAspect="1" noMove="1" noResize="1" noEditPoints="1" noAdjustHandles="1" noChangeArrowheads="1" noChangeShapeType="1" noTextEdit="1"/>
-              </p:cNvSpPr>
-              <p:nvPr>
-                <p:ph type="ctrTitle"/>
-              </p:nvPr>
-            </p:nvSpPr>
-            <p:spPr>
-              <a:xfrm>
-                <a:off x="3118435" y="2249364"/>
-                <a:ext cx="5955129" cy="752782"/>
-              </a:xfrm>
-              <a:blipFill>
-                <a:blip r:embed="rId2"/>
-                <a:stretch>
-                  <a:fillRect b="-30000"/>
-                </a:stretch>
-              </a:blipFill>
-            </p:spPr>
-            <p:txBody>
-              <a:bodyPr/>
-              <a:lstStyle/>
-              <a:p>
-                <a:r>
-                  <a:rPr lang="en-US">
-                    <a:noFill/>
-                  </a:rPr>
-                  <a:t> </a:t>
-                </a:r>
-              </a:p>
-            </p:txBody>
-          </p:sp>
-        </mc:Fallback>
-      </mc:AlternateContent>
+      <p:sp>
+        <p:nvSpPr>
+          <p:cNvPr id="2" name="Title 1">
+            <a:extLst>
+              <a:ext uri="{FF2B5EF4-FFF2-40B4-BE49-F238E27FC236}">
+                <a16:creationId xmlns:a16="http://schemas.microsoft.com/office/drawing/2014/main" id="{553BC310-260C-4BBC-FFDE-C32713BA6ECC}"/>
+              </a:ext>
+            </a:extLst>
+          </p:cNvPr>
+          <p:cNvSpPr>
+            <a:spLocks noGrp="1"/>
+          </p:cNvSpPr>
+          <p:nvPr>
+            <p:ph type="ctrTitle"/>
+          </p:nvPr>
+        </p:nvSpPr>
+        <p:spPr>
+          <a:xfrm>
+            <a:off x="437720" y="261256"/>
+            <a:ext cx="8438148" cy="698011"/>
+          </a:xfrm>
+        </p:spPr>
+        <p:txBody>
+          <a:bodyPr>
+            <a:normAutofit/>
+          </a:bodyPr>
+          <a:lstStyle/>
+          <a:p>
+            <a:pPr algn="l"/>
+            <a:r>
+              <a:rPr lang="en-US" sz="4000" dirty="0"/>
+              <a:t>Area (time) – smoothed</a:t>
+            </a:r>
+          </a:p>
+        </p:txBody>
+      </p:sp>
+      <p:pic>
+        <p:nvPicPr>
+          <p:cNvPr id="4" name="Picture 3">
+            <a:extLst>
+              <a:ext uri="{FF2B5EF4-FFF2-40B4-BE49-F238E27FC236}">
+                <a16:creationId xmlns:a16="http://schemas.microsoft.com/office/drawing/2014/main" id="{2A807A34-0193-E8DE-1CFD-22F281C41E88}"/>
+              </a:ext>
+            </a:extLst>
+          </p:cNvPr>
+          <p:cNvPicPr>
+            <a:picLocks noChangeAspect="1"/>
+          </p:cNvPicPr>
+          <p:nvPr/>
+        </p:nvPicPr>
+        <p:blipFill>
+          <a:blip r:embed="rId2"/>
+          <a:stretch>
+            <a:fillRect/>
+          </a:stretch>
+        </p:blipFill>
+        <p:spPr>
+          <a:xfrm>
+            <a:off x="0" y="1094324"/>
+            <a:ext cx="6276583" cy="4707437"/>
+          </a:xfrm>
+          <a:prstGeom prst="rect">
+            <a:avLst/>
+          </a:prstGeom>
+        </p:spPr>
+      </p:pic>
+      <p:pic>
+        <p:nvPicPr>
+          <p:cNvPr id="6" name="Picture 5">
+            <a:extLst>
+              <a:ext uri="{FF2B5EF4-FFF2-40B4-BE49-F238E27FC236}">
+                <a16:creationId xmlns:a16="http://schemas.microsoft.com/office/drawing/2014/main" id="{8E236904-2B46-2BBE-F775-1CF953CED35A}"/>
+              </a:ext>
+            </a:extLst>
+          </p:cNvPr>
+          <p:cNvPicPr>
+            <a:picLocks noChangeAspect="1"/>
+          </p:cNvPicPr>
+          <p:nvPr/>
+        </p:nvPicPr>
+        <p:blipFill>
+          <a:blip r:embed="rId3"/>
+          <a:stretch>
+            <a:fillRect/>
+          </a:stretch>
+        </p:blipFill>
+        <p:spPr>
+          <a:xfrm>
+            <a:off x="5898490" y="1081629"/>
+            <a:ext cx="6293510" cy="4720132"/>
+          </a:xfrm>
+          <a:prstGeom prst="rect">
+            <a:avLst/>
+          </a:prstGeom>
+        </p:spPr>
+      </p:pic>
     </p:spTree>
     <p:extLst>
       <p:ext uri="{BB962C8B-B14F-4D97-AF65-F5344CB8AC3E}">
-        <p14:creationId xmlns:p14="http://schemas.microsoft.com/office/powerpoint/2010/main" val="1465684167"/>
+        <p14:creationId xmlns:p14="http://schemas.microsoft.com/office/powerpoint/2010/main" val="57968910"/>
       </p:ext>
     </p:extLst>
   </p:cSld>

</xml_diff>